<commit_message>
Modificate le slide nella parte iniziale
Aggiunta della transizione di restart
</commit_message>
<xml_diff>
--- a/Progetto sistemi.pptx
+++ b/Progetto sistemi.pptx
@@ -271,7 +271,7 @@
           <a:p>
             <a:fld id="{E7209603-6E60-49B9-BBC7-D363A6F8E0E1}" type="datetimeFigureOut">
               <a:rPr lang="it-IT" smtClean="0"/>
-              <a:t>16/02/2018</a:t>
+              <a:t>18/02/2018</a:t>
             </a:fld>
             <a:endParaRPr lang="it-IT"/>
           </a:p>
@@ -436,7 +436,7 @@
           <a:p>
             <a:fld id="{28EC8708-F48D-430F-8DA4-8CA34B9897F8}" type="datetimeFigureOut">
               <a:rPr lang="it-IT" smtClean="0"/>
-              <a:t>16/02/2018</a:t>
+              <a:t>18/02/2018</a:t>
             </a:fld>
             <a:endParaRPr lang="it-IT"/>
           </a:p>
@@ -1621,7 +1621,7 @@
           <a:p>
             <a:fld id="{5243369B-FBAA-403C-8A1E-C9994F99F854}" type="datetimeFigureOut">
               <a:rPr lang="it-IT" smtClean="0"/>
-              <a:t>16/02/2018</a:t>
+              <a:t>18/02/2018</a:t>
             </a:fld>
             <a:endParaRPr lang="it-IT"/>
           </a:p>
@@ -1789,7 +1789,7 @@
           <a:p>
             <a:fld id="{5243369B-FBAA-403C-8A1E-C9994F99F854}" type="datetimeFigureOut">
               <a:rPr lang="it-IT" smtClean="0"/>
-              <a:t>16/02/2018</a:t>
+              <a:t>18/02/2018</a:t>
             </a:fld>
             <a:endParaRPr lang="it-IT"/>
           </a:p>
@@ -1967,7 +1967,7 @@
           <a:p>
             <a:fld id="{5243369B-FBAA-403C-8A1E-C9994F99F854}" type="datetimeFigureOut">
               <a:rPr lang="it-IT" smtClean="0"/>
-              <a:t>16/02/2018</a:t>
+              <a:t>18/02/2018</a:t>
             </a:fld>
             <a:endParaRPr lang="it-IT"/>
           </a:p>
@@ -2135,7 +2135,7 @@
           <a:p>
             <a:fld id="{5243369B-FBAA-403C-8A1E-C9994F99F854}" type="datetimeFigureOut">
               <a:rPr lang="it-IT" smtClean="0"/>
-              <a:t>16/02/2018</a:t>
+              <a:t>18/02/2018</a:t>
             </a:fld>
             <a:endParaRPr lang="it-IT"/>
           </a:p>
@@ -2380,7 +2380,7 @@
           <a:p>
             <a:fld id="{5243369B-FBAA-403C-8A1E-C9994F99F854}" type="datetimeFigureOut">
               <a:rPr lang="it-IT" smtClean="0"/>
-              <a:t>16/02/2018</a:t>
+              <a:t>18/02/2018</a:t>
             </a:fld>
             <a:endParaRPr lang="it-IT"/>
           </a:p>
@@ -2609,7 +2609,7 @@
           <a:p>
             <a:fld id="{5243369B-FBAA-403C-8A1E-C9994F99F854}" type="datetimeFigureOut">
               <a:rPr lang="it-IT" smtClean="0"/>
-              <a:t>16/02/2018</a:t>
+              <a:t>18/02/2018</a:t>
             </a:fld>
             <a:endParaRPr lang="it-IT"/>
           </a:p>
@@ -2973,7 +2973,7 @@
           <a:p>
             <a:fld id="{5243369B-FBAA-403C-8A1E-C9994F99F854}" type="datetimeFigureOut">
               <a:rPr lang="it-IT" smtClean="0"/>
-              <a:t>16/02/2018</a:t>
+              <a:t>18/02/2018</a:t>
             </a:fld>
             <a:endParaRPr lang="it-IT"/>
           </a:p>
@@ -3090,7 +3090,7 @@
           <a:p>
             <a:fld id="{5243369B-FBAA-403C-8A1E-C9994F99F854}" type="datetimeFigureOut">
               <a:rPr lang="it-IT" smtClean="0"/>
-              <a:t>16/02/2018</a:t>
+              <a:t>18/02/2018</a:t>
             </a:fld>
             <a:endParaRPr lang="it-IT"/>
           </a:p>
@@ -3185,7 +3185,7 @@
           <a:p>
             <a:fld id="{5243369B-FBAA-403C-8A1E-C9994F99F854}" type="datetimeFigureOut">
               <a:rPr lang="it-IT" smtClean="0"/>
-              <a:t>16/02/2018</a:t>
+              <a:t>18/02/2018</a:t>
             </a:fld>
             <a:endParaRPr lang="it-IT"/>
           </a:p>
@@ -3460,7 +3460,7 @@
           <a:p>
             <a:fld id="{5243369B-FBAA-403C-8A1E-C9994F99F854}" type="datetimeFigureOut">
               <a:rPr lang="it-IT" smtClean="0"/>
-              <a:t>16/02/2018</a:t>
+              <a:t>18/02/2018</a:t>
             </a:fld>
             <a:endParaRPr lang="it-IT"/>
           </a:p>
@@ -3712,7 +3712,7 @@
           <a:p>
             <a:fld id="{5243369B-FBAA-403C-8A1E-C9994F99F854}" type="datetimeFigureOut">
               <a:rPr lang="it-IT" smtClean="0"/>
-              <a:t>16/02/2018</a:t>
+              <a:t>18/02/2018</a:t>
             </a:fld>
             <a:endParaRPr lang="it-IT"/>
           </a:p>
@@ -3923,7 +3923,7 @@
           <a:p>
             <a:fld id="{5243369B-FBAA-403C-8A1E-C9994F99F854}" type="datetimeFigureOut">
               <a:rPr lang="it-IT" smtClean="0"/>
-              <a:t>16/02/2018</a:t>
+              <a:t>18/02/2018</a:t>
             </a:fld>
             <a:endParaRPr lang="it-IT"/>
           </a:p>
@@ -5052,6 +5052,14 @@
   <p:clrMapOvr>
     <a:masterClrMapping/>
   </p:clrMapOvr>
+  <mc:AlternateContent xmlns:mc="http://schemas.openxmlformats.org/markup-compatibility/2006">
+    <mc:Choice xmlns:p14="http://schemas.microsoft.com/office/powerpoint/2010/main" Requires="p14">
+      <p:transition spd="slow" p14:dur="2000"/>
+    </mc:Choice>
+    <mc:Fallback>
+      <p:transition spd="slow"/>
+    </mc:Fallback>
+  </mc:AlternateContent>
 </p:sld>
 </file>
 
@@ -5826,6 +5834,14 @@
   <p:clrMapOvr>
     <a:masterClrMapping/>
   </p:clrMapOvr>
+  <mc:AlternateContent xmlns:mc="http://schemas.openxmlformats.org/markup-compatibility/2006">
+    <mc:Choice xmlns:p14="http://schemas.microsoft.com/office/powerpoint/2010/main" Requires="p14">
+      <p:transition spd="slow" p14:dur="2000"/>
+    </mc:Choice>
+    <mc:Fallback>
+      <p:transition spd="slow"/>
+    </mc:Fallback>
+  </mc:AlternateContent>
 </p:sld>
 </file>
 
@@ -6594,6 +6610,14 @@
   <p:clrMapOvr>
     <a:masterClrMapping/>
   </p:clrMapOvr>
+  <mc:AlternateContent xmlns:mc="http://schemas.openxmlformats.org/markup-compatibility/2006">
+    <mc:Choice xmlns:p14="http://schemas.microsoft.com/office/powerpoint/2010/main" Requires="p14">
+      <p:transition spd="slow" p14:dur="2000"/>
+    </mc:Choice>
+    <mc:Fallback>
+      <p:transition spd="slow"/>
+    </mc:Fallback>
+  </mc:AlternateContent>
 </p:sld>
 </file>
 
@@ -7362,6 +7386,14 @@
   <p:clrMapOvr>
     <a:masterClrMapping/>
   </p:clrMapOvr>
+  <mc:AlternateContent xmlns:mc="http://schemas.openxmlformats.org/markup-compatibility/2006">
+    <mc:Choice xmlns:p14="http://schemas.microsoft.com/office/powerpoint/2010/main" Requires="p14">
+      <p:transition spd="slow" p14:dur="2000"/>
+    </mc:Choice>
+    <mc:Fallback>
+      <p:transition spd="slow"/>
+    </mc:Fallback>
+  </mc:AlternateContent>
 </p:sld>
 </file>
 
@@ -8130,6 +8162,14 @@
   <p:clrMapOvr>
     <a:masterClrMapping/>
   </p:clrMapOvr>
+  <mc:AlternateContent xmlns:mc="http://schemas.openxmlformats.org/markup-compatibility/2006">
+    <mc:Choice xmlns:p14="http://schemas.microsoft.com/office/powerpoint/2010/main" Requires="p14">
+      <p:transition spd="slow" p14:dur="2000"/>
+    </mc:Choice>
+    <mc:Fallback>
+      <p:transition spd="slow"/>
+    </mc:Fallback>
+  </mc:AlternateContent>
 </p:sld>
 </file>
 
@@ -8228,6 +8268,10 @@
             <a:pPr marL="0" indent="0">
               <a:buNone/>
             </a:pPr>
+            <a:r>
+              <a:rPr lang="it-IT" dirty="0"/>
+              <a:t/>
+            </a:r>
             <a:br>
               <a:rPr lang="it-IT" dirty="0"/>
             </a:br>
@@ -9252,6 +9296,10 @@
             <a:pPr marL="0" indent="0">
               <a:buNone/>
             </a:pPr>
+            <a:r>
+              <a:rPr lang="it-IT" dirty="0"/>
+              <a:t/>
+            </a:r>
             <a:br>
               <a:rPr lang="it-IT" dirty="0"/>
             </a:br>
@@ -10325,13 +10373,13 @@
                           <a:rPr lang="it-IT" sz="1000" i="1" dirty="0" smtClean="0">
                             <a:latin typeface="Cambria Math" panose="02040503050406030204" pitchFamily="18" charset="0"/>
                           </a:rPr>
-                          <m:t>𝑝𝑜𝑠𝑖𝑡𝑖</m:t>
+                          <m:t>𝑝𝑜𝑠𝑖𝑡𝑖𝑜</m:t>
                         </m:r>
                         <m:r>
                           <a:rPr lang="it-IT" sz="1000" b="0" i="1" dirty="0" smtClean="0">
                             <a:latin typeface="Cambria Math" panose="02040503050406030204" pitchFamily="18" charset="0"/>
                           </a:rPr>
-                          <m:t>𝑜𝑛</m:t>
+                          <m:t>𝑛</m:t>
                         </m:r>
                       </m:oMath>
                     </m:oMathPara>
@@ -11758,8 +11806,8 @@
           </a:fontRef>
         </p:style>
       </p:cxnSp>
-      <mc:AlternateContent xmlns:mc="http://schemas.openxmlformats.org/markup-compatibility/2006" xmlns:a14="http://schemas.microsoft.com/office/drawing/2010/main">
-        <mc:Choice Requires="a14">
+      <mc:AlternateContent xmlns:mc="http://schemas.openxmlformats.org/markup-compatibility/2006">
+        <mc:Choice xmlns:a14="http://schemas.microsoft.com/office/drawing/2010/main" Requires="a14">
           <p:sp>
             <p:nvSpPr>
               <p:cNvPr id="88" name="CasellaDiTesto 87"/>
@@ -11768,7 +11816,7 @@
             </p:nvSpPr>
             <p:spPr>
               <a:xfrm>
-                <a:off x="4849220" y="3811029"/>
+                <a:off x="4823901" y="3747673"/>
                 <a:ext cx="2621316" cy="242695"/>
               </a:xfrm>
               <a:prstGeom prst="rect">
@@ -11803,7 +11851,7 @@
             </p:txBody>
           </p:sp>
         </mc:Choice>
-        <mc:Fallback xmlns="">
+        <mc:Fallback>
           <p:sp>
             <p:nvSpPr>
               <p:cNvPr id="88" name="CasellaDiTesto 87"/>
@@ -11814,7 +11862,7 @@
             </p:nvSpPr>
             <p:spPr>
               <a:xfrm>
-                <a:off x="4849220" y="3811029"/>
+                <a:off x="4823901" y="3747673"/>
                 <a:ext cx="2621316" cy="242695"/>
               </a:xfrm>
               <a:prstGeom prst="rect">
@@ -12332,13 +12380,13 @@
                           <a:rPr lang="it-IT" sz="1000" i="1" dirty="0" smtClean="0">
                             <a:latin typeface="Cambria Math" panose="02040503050406030204" pitchFamily="18" charset="0"/>
                           </a:rPr>
-                          <m:t>𝑝𝑜𝑠𝑖𝑡𝑖</m:t>
+                          <m:t>𝑝𝑜𝑠𝑖𝑡𝑖𝑜</m:t>
                         </m:r>
                         <m:r>
                           <a:rPr lang="it-IT" sz="1000" b="0" i="1" dirty="0" smtClean="0">
                             <a:latin typeface="Cambria Math" panose="02040503050406030204" pitchFamily="18" charset="0"/>
                           </a:rPr>
-                          <m:t>𝑜𝑛</m:t>
+                          <m:t>𝑛</m:t>
                         </m:r>
                       </m:oMath>
                     </m:oMathPara>
@@ -13564,8 +13612,8 @@
           </a:fontRef>
         </p:style>
       </p:cxnSp>
-      <mc:AlternateContent xmlns:mc="http://schemas.openxmlformats.org/markup-compatibility/2006" xmlns:a14="http://schemas.microsoft.com/office/drawing/2010/main">
-        <mc:Choice Requires="a14">
+      <mc:AlternateContent xmlns:mc="http://schemas.openxmlformats.org/markup-compatibility/2006">
+        <mc:Choice xmlns:a14="http://schemas.microsoft.com/office/drawing/2010/main" Requires="a14">
           <p:sp>
             <p:nvSpPr>
               <p:cNvPr id="153" name="CasellaDiTesto 152"/>
@@ -13574,7 +13622,7 @@
             </p:nvSpPr>
             <p:spPr>
               <a:xfrm>
-                <a:off x="-896565" y="3530112"/>
+                <a:off x="-1207917" y="3555685"/>
                 <a:ext cx="2621316" cy="227626"/>
               </a:xfrm>
               <a:prstGeom prst="rect">
@@ -13609,7 +13657,7 @@
             </p:txBody>
           </p:sp>
         </mc:Choice>
-        <mc:Fallback xmlns="">
+        <mc:Fallback>
           <p:sp>
             <p:nvSpPr>
               <p:cNvPr id="153" name="CasellaDiTesto 152"/>
@@ -13620,7 +13668,7 @@
             </p:nvSpPr>
             <p:spPr>
               <a:xfrm>
-                <a:off x="-896565" y="3530112"/>
+                <a:off x="-1207917" y="3555685"/>
                 <a:ext cx="2621316" cy="227626"/>
               </a:xfrm>
               <a:prstGeom prst="rect">
@@ -13629,7 +13677,7 @@
               <a:blipFill>
                 <a:blip r:embed="rId22"/>
                 <a:stretch>
-                  <a:fillRect b="-5405"/>
+                  <a:fillRect b="-2632"/>
                 </a:stretch>
               </a:blipFill>
             </p:spPr>
@@ -13709,13 +13757,14 @@
               <a:t>Input: </a:t>
             </a:r>
             <a:r>
-              <a:rPr lang="it-IT" sz="900" i="1" dirty="0"/>
-              <a:t>Stop</a:t>
-            </a:r>
-            <a:r>
-              <a:rPr lang="it-IT" sz="900" dirty="0"/>
+              <a:rPr lang="it-IT" sz="900" i="1" dirty="0" err="1" smtClean="0"/>
+              <a:t>Stop,RestartA</a:t>
+            </a:r>
+            <a:r>
+              <a:rPr lang="it-IT" sz="900" dirty="0" smtClean="0"/>
               <a:t> </a:t>
             </a:r>
+            <a:endParaRPr lang="it-IT" sz="900" dirty="0"/>
           </a:p>
           <a:p>
             <a:r>
@@ -13791,8 +13840,8 @@
           </a:p>
         </p:txBody>
       </p:sp>
-      <mc:AlternateContent xmlns:mc="http://schemas.openxmlformats.org/markup-compatibility/2006" xmlns:a14="http://schemas.microsoft.com/office/drawing/2010/main">
-        <mc:Choice Requires="a14">
+      <mc:AlternateContent xmlns:mc="http://schemas.openxmlformats.org/markup-compatibility/2006">
+        <mc:Choice xmlns:a14="http://schemas.microsoft.com/office/drawing/2010/main" Requires="a14">
           <p:sp>
             <p:nvSpPr>
               <p:cNvPr id="166" name="CasellaDiTesto 165"/>
@@ -13914,13 +13963,14 @@
                   <a:t>Input: </a:t>
                 </a:r>
                 <a:r>
-                  <a:rPr lang="it-IT" sz="900" i="1" dirty="0"/>
-                  <a:t>Stop</a:t>
+                  <a:rPr lang="it-IT" sz="900" i="1" dirty="0" err="1" smtClean="0"/>
+                  <a:t>Stop,RestartA</a:t>
                 </a:r>
                 <a:r>
-                  <a:rPr lang="it-IT" sz="900" dirty="0"/>
+                  <a:rPr lang="it-IT" sz="900" dirty="0" smtClean="0"/>
                   <a:t> </a:t>
                 </a:r>
+                <a:endParaRPr lang="it-IT" sz="900" dirty="0"/>
               </a:p>
               <a:p>
                 <a:r>
@@ -13943,7 +13993,7 @@
             </p:txBody>
           </p:sp>
         </mc:Choice>
-        <mc:Fallback xmlns="">
+        <mc:Fallback>
           <p:sp>
             <p:nvSpPr>
               <p:cNvPr id="166" name="CasellaDiTesto 165"/>
@@ -14043,13 +14093,14 @@
               <a:t>Input: </a:t>
             </a:r>
             <a:r>
-              <a:rPr lang="it-IT" sz="1200" dirty="0" err="1"/>
-              <a:t>position,w,a,s,d</a:t>
-            </a:r>
-            <a:r>
-              <a:rPr lang="it-IT" sz="1200" dirty="0"/>
+              <a:rPr lang="it-IT" sz="1200" dirty="0" err="1" smtClean="0"/>
+              <a:t>position,w,a,s,d,RestartS</a:t>
+            </a:r>
+            <a:r>
+              <a:rPr lang="it-IT" sz="1200" dirty="0" smtClean="0"/>
               <a:t>  </a:t>
             </a:r>
+            <a:endParaRPr lang="it-IT" sz="1200" dirty="0"/>
           </a:p>
           <a:p>
             <a:r>
@@ -14058,8 +14109,13 @@
             </a:r>
             <a:r>
               <a:rPr lang="it-IT" sz="1200" dirty="0"/>
-              <a:t>: Stop</a:t>
-            </a:r>
+              <a:t>: </a:t>
+            </a:r>
+            <a:r>
+              <a:rPr lang="it-IT" sz="1200" dirty="0" err="1" smtClean="0"/>
+              <a:t>Stop,RestartA</a:t>
+            </a:r>
+            <a:endParaRPr lang="it-IT" sz="1200" dirty="0"/>
           </a:p>
         </p:txBody>
       </p:sp>
@@ -14243,8 +14299,8 @@
           </a:fontRef>
         </p:style>
       </p:cxnSp>
-      <mc:AlternateContent xmlns:mc="http://schemas.openxmlformats.org/markup-compatibility/2006" xmlns:a14="http://schemas.microsoft.com/office/drawing/2010/main">
-        <mc:Choice Requires="a14">
+      <mc:AlternateContent xmlns:mc="http://schemas.openxmlformats.org/markup-compatibility/2006">
+        <mc:Choice xmlns:a14="http://schemas.microsoft.com/office/drawing/2010/main" Requires="a14">
           <p:sp>
             <p:nvSpPr>
               <p:cNvPr id="183" name="CasellaDiTesto 182"/>
@@ -14366,13 +14422,14 @@
                   <a:t>Input: </a:t>
                 </a:r>
                 <a:r>
-                  <a:rPr lang="it-IT" sz="900" i="1" dirty="0"/>
-                  <a:t>Stop</a:t>
+                  <a:rPr lang="it-IT" sz="900" i="1" dirty="0" err="1" smtClean="0"/>
+                  <a:t>Stop,RestartA</a:t>
                 </a:r>
                 <a:r>
-                  <a:rPr lang="it-IT" sz="900" dirty="0"/>
+                  <a:rPr lang="it-IT" sz="900" dirty="0" smtClean="0"/>
                   <a:t> </a:t>
                 </a:r>
+                <a:endParaRPr lang="it-IT" sz="900" dirty="0"/>
               </a:p>
               <a:p>
                 <a:r>
@@ -14395,7 +14452,7 @@
             </p:txBody>
           </p:sp>
         </mc:Choice>
-        <mc:Fallback xmlns="">
+        <mc:Fallback>
           <p:sp>
             <p:nvSpPr>
               <p:cNvPr id="183" name="CasellaDiTesto 182"/>
@@ -14416,6 +14473,1284 @@
                 <a:blip r:embed="rId25"/>
                 <a:stretch>
                   <a:fillRect b="-2830"/>
+                </a:stretch>
+              </a:blipFill>
+            </p:spPr>
+            <p:txBody>
+              <a:bodyPr/>
+              <a:lstStyle/>
+              <a:p>
+                <a:r>
+                  <a:rPr lang="it-IT">
+                    <a:noFill/>
+                  </a:rPr>
+                  <a:t> </a:t>
+                </a:r>
+              </a:p>
+            </p:txBody>
+          </p:sp>
+        </mc:Fallback>
+      </mc:AlternateContent>
+      <p:cxnSp>
+        <p:nvCxnSpPr>
+          <p:cNvPr id="4" name="Connettore 7 3"/>
+          <p:cNvCxnSpPr>
+            <a:stCxn id="25" idx="3"/>
+            <a:endCxn id="24" idx="5"/>
+          </p:cNvCxnSpPr>
+          <p:nvPr/>
+        </p:nvCxnSpPr>
+        <p:spPr>
+          <a:xfrm rot="5400000" flipH="1">
+            <a:off x="9477495" y="2917143"/>
+            <a:ext cx="589" cy="1696370"/>
+          </a:xfrm>
+          <a:prstGeom prst="curvedConnector3">
+            <a:avLst>
+              <a:gd name="adj1" fmla="val -59596265"/>
+            </a:avLst>
+          </a:prstGeom>
+          <a:ln>
+            <a:solidFill>
+              <a:schemeClr val="tx1"/>
+            </a:solidFill>
+            <a:tailEnd type="triangle"/>
+          </a:ln>
+        </p:spPr>
+        <p:style>
+          <a:lnRef idx="1">
+            <a:schemeClr val="accent1"/>
+          </a:lnRef>
+          <a:fillRef idx="0">
+            <a:schemeClr val="accent1"/>
+          </a:fillRef>
+          <a:effectRef idx="0">
+            <a:schemeClr val="accent1"/>
+          </a:effectRef>
+          <a:fontRef idx="minor">
+            <a:schemeClr val="tx1"/>
+          </a:fontRef>
+        </p:style>
+      </p:cxnSp>
+      <mc:AlternateContent xmlns:mc="http://schemas.openxmlformats.org/markup-compatibility/2006">
+        <mc:Choice xmlns:a14="http://schemas.microsoft.com/office/drawing/2010/main" Requires="a14">
+          <p:sp>
+            <p:nvSpPr>
+              <p:cNvPr id="72" name="CasellaDiTesto 71"/>
+              <p:cNvSpPr txBox="1"/>
+              <p:nvPr/>
+            </p:nvSpPr>
+            <p:spPr>
+              <a:xfrm>
+                <a:off x="8186300" y="3821715"/>
+                <a:ext cx="2621316" cy="242695"/>
+              </a:xfrm>
+              <a:prstGeom prst="rect">
+                <a:avLst/>
+              </a:prstGeom>
+              <a:noFill/>
+            </p:spPr>
+            <p:txBody>
+              <a:bodyPr wrap="square" rtlCol="0">
+                <a:spAutoFit/>
+              </a:bodyPr>
+              <a:lstStyle/>
+              <a:p>
+                <a:pPr/>
+                <a14:m>
+                  <m:oMathPara xmlns:m="http://schemas.openxmlformats.org/officeDocument/2006/math">
+                    <m:oMathParaPr>
+                      <m:jc m:val="centerGroup"/>
+                    </m:oMathParaPr>
+                    <m:oMath xmlns:m="http://schemas.openxmlformats.org/officeDocument/2006/math">
+                      <m:r>
+                        <a:rPr lang="it-IT" sz="1000" b="0" i="1" dirty="0" smtClean="0">
+                          <a:latin typeface="Cambria Math" panose="02040503050406030204" pitchFamily="18" charset="0"/>
+                        </a:rPr>
+                        <m:t>𝑅𝑒𝑠𝑡𝑎𝑟𝑡𝑆</m:t>
+                      </m:r>
+                      <m:r>
+                        <a:rPr lang="it-IT" sz="1000" b="0" i="1" dirty="0" smtClean="0">
+                          <a:latin typeface="Cambria Math" panose="02040503050406030204" pitchFamily="18" charset="0"/>
+                        </a:rPr>
+                        <m:t>/</m:t>
+                      </m:r>
+                      <m:r>
+                        <a:rPr lang="it-IT" sz="1000" b="0" i="1" dirty="0" smtClean="0">
+                          <a:latin typeface="Cambria Math" panose="02040503050406030204" pitchFamily="18" charset="0"/>
+                        </a:rPr>
+                        <m:t>𝑅𝑒𝑠𝑡𝑎𝑟𝑡𝐴</m:t>
+                      </m:r>
+                    </m:oMath>
+                  </m:oMathPara>
+                </a14:m>
+                <a:endParaRPr lang="it-IT" sz="1000" baseline="-25000" dirty="0"/>
+              </a:p>
+            </p:txBody>
+          </p:sp>
+        </mc:Choice>
+        <mc:Fallback>
+          <p:sp>
+            <p:nvSpPr>
+              <p:cNvPr id="72" name="CasellaDiTesto 71"/>
+              <p:cNvSpPr txBox="1">
+                <a:spLocks noRot="1" noChangeAspect="1" noMove="1" noResize="1" noEditPoints="1" noAdjustHandles="1" noChangeArrowheads="1" noChangeShapeType="1" noTextEdit="1"/>
+              </p:cNvSpPr>
+              <p:nvPr/>
+            </p:nvSpPr>
+            <p:spPr>
+              <a:xfrm>
+                <a:off x="8186300" y="3821715"/>
+                <a:ext cx="2621316" cy="242695"/>
+              </a:xfrm>
+              <a:prstGeom prst="rect">
+                <a:avLst/>
+              </a:prstGeom>
+              <a:blipFill>
+                <a:blip r:embed="rId26"/>
+                <a:stretch>
+                  <a:fillRect b="-2500"/>
+                </a:stretch>
+              </a:blipFill>
+            </p:spPr>
+            <p:txBody>
+              <a:bodyPr/>
+              <a:lstStyle/>
+              <a:p>
+                <a:r>
+                  <a:rPr lang="it-IT">
+                    <a:noFill/>
+                  </a:rPr>
+                  <a:t> </a:t>
+                </a:r>
+              </a:p>
+            </p:txBody>
+          </p:sp>
+        </mc:Fallback>
+      </mc:AlternateContent>
+      <p:cxnSp>
+        <p:nvCxnSpPr>
+          <p:cNvPr id="73" name="Connettore 2 72"/>
+          <p:cNvCxnSpPr/>
+          <p:nvPr/>
+        </p:nvCxnSpPr>
+        <p:spPr>
+          <a:xfrm flipH="1">
+            <a:off x="5678803" y="4531852"/>
+            <a:ext cx="954754" cy="0"/>
+          </a:xfrm>
+          <a:prstGeom prst="straightConnector1">
+            <a:avLst/>
+          </a:prstGeom>
+          <a:ln>
+            <a:solidFill>
+              <a:schemeClr val="tx1"/>
+            </a:solidFill>
+            <a:headEnd type="diamond"/>
+            <a:tailEnd type="triangle"/>
+          </a:ln>
+        </p:spPr>
+        <p:style>
+          <a:lnRef idx="1">
+            <a:schemeClr val="accent1"/>
+          </a:lnRef>
+          <a:fillRef idx="0">
+            <a:schemeClr val="accent1"/>
+          </a:fillRef>
+          <a:effectRef idx="0">
+            <a:schemeClr val="accent1"/>
+          </a:effectRef>
+          <a:fontRef idx="minor">
+            <a:schemeClr val="tx1"/>
+          </a:fontRef>
+        </p:style>
+      </p:cxnSp>
+      <mc:AlternateContent xmlns:mc="http://schemas.openxmlformats.org/markup-compatibility/2006">
+        <mc:Choice xmlns:a14="http://schemas.microsoft.com/office/drawing/2010/main" Requires="a14">
+          <p:sp>
+            <p:nvSpPr>
+              <p:cNvPr id="77" name="CasellaDiTesto 76"/>
+              <p:cNvSpPr txBox="1"/>
+              <p:nvPr/>
+            </p:nvSpPr>
+            <p:spPr>
+              <a:xfrm>
+                <a:off x="4823901" y="4268206"/>
+                <a:ext cx="2621316" cy="242695"/>
+              </a:xfrm>
+              <a:prstGeom prst="rect">
+                <a:avLst/>
+              </a:prstGeom>
+              <a:noFill/>
+            </p:spPr>
+            <p:txBody>
+              <a:bodyPr wrap="square" rtlCol="0">
+                <a:spAutoFit/>
+              </a:bodyPr>
+              <a:lstStyle/>
+              <a:p>
+                <a:pPr/>
+                <a14:m>
+                  <m:oMathPara xmlns:m="http://schemas.openxmlformats.org/officeDocument/2006/math">
+                    <m:oMathParaPr>
+                      <m:jc m:val="centerGroup"/>
+                    </m:oMathParaPr>
+                    <m:oMath xmlns:m="http://schemas.openxmlformats.org/officeDocument/2006/math">
+                      <m:r>
+                        <a:rPr lang="it-IT" sz="1000" b="0" i="1" dirty="0" smtClean="0">
+                          <a:latin typeface="Cambria Math" panose="02040503050406030204" pitchFamily="18" charset="0"/>
+                        </a:rPr>
+                        <m:t>𝑅𝑒𝑠𝑡𝑎𝑟𝑡𝐴</m:t>
+                      </m:r>
+                    </m:oMath>
+                  </m:oMathPara>
+                </a14:m>
+                <a:endParaRPr lang="it-IT" sz="1000" baseline="-25000" dirty="0"/>
+              </a:p>
+            </p:txBody>
+          </p:sp>
+        </mc:Choice>
+        <mc:Fallback>
+          <p:sp>
+            <p:nvSpPr>
+              <p:cNvPr id="77" name="CasellaDiTesto 76"/>
+              <p:cNvSpPr txBox="1">
+                <a:spLocks noRot="1" noChangeAspect="1" noMove="1" noResize="1" noEditPoints="1" noAdjustHandles="1" noChangeArrowheads="1" noChangeShapeType="1" noTextEdit="1"/>
+              </p:cNvSpPr>
+              <p:nvPr/>
+            </p:nvSpPr>
+            <p:spPr>
+              <a:xfrm>
+                <a:off x="4823901" y="4268206"/>
+                <a:ext cx="2621316" cy="242695"/>
+              </a:xfrm>
+              <a:prstGeom prst="rect">
+                <a:avLst/>
+              </a:prstGeom>
+              <a:blipFill>
+                <a:blip r:embed="rId27"/>
+                <a:stretch>
+                  <a:fillRect/>
+                </a:stretch>
+              </a:blipFill>
+            </p:spPr>
+            <p:txBody>
+              <a:bodyPr/>
+              <a:lstStyle/>
+              <a:p>
+                <a:r>
+                  <a:rPr lang="it-IT">
+                    <a:noFill/>
+                  </a:rPr>
+                  <a:t> </a:t>
+                </a:r>
+              </a:p>
+            </p:txBody>
+          </p:sp>
+        </mc:Fallback>
+      </mc:AlternateContent>
+      <p:cxnSp>
+        <p:nvCxnSpPr>
+          <p:cNvPr id="78" name="Connettore diritto 77"/>
+          <p:cNvCxnSpPr/>
+          <p:nvPr/>
+        </p:nvCxnSpPr>
+        <p:spPr>
+          <a:xfrm>
+            <a:off x="226243" y="4561796"/>
+            <a:ext cx="147182" cy="2"/>
+          </a:xfrm>
+          <a:prstGeom prst="line">
+            <a:avLst/>
+          </a:prstGeom>
+          <a:ln>
+            <a:solidFill>
+              <a:schemeClr val="tx1"/>
+            </a:solidFill>
+            <a:headEnd type="diamond"/>
+          </a:ln>
+        </p:spPr>
+        <p:style>
+          <a:lnRef idx="1">
+            <a:schemeClr val="accent1"/>
+          </a:lnRef>
+          <a:fillRef idx="0">
+            <a:schemeClr val="accent1"/>
+          </a:fillRef>
+          <a:effectRef idx="0">
+            <a:schemeClr val="accent1"/>
+          </a:effectRef>
+          <a:fontRef idx="minor">
+            <a:schemeClr val="tx1"/>
+          </a:fontRef>
+        </p:style>
+      </p:cxnSp>
+      <p:cxnSp>
+        <p:nvCxnSpPr>
+          <p:cNvPr id="79" name="Connettore 4 78"/>
+          <p:cNvCxnSpPr/>
+          <p:nvPr/>
+        </p:nvCxnSpPr>
+        <p:spPr>
+          <a:xfrm rot="5400000" flipH="1" flipV="1">
+            <a:off x="-88400" y="3768247"/>
+            <a:ext cx="1255379" cy="331729"/>
+          </a:xfrm>
+          <a:prstGeom prst="bentConnector2">
+            <a:avLst/>
+          </a:prstGeom>
+          <a:ln>
+            <a:solidFill>
+              <a:schemeClr val="tx1"/>
+            </a:solidFill>
+            <a:tailEnd type="triangle"/>
+          </a:ln>
+        </p:spPr>
+        <p:style>
+          <a:lnRef idx="1">
+            <a:schemeClr val="accent1"/>
+          </a:lnRef>
+          <a:fillRef idx="0">
+            <a:schemeClr val="accent1"/>
+          </a:fillRef>
+          <a:effectRef idx="0">
+            <a:schemeClr val="accent1"/>
+          </a:effectRef>
+          <a:fontRef idx="minor">
+            <a:schemeClr val="tx1"/>
+          </a:fontRef>
+        </p:style>
+      </p:cxnSp>
+      <p:cxnSp>
+        <p:nvCxnSpPr>
+          <p:cNvPr id="80" name="Connettore 4 79"/>
+          <p:cNvCxnSpPr/>
+          <p:nvPr/>
+        </p:nvCxnSpPr>
+        <p:spPr>
+          <a:xfrm rot="16200000" flipH="1">
+            <a:off x="-141443" y="5076664"/>
+            <a:ext cx="1361464" cy="331729"/>
+          </a:xfrm>
+          <a:prstGeom prst="bentConnector2">
+            <a:avLst/>
+          </a:prstGeom>
+          <a:ln>
+            <a:solidFill>
+              <a:schemeClr val="tx1"/>
+            </a:solidFill>
+            <a:tailEnd type="triangle"/>
+          </a:ln>
+        </p:spPr>
+        <p:style>
+          <a:lnRef idx="1">
+            <a:schemeClr val="accent1"/>
+          </a:lnRef>
+          <a:fillRef idx="0">
+            <a:schemeClr val="accent1"/>
+          </a:fillRef>
+          <a:effectRef idx="0">
+            <a:schemeClr val="accent1"/>
+          </a:effectRef>
+          <a:fontRef idx="minor">
+            <a:schemeClr val="tx1"/>
+          </a:fontRef>
+        </p:style>
+      </p:cxnSp>
+      <mc:AlternateContent xmlns:mc="http://schemas.openxmlformats.org/markup-compatibility/2006">
+        <mc:Choice xmlns:a14="http://schemas.microsoft.com/office/drawing/2010/main" Requires="a14">
+          <p:sp>
+            <p:nvSpPr>
+              <p:cNvPr id="81" name="CasellaDiTesto 80"/>
+              <p:cNvSpPr txBox="1"/>
+              <p:nvPr/>
+            </p:nvSpPr>
+            <p:spPr>
+              <a:xfrm>
+                <a:off x="-962090" y="4339941"/>
+                <a:ext cx="2621316" cy="227626"/>
+              </a:xfrm>
+              <a:prstGeom prst="rect">
+                <a:avLst/>
+              </a:prstGeom>
+              <a:noFill/>
+            </p:spPr>
+            <p:txBody>
+              <a:bodyPr wrap="square" rtlCol="0">
+                <a:spAutoFit/>
+              </a:bodyPr>
+              <a:lstStyle/>
+              <a:p>
+                <a:pPr/>
+                <a14:m>
+                  <m:oMathPara xmlns:m="http://schemas.openxmlformats.org/officeDocument/2006/math">
+                    <m:oMathParaPr>
+                      <m:jc m:val="centerGroup"/>
+                    </m:oMathParaPr>
+                    <m:oMath xmlns:m="http://schemas.openxmlformats.org/officeDocument/2006/math">
+                      <m:r>
+                        <a:rPr lang="it-IT" sz="900" b="0" i="1" dirty="0" smtClean="0">
+                          <a:latin typeface="Cambria Math" panose="02040503050406030204" pitchFamily="18" charset="0"/>
+                        </a:rPr>
+                        <m:t>𝑅𝑒𝑠𝑡𝑎𝑟𝑡𝐴</m:t>
+                      </m:r>
+                    </m:oMath>
+                  </m:oMathPara>
+                </a14:m>
+                <a:endParaRPr lang="it-IT" sz="900" baseline="-25000" dirty="0"/>
+              </a:p>
+            </p:txBody>
+          </p:sp>
+        </mc:Choice>
+        <mc:Fallback>
+          <p:sp>
+            <p:nvSpPr>
+              <p:cNvPr id="81" name="CasellaDiTesto 80"/>
+              <p:cNvSpPr txBox="1">
+                <a:spLocks noRot="1" noChangeAspect="1" noMove="1" noResize="1" noEditPoints="1" noAdjustHandles="1" noChangeArrowheads="1" noChangeShapeType="1" noTextEdit="1"/>
+              </p:cNvSpPr>
+              <p:nvPr/>
+            </p:nvSpPr>
+            <p:spPr>
+              <a:xfrm>
+                <a:off x="-962090" y="4339941"/>
+                <a:ext cx="2621316" cy="227626"/>
+              </a:xfrm>
+              <a:prstGeom prst="rect">
+                <a:avLst/>
+              </a:prstGeom>
+              <a:blipFill>
+                <a:blip r:embed="rId28"/>
+                <a:stretch>
+                  <a:fillRect/>
+                </a:stretch>
+              </a:blipFill>
+            </p:spPr>
+            <p:txBody>
+              <a:bodyPr/>
+              <a:lstStyle/>
+              <a:p>
+                <a:r>
+                  <a:rPr lang="it-IT">
+                    <a:noFill/>
+                  </a:rPr>
+                  <a:t> </a:t>
+                </a:r>
+              </a:p>
+            </p:txBody>
+          </p:sp>
+        </mc:Fallback>
+      </mc:AlternateContent>
+      <p:cxnSp>
+        <p:nvCxnSpPr>
+          <p:cNvPr id="86" name="Connettore 7 85"/>
+          <p:cNvCxnSpPr>
+            <a:stCxn id="30" idx="3"/>
+            <a:endCxn id="29" idx="5"/>
+          </p:cNvCxnSpPr>
+          <p:nvPr/>
+        </p:nvCxnSpPr>
+        <p:spPr>
+          <a:xfrm rot="5400000" flipH="1">
+            <a:off x="3101363" y="2008429"/>
+            <a:ext cx="527" cy="1518272"/>
+          </a:xfrm>
+          <a:prstGeom prst="curvedConnector3">
+            <a:avLst>
+              <a:gd name="adj1" fmla="val -64168691"/>
+            </a:avLst>
+          </a:prstGeom>
+          <a:ln>
+            <a:solidFill>
+              <a:schemeClr val="tx1"/>
+            </a:solidFill>
+            <a:tailEnd type="triangle"/>
+          </a:ln>
+        </p:spPr>
+        <p:style>
+          <a:lnRef idx="1">
+            <a:schemeClr val="accent1"/>
+          </a:lnRef>
+          <a:fillRef idx="0">
+            <a:schemeClr val="accent1"/>
+          </a:fillRef>
+          <a:effectRef idx="0">
+            <a:schemeClr val="accent1"/>
+          </a:effectRef>
+          <a:fontRef idx="minor">
+            <a:schemeClr val="tx1"/>
+          </a:fontRef>
+        </p:style>
+      </p:cxnSp>
+      <mc:AlternateContent xmlns:mc="http://schemas.openxmlformats.org/markup-compatibility/2006">
+        <mc:Choice xmlns:a14="http://schemas.microsoft.com/office/drawing/2010/main" Requires="a14">
+          <p:sp>
+            <p:nvSpPr>
+              <p:cNvPr id="90" name="CasellaDiTesto 89"/>
+              <p:cNvSpPr txBox="1"/>
+              <p:nvPr/>
+            </p:nvSpPr>
+            <p:spPr>
+              <a:xfrm>
+                <a:off x="1982518" y="2865842"/>
+                <a:ext cx="2346108" cy="242695"/>
+              </a:xfrm>
+              <a:prstGeom prst="rect">
+                <a:avLst/>
+              </a:prstGeom>
+              <a:noFill/>
+            </p:spPr>
+            <p:txBody>
+              <a:bodyPr wrap="square" rtlCol="0">
+                <a:spAutoFit/>
+              </a:bodyPr>
+              <a:lstStyle/>
+              <a:p>
+                <a:pPr/>
+                <a14:m>
+                  <m:oMathPara xmlns:m="http://schemas.openxmlformats.org/officeDocument/2006/math">
+                    <m:oMathParaPr>
+                      <m:jc m:val="centerGroup"/>
+                    </m:oMathParaPr>
+                    <m:oMath xmlns:m="http://schemas.openxmlformats.org/officeDocument/2006/math">
+                      <m:r>
+                        <a:rPr lang="it-IT" sz="1000" b="0" i="1" dirty="0" smtClean="0">
+                          <a:latin typeface="Cambria Math" panose="02040503050406030204" pitchFamily="18" charset="0"/>
+                        </a:rPr>
+                        <m:t>𝑅𝑒𝑠𝑡𝑎𝑟𝑡𝐴</m:t>
+                      </m:r>
+                      <m:r>
+                        <a:rPr lang="it-IT" sz="1000" b="0" i="1" dirty="0" smtClean="0">
+                          <a:latin typeface="Cambria Math" panose="02040503050406030204" pitchFamily="18" charset="0"/>
+                        </a:rPr>
+                        <m:t>/</m:t>
+                      </m:r>
+                    </m:oMath>
+                  </m:oMathPara>
+                </a14:m>
+                <a:endParaRPr lang="it-IT" sz="1000" baseline="-25000" dirty="0"/>
+              </a:p>
+            </p:txBody>
+          </p:sp>
+        </mc:Choice>
+        <mc:Fallback>
+          <p:sp>
+            <p:nvSpPr>
+              <p:cNvPr id="90" name="CasellaDiTesto 89"/>
+              <p:cNvSpPr txBox="1">
+                <a:spLocks noRot="1" noChangeAspect="1" noMove="1" noResize="1" noEditPoints="1" noAdjustHandles="1" noChangeArrowheads="1" noChangeShapeType="1" noTextEdit="1"/>
+              </p:cNvSpPr>
+              <p:nvPr/>
+            </p:nvSpPr>
+            <p:spPr>
+              <a:xfrm>
+                <a:off x="1982518" y="2865842"/>
+                <a:ext cx="2346108" cy="242695"/>
+              </a:xfrm>
+              <a:prstGeom prst="rect">
+                <a:avLst/>
+              </a:prstGeom>
+              <a:blipFill>
+                <a:blip r:embed="rId29"/>
+                <a:stretch>
+                  <a:fillRect b="-5000"/>
+                </a:stretch>
+              </a:blipFill>
+            </p:spPr>
+            <p:txBody>
+              <a:bodyPr/>
+              <a:lstStyle/>
+              <a:p>
+                <a:r>
+                  <a:rPr lang="it-IT">
+                    <a:noFill/>
+                  </a:rPr>
+                  <a:t> </a:t>
+                </a:r>
+              </a:p>
+            </p:txBody>
+          </p:sp>
+        </mc:Fallback>
+      </mc:AlternateContent>
+      <mc:AlternateContent xmlns:mc="http://schemas.openxmlformats.org/markup-compatibility/2006">
+        <mc:Choice xmlns:a14="http://schemas.microsoft.com/office/drawing/2010/main" Requires="a14">
+          <p:sp>
+            <p:nvSpPr>
+              <p:cNvPr id="91" name="CasellaDiTesto 90"/>
+              <p:cNvSpPr txBox="1"/>
+              <p:nvPr/>
+            </p:nvSpPr>
+            <p:spPr>
+              <a:xfrm>
+                <a:off x="2127401" y="3063060"/>
+                <a:ext cx="1939222" cy="956865"/>
+              </a:xfrm>
+              <a:prstGeom prst="rect">
+                <a:avLst/>
+              </a:prstGeom>
+              <a:noFill/>
+            </p:spPr>
+            <p:txBody>
+              <a:bodyPr wrap="square" rtlCol="0">
+                <a:spAutoFit/>
+              </a:bodyPr>
+              <a:lstStyle/>
+              <a:p>
+                <a:pPr/>
+                <a14:m>
+                  <m:oMathPara xmlns:m="http://schemas.openxmlformats.org/officeDocument/2006/math">
+                    <m:oMathParaPr>
+                      <m:jc m:val="centerGroup"/>
+                    </m:oMathParaPr>
+                    <m:oMath xmlns:m="http://schemas.openxmlformats.org/officeDocument/2006/math">
+                      <m:r>
+                        <a:rPr lang="it-IT" sz="1000" b="0" i="1" dirty="0" smtClean="0">
+                          <a:latin typeface="Cambria Math" panose="02040503050406030204" pitchFamily="18" charset="0"/>
+                        </a:rPr>
+                        <m:t>𝑦</m:t>
+                      </m:r>
+                      <m:r>
+                        <a:rPr lang="it-IT" sz="1000" i="1" baseline="-25000" dirty="0" err="1" smtClean="0">
+                          <a:latin typeface="Cambria Math" panose="02040503050406030204" pitchFamily="18" charset="0"/>
+                        </a:rPr>
+                        <m:t>𝑎</m:t>
+                      </m:r>
+                      <m:r>
+                        <a:rPr lang="it-IT" sz="1000" i="1" dirty="0" smtClean="0">
+                          <a:latin typeface="Cambria Math" panose="02040503050406030204" pitchFamily="18" charset="0"/>
+                        </a:rPr>
+                        <m:t>=</m:t>
+                      </m:r>
+                      <m:sSup>
+                        <m:sSupPr>
+                          <m:ctrlPr>
+                            <a:rPr lang="it-IT" sz="1000" b="0" i="1" dirty="0" smtClean="0">
+                              <a:latin typeface="Cambria Math" panose="02040503050406030204" pitchFamily="18" charset="0"/>
+                            </a:rPr>
+                          </m:ctrlPr>
+                        </m:sSupPr>
+                        <m:e>
+                          <m:r>
+                            <a:rPr lang="it-IT" sz="1000" b="0" i="1" dirty="0" smtClean="0">
+                              <a:latin typeface="Cambria Math" panose="02040503050406030204" pitchFamily="18" charset="0"/>
+                            </a:rPr>
+                            <m:t>𝑦</m:t>
+                          </m:r>
+                        </m:e>
+                        <m:sup>
+                          <m:r>
+                            <a:rPr lang="it-IT" sz="1000" b="0" i="1" dirty="0" smtClean="0">
+                              <a:latin typeface="Cambria Math" panose="02040503050406030204" pitchFamily="18" charset="0"/>
+                            </a:rPr>
+                            <m:t>𝑖</m:t>
+                          </m:r>
+                        </m:sup>
+                      </m:sSup>
+                    </m:oMath>
+                  </m:oMathPara>
+                </a14:m>
+                <a:endParaRPr lang="it-IT" sz="1000" b="0" i="1" dirty="0" smtClean="0">
+                  <a:latin typeface="Cambria Math" panose="02040503050406030204" pitchFamily="18" charset="0"/>
+                </a:endParaRPr>
+              </a:p>
+              <a:p>
+                <a:pPr/>
+                <a14:m>
+                  <m:oMathPara xmlns:m="http://schemas.openxmlformats.org/officeDocument/2006/math">
+                    <m:oMathParaPr>
+                      <m:jc m:val="centerGroup"/>
+                    </m:oMathParaPr>
+                    <m:oMath xmlns:m="http://schemas.openxmlformats.org/officeDocument/2006/math">
+                      <m:r>
+                        <a:rPr lang="it-IT" sz="1000" b="0" i="1" dirty="0" smtClean="0">
+                          <a:latin typeface="Cambria Math" panose="02040503050406030204" pitchFamily="18" charset="0"/>
+                        </a:rPr>
+                        <m:t>𝑥</m:t>
+                      </m:r>
+                      <m:r>
+                        <a:rPr lang="it-IT" sz="1000" i="1" baseline="-25000" dirty="0" err="1" smtClean="0">
+                          <a:latin typeface="Cambria Math" panose="02040503050406030204" pitchFamily="18" charset="0"/>
+                        </a:rPr>
+                        <m:t>𝑎</m:t>
+                      </m:r>
+                      <m:r>
+                        <a:rPr lang="it-IT" sz="1000" i="1" dirty="0" smtClean="0">
+                          <a:latin typeface="Cambria Math" panose="02040503050406030204" pitchFamily="18" charset="0"/>
+                        </a:rPr>
+                        <m:t>=</m:t>
+                      </m:r>
+                      <m:sSup>
+                        <m:sSupPr>
+                          <m:ctrlPr>
+                            <a:rPr lang="it-IT" sz="1000" i="1" dirty="0" smtClean="0">
+                              <a:latin typeface="Cambria Math" panose="02040503050406030204" pitchFamily="18" charset="0"/>
+                            </a:rPr>
+                          </m:ctrlPr>
+                        </m:sSupPr>
+                        <m:e>
+                          <m:r>
+                            <a:rPr lang="it-IT" sz="1000" b="0" i="1" dirty="0" smtClean="0">
+                              <a:latin typeface="Cambria Math" panose="02040503050406030204" pitchFamily="18" charset="0"/>
+                            </a:rPr>
+                            <m:t>𝑥</m:t>
+                          </m:r>
+                        </m:e>
+                        <m:sup>
+                          <m:r>
+                            <a:rPr lang="it-IT" sz="1000" b="0" i="1" dirty="0" smtClean="0">
+                              <a:latin typeface="Cambria Math" panose="02040503050406030204" pitchFamily="18" charset="0"/>
+                            </a:rPr>
+                            <m:t>𝑖</m:t>
+                          </m:r>
+                        </m:sup>
+                      </m:sSup>
+                    </m:oMath>
+                  </m:oMathPara>
+                </a14:m>
+                <a:endParaRPr lang="it-IT" sz="1000" b="0" i="1" dirty="0" smtClean="0">
+                  <a:latin typeface="Cambria Math" panose="02040503050406030204" pitchFamily="18" charset="0"/>
+                </a:endParaRPr>
+              </a:p>
+              <a:p>
+                <a14:m>
+                  <m:oMathPara xmlns:m="http://schemas.openxmlformats.org/officeDocument/2006/math">
+                    <m:oMathParaPr>
+                      <m:jc m:val="centerGroup"/>
+                    </m:oMathParaPr>
+                    <m:oMath xmlns:m="http://schemas.openxmlformats.org/officeDocument/2006/math">
+                      <m:r>
+                        <a:rPr lang="it-IT" sz="1000" b="0" i="1" dirty="0" smtClean="0">
+                          <a:latin typeface="Cambria Math" panose="02040503050406030204" pitchFamily="18" charset="0"/>
+                          <a:ea typeface="Cambria Math" panose="02040503050406030204" pitchFamily="18" charset="0"/>
+                        </a:rPr>
+                        <m:t>𝛾</m:t>
+                      </m:r>
+                      <m:r>
+                        <a:rPr lang="it-IT" sz="1000" b="0" i="1" dirty="0" smtClean="0">
+                          <a:latin typeface="Cambria Math" panose="02040503050406030204" pitchFamily="18" charset="0"/>
+                          <a:ea typeface="Cambria Math" panose="02040503050406030204" pitchFamily="18" charset="0"/>
+                        </a:rPr>
+                        <m:t>=</m:t>
+                      </m:r>
+                      <m:sSup>
+                        <m:sSupPr>
+                          <m:ctrlPr>
+                            <a:rPr lang="it-IT" sz="1000" b="0" i="1" dirty="0" smtClean="0">
+                              <a:latin typeface="Cambria Math" panose="02040503050406030204" pitchFamily="18" charset="0"/>
+                            </a:rPr>
+                          </m:ctrlPr>
+                        </m:sSupPr>
+                        <m:e>
+                          <m:r>
+                            <a:rPr lang="it-IT" sz="1000" b="0" i="1" dirty="0" smtClean="0">
+                              <a:latin typeface="Cambria Math" panose="02040503050406030204" pitchFamily="18" charset="0"/>
+                              <a:ea typeface="Cambria Math" panose="02040503050406030204" pitchFamily="18" charset="0"/>
+                            </a:rPr>
+                            <m:t>𝛾</m:t>
+                          </m:r>
+                        </m:e>
+                        <m:sup>
+                          <m:r>
+                            <a:rPr lang="it-IT" sz="1000" b="0" i="1" dirty="0" smtClean="0">
+                              <a:latin typeface="Cambria Math" panose="02040503050406030204" pitchFamily="18" charset="0"/>
+                            </a:rPr>
+                            <m:t>𝑖</m:t>
+                          </m:r>
+                        </m:sup>
+                      </m:sSup>
+                      <m:r>
+                        <a:rPr lang="it-IT" sz="1000" i="1" baseline="-25000" dirty="0" smtClean="0">
+                          <a:latin typeface="Cambria Math" panose="02040503050406030204" pitchFamily="18" charset="0"/>
+                        </a:rPr>
+                        <m:t> </m:t>
+                      </m:r>
+                    </m:oMath>
+                  </m:oMathPara>
+                </a14:m>
+                <a:endParaRPr lang="it-IT" sz="1000" i="1" baseline="-25000" dirty="0" smtClean="0">
+                  <a:latin typeface="Cambria Math" panose="02040503050406030204" pitchFamily="18" charset="0"/>
+                </a:endParaRPr>
+              </a:p>
+              <a:p>
+                <a14:m>
+                  <m:oMathPara xmlns:m="http://schemas.openxmlformats.org/officeDocument/2006/math">
+                    <m:oMathParaPr>
+                      <m:jc m:val="centerGroup"/>
+                    </m:oMathParaPr>
+                    <m:oMath xmlns:m="http://schemas.openxmlformats.org/officeDocument/2006/math">
+                      <m:r>
+                        <a:rPr lang="it-IT" sz="1000" b="0" i="1" dirty="0" smtClean="0">
+                          <a:latin typeface="Cambria Math" panose="02040503050406030204" pitchFamily="18" charset="0"/>
+                          <a:ea typeface="Cambria Math" panose="02040503050406030204" pitchFamily="18" charset="0"/>
+                        </a:rPr>
+                        <m:t>𝑝</m:t>
+                      </m:r>
+                      <m:r>
+                        <a:rPr lang="it-IT" sz="1000" i="1" dirty="0">
+                          <a:latin typeface="Cambria Math" panose="02040503050406030204" pitchFamily="18" charset="0"/>
+                          <a:ea typeface="Cambria Math" panose="02040503050406030204" pitchFamily="18" charset="0"/>
+                        </a:rPr>
+                        <m:t>=</m:t>
+                      </m:r>
+                      <m:r>
+                        <a:rPr lang="it-IT" sz="1000" b="0" i="1" dirty="0" smtClean="0">
+                          <a:latin typeface="Cambria Math" panose="02040503050406030204" pitchFamily="18" charset="0"/>
+                          <a:ea typeface="Cambria Math" panose="02040503050406030204" pitchFamily="18" charset="0"/>
+                        </a:rPr>
+                        <m:t>0</m:t>
+                      </m:r>
+                    </m:oMath>
+                  </m:oMathPara>
+                </a14:m>
+                <a:endParaRPr lang="it-IT" sz="1000" baseline="-25000" dirty="0"/>
+              </a:p>
+              <a:p>
+                <a:pPr/>
+                <a:endParaRPr lang="it-IT" sz="1000" baseline="-25000" dirty="0" smtClean="0"/>
+              </a:p>
+              <a:p>
+                <a:pPr/>
+                <a:endParaRPr lang="it-IT" sz="1000" baseline="-25000" dirty="0"/>
+              </a:p>
+            </p:txBody>
+          </p:sp>
+        </mc:Choice>
+        <mc:Fallback>
+          <p:sp>
+            <p:nvSpPr>
+              <p:cNvPr id="91" name="CasellaDiTesto 90"/>
+              <p:cNvSpPr txBox="1">
+                <a:spLocks noRot="1" noChangeAspect="1" noMove="1" noResize="1" noEditPoints="1" noAdjustHandles="1" noChangeArrowheads="1" noChangeShapeType="1" noTextEdit="1"/>
+              </p:cNvSpPr>
+              <p:nvPr/>
+            </p:nvSpPr>
+            <p:spPr>
+              <a:xfrm>
+                <a:off x="2127401" y="3063060"/>
+                <a:ext cx="1939222" cy="956865"/>
+              </a:xfrm>
+              <a:prstGeom prst="rect">
+                <a:avLst/>
+              </a:prstGeom>
+              <a:blipFill>
+                <a:blip r:embed="rId30"/>
+                <a:stretch>
+                  <a:fillRect/>
+                </a:stretch>
+              </a:blipFill>
+            </p:spPr>
+            <p:txBody>
+              <a:bodyPr/>
+              <a:lstStyle/>
+              <a:p>
+                <a:r>
+                  <a:rPr lang="it-IT">
+                    <a:noFill/>
+                  </a:rPr>
+                  <a:t> </a:t>
+                </a:r>
+              </a:p>
+            </p:txBody>
+          </p:sp>
+        </mc:Fallback>
+      </mc:AlternateContent>
+      <p:cxnSp>
+        <p:nvCxnSpPr>
+          <p:cNvPr id="93" name="Connettore 7 92"/>
+          <p:cNvCxnSpPr/>
+          <p:nvPr/>
+        </p:nvCxnSpPr>
+        <p:spPr>
+          <a:xfrm rot="5400000" flipH="1">
+            <a:off x="3091237" y="4610233"/>
+            <a:ext cx="527" cy="1518272"/>
+          </a:xfrm>
+          <a:prstGeom prst="curvedConnector3">
+            <a:avLst>
+              <a:gd name="adj1" fmla="val -64168691"/>
+            </a:avLst>
+          </a:prstGeom>
+          <a:ln>
+            <a:solidFill>
+              <a:schemeClr val="tx1"/>
+            </a:solidFill>
+            <a:tailEnd type="triangle"/>
+          </a:ln>
+        </p:spPr>
+        <p:style>
+          <a:lnRef idx="1">
+            <a:schemeClr val="accent1"/>
+          </a:lnRef>
+          <a:fillRef idx="0">
+            <a:schemeClr val="accent1"/>
+          </a:fillRef>
+          <a:effectRef idx="0">
+            <a:schemeClr val="accent1"/>
+          </a:effectRef>
+          <a:fontRef idx="minor">
+            <a:schemeClr val="tx1"/>
+          </a:fontRef>
+        </p:style>
+      </p:cxnSp>
+      <mc:AlternateContent xmlns:mc="http://schemas.openxmlformats.org/markup-compatibility/2006">
+        <mc:Choice xmlns:a14="http://schemas.microsoft.com/office/drawing/2010/main" Requires="a14">
+          <p:sp>
+            <p:nvSpPr>
+              <p:cNvPr id="94" name="CasellaDiTesto 93"/>
+              <p:cNvSpPr txBox="1"/>
+              <p:nvPr/>
+            </p:nvSpPr>
+            <p:spPr>
+              <a:xfrm>
+                <a:off x="1958673" y="5466449"/>
+                <a:ext cx="2346108" cy="242695"/>
+              </a:xfrm>
+              <a:prstGeom prst="rect">
+                <a:avLst/>
+              </a:prstGeom>
+              <a:noFill/>
+            </p:spPr>
+            <p:txBody>
+              <a:bodyPr wrap="square" rtlCol="0">
+                <a:spAutoFit/>
+              </a:bodyPr>
+              <a:lstStyle/>
+              <a:p>
+                <a:pPr/>
+                <a14:m>
+                  <m:oMathPara xmlns:m="http://schemas.openxmlformats.org/officeDocument/2006/math">
+                    <m:oMathParaPr>
+                      <m:jc m:val="centerGroup"/>
+                    </m:oMathParaPr>
+                    <m:oMath xmlns:m="http://schemas.openxmlformats.org/officeDocument/2006/math">
+                      <m:r>
+                        <a:rPr lang="it-IT" sz="1000" b="0" i="1" dirty="0" smtClean="0">
+                          <a:latin typeface="Cambria Math" panose="02040503050406030204" pitchFamily="18" charset="0"/>
+                        </a:rPr>
+                        <m:t>𝑅𝑒𝑠𝑡𝑎𝑟𝑡𝐴</m:t>
+                      </m:r>
+                      <m:r>
+                        <a:rPr lang="it-IT" sz="1000" b="0" i="1" dirty="0" smtClean="0">
+                          <a:latin typeface="Cambria Math" panose="02040503050406030204" pitchFamily="18" charset="0"/>
+                        </a:rPr>
+                        <m:t>/</m:t>
+                      </m:r>
+                    </m:oMath>
+                  </m:oMathPara>
+                </a14:m>
+                <a:endParaRPr lang="it-IT" sz="1000" baseline="-25000" dirty="0"/>
+              </a:p>
+            </p:txBody>
+          </p:sp>
+        </mc:Choice>
+        <mc:Fallback>
+          <p:sp>
+            <p:nvSpPr>
+              <p:cNvPr id="94" name="CasellaDiTesto 93"/>
+              <p:cNvSpPr txBox="1">
+                <a:spLocks noRot="1" noChangeAspect="1" noMove="1" noResize="1" noEditPoints="1" noAdjustHandles="1" noChangeArrowheads="1" noChangeShapeType="1" noTextEdit="1"/>
+              </p:cNvSpPr>
+              <p:nvPr/>
+            </p:nvSpPr>
+            <p:spPr>
+              <a:xfrm>
+                <a:off x="1958673" y="5466449"/>
+                <a:ext cx="2346108" cy="242695"/>
+              </a:xfrm>
+              <a:prstGeom prst="rect">
+                <a:avLst/>
+              </a:prstGeom>
+              <a:blipFill>
+                <a:blip r:embed="rId31"/>
+                <a:stretch>
+                  <a:fillRect b="-2500"/>
+                </a:stretch>
+              </a:blipFill>
+            </p:spPr>
+            <p:txBody>
+              <a:bodyPr/>
+              <a:lstStyle/>
+              <a:p>
+                <a:r>
+                  <a:rPr lang="it-IT">
+                    <a:noFill/>
+                  </a:rPr>
+                  <a:t> </a:t>
+                </a:r>
+              </a:p>
+            </p:txBody>
+          </p:sp>
+        </mc:Fallback>
+      </mc:AlternateContent>
+      <mc:AlternateContent xmlns:mc="http://schemas.openxmlformats.org/markup-compatibility/2006">
+        <mc:Choice xmlns:a14="http://schemas.microsoft.com/office/drawing/2010/main" Requires="a14">
+          <p:sp>
+            <p:nvSpPr>
+              <p:cNvPr id="95" name="CasellaDiTesto 94"/>
+              <p:cNvSpPr txBox="1"/>
+              <p:nvPr/>
+            </p:nvSpPr>
+            <p:spPr>
+              <a:xfrm>
+                <a:off x="2162116" y="5638016"/>
+                <a:ext cx="1939222" cy="869533"/>
+              </a:xfrm>
+              <a:prstGeom prst="rect">
+                <a:avLst/>
+              </a:prstGeom>
+              <a:noFill/>
+            </p:spPr>
+            <p:txBody>
+              <a:bodyPr wrap="square" rtlCol="0">
+                <a:spAutoFit/>
+              </a:bodyPr>
+              <a:lstStyle/>
+              <a:p>
+                <a:pPr/>
+                <a14:m>
+                  <m:oMathPara xmlns:m="http://schemas.openxmlformats.org/officeDocument/2006/math">
+                    <m:oMathParaPr>
+                      <m:jc m:val="centerGroup"/>
+                    </m:oMathParaPr>
+                    <m:oMath xmlns:m="http://schemas.openxmlformats.org/officeDocument/2006/math">
+                      <m:r>
+                        <a:rPr lang="it-IT" sz="1000" b="0" i="1" dirty="0" smtClean="0">
+                          <a:latin typeface="Cambria Math" panose="02040503050406030204" pitchFamily="18" charset="0"/>
+                        </a:rPr>
+                        <m:t>𝑦</m:t>
+                      </m:r>
+                      <m:r>
+                        <a:rPr lang="it-IT" sz="1000" i="1" baseline="-25000" dirty="0" err="1" smtClean="0">
+                          <a:latin typeface="Cambria Math" panose="02040503050406030204" pitchFamily="18" charset="0"/>
+                        </a:rPr>
+                        <m:t>𝑎</m:t>
+                      </m:r>
+                      <m:r>
+                        <a:rPr lang="it-IT" sz="1000" i="1" dirty="0" smtClean="0">
+                          <a:latin typeface="Cambria Math" panose="02040503050406030204" pitchFamily="18" charset="0"/>
+                        </a:rPr>
+                        <m:t>=</m:t>
+                      </m:r>
+                      <m:sSup>
+                        <m:sSupPr>
+                          <m:ctrlPr>
+                            <a:rPr lang="it-IT" sz="1000" b="0" i="1" dirty="0" smtClean="0">
+                              <a:latin typeface="Cambria Math" panose="02040503050406030204" pitchFamily="18" charset="0"/>
+                            </a:rPr>
+                          </m:ctrlPr>
+                        </m:sSupPr>
+                        <m:e>
+                          <m:r>
+                            <a:rPr lang="it-IT" sz="1000" b="0" i="1" dirty="0" smtClean="0">
+                              <a:latin typeface="Cambria Math" panose="02040503050406030204" pitchFamily="18" charset="0"/>
+                            </a:rPr>
+                            <m:t>𝑦</m:t>
+                          </m:r>
+                        </m:e>
+                        <m:sup>
+                          <m:r>
+                            <a:rPr lang="it-IT" sz="1000" b="0" i="1" dirty="0" smtClean="0">
+                              <a:latin typeface="Cambria Math" panose="02040503050406030204" pitchFamily="18" charset="0"/>
+                            </a:rPr>
+                            <m:t>𝑖</m:t>
+                          </m:r>
+                        </m:sup>
+                      </m:sSup>
+                    </m:oMath>
+                  </m:oMathPara>
+                </a14:m>
+                <a:endParaRPr lang="it-IT" sz="1000" b="0" i="1" dirty="0" smtClean="0">
+                  <a:latin typeface="Cambria Math" panose="02040503050406030204" pitchFamily="18" charset="0"/>
+                </a:endParaRPr>
+              </a:p>
+              <a:p>
+                <a:pPr/>
+                <a14:m>
+                  <m:oMathPara xmlns:m="http://schemas.openxmlformats.org/officeDocument/2006/math">
+                    <m:oMathParaPr>
+                      <m:jc m:val="centerGroup"/>
+                    </m:oMathParaPr>
+                    <m:oMath xmlns:m="http://schemas.openxmlformats.org/officeDocument/2006/math">
+                      <m:r>
+                        <a:rPr lang="it-IT" sz="1000" b="0" i="1" dirty="0" smtClean="0">
+                          <a:latin typeface="Cambria Math" panose="02040503050406030204" pitchFamily="18" charset="0"/>
+                        </a:rPr>
+                        <m:t>𝑥</m:t>
+                      </m:r>
+                      <m:r>
+                        <a:rPr lang="it-IT" sz="1000" i="1" baseline="-25000" dirty="0" err="1" smtClean="0">
+                          <a:latin typeface="Cambria Math" panose="02040503050406030204" pitchFamily="18" charset="0"/>
+                        </a:rPr>
+                        <m:t>𝑎</m:t>
+                      </m:r>
+                      <m:r>
+                        <a:rPr lang="it-IT" sz="1000" i="1" dirty="0" smtClean="0">
+                          <a:latin typeface="Cambria Math" panose="02040503050406030204" pitchFamily="18" charset="0"/>
+                        </a:rPr>
+                        <m:t>=</m:t>
+                      </m:r>
+                      <m:sSup>
+                        <m:sSupPr>
+                          <m:ctrlPr>
+                            <a:rPr lang="it-IT" sz="1000" i="1" dirty="0" smtClean="0">
+                              <a:latin typeface="Cambria Math" panose="02040503050406030204" pitchFamily="18" charset="0"/>
+                            </a:rPr>
+                          </m:ctrlPr>
+                        </m:sSupPr>
+                        <m:e>
+                          <m:r>
+                            <a:rPr lang="it-IT" sz="1000" b="0" i="1" dirty="0" smtClean="0">
+                              <a:latin typeface="Cambria Math" panose="02040503050406030204" pitchFamily="18" charset="0"/>
+                            </a:rPr>
+                            <m:t>𝑥</m:t>
+                          </m:r>
+                        </m:e>
+                        <m:sup>
+                          <m:r>
+                            <a:rPr lang="it-IT" sz="1000" b="0" i="1" dirty="0" smtClean="0">
+                              <a:latin typeface="Cambria Math" panose="02040503050406030204" pitchFamily="18" charset="0"/>
+                            </a:rPr>
+                            <m:t>𝑖</m:t>
+                          </m:r>
+                        </m:sup>
+                      </m:sSup>
+                    </m:oMath>
+                  </m:oMathPara>
+                </a14:m>
+                <a:endParaRPr lang="it-IT" sz="1000" b="0" i="1" dirty="0" smtClean="0">
+                  <a:latin typeface="Cambria Math" panose="02040503050406030204" pitchFamily="18" charset="0"/>
+                </a:endParaRPr>
+              </a:p>
+              <a:p>
+                <a14:m>
+                  <m:oMathPara xmlns:m="http://schemas.openxmlformats.org/officeDocument/2006/math">
+                    <m:oMathParaPr>
+                      <m:jc m:val="centerGroup"/>
+                    </m:oMathParaPr>
+                    <m:oMath xmlns:m="http://schemas.openxmlformats.org/officeDocument/2006/math">
+                      <m:r>
+                        <a:rPr lang="it-IT" sz="1000" i="1" dirty="0">
+                          <a:latin typeface="Cambria Math" panose="02040503050406030204" pitchFamily="18" charset="0"/>
+                          <a:ea typeface="Cambria Math" panose="02040503050406030204" pitchFamily="18" charset="0"/>
+                        </a:rPr>
+                        <m:t>𝛾</m:t>
+                      </m:r>
+                      <m:r>
+                        <a:rPr lang="it-IT" sz="1000" i="1" dirty="0">
+                          <a:latin typeface="Cambria Math" panose="02040503050406030204" pitchFamily="18" charset="0"/>
+                          <a:ea typeface="Cambria Math" panose="02040503050406030204" pitchFamily="18" charset="0"/>
+                        </a:rPr>
+                        <m:t>=</m:t>
+                      </m:r>
+                      <m:sSup>
+                        <m:sSupPr>
+                          <m:ctrlPr>
+                            <a:rPr lang="it-IT" sz="1000" i="1" dirty="0">
+                              <a:latin typeface="Cambria Math" panose="02040503050406030204" pitchFamily="18" charset="0"/>
+                            </a:rPr>
+                          </m:ctrlPr>
+                        </m:sSupPr>
+                        <m:e>
+                          <m:r>
+                            <a:rPr lang="it-IT" sz="1000" i="1" dirty="0">
+                              <a:latin typeface="Cambria Math" panose="02040503050406030204" pitchFamily="18" charset="0"/>
+                              <a:ea typeface="Cambria Math" panose="02040503050406030204" pitchFamily="18" charset="0"/>
+                            </a:rPr>
+                            <m:t>𝛾</m:t>
+                          </m:r>
+                        </m:e>
+                        <m:sup>
+                          <m:r>
+                            <a:rPr lang="it-IT" sz="1000" i="1" dirty="0">
+                              <a:latin typeface="Cambria Math" panose="02040503050406030204" pitchFamily="18" charset="0"/>
+                            </a:rPr>
+                            <m:t>𝑖</m:t>
+                          </m:r>
+                        </m:sup>
+                      </m:sSup>
+                    </m:oMath>
+                  </m:oMathPara>
+                </a14:m>
+                <a:endParaRPr lang="it-IT" sz="1000" i="1" dirty="0" smtClean="0">
+                  <a:latin typeface="Cambria Math" panose="02040503050406030204" pitchFamily="18" charset="0"/>
+                </a:endParaRPr>
+              </a:p>
+              <a:p>
+                <a14:m>
+                  <m:oMathPara xmlns:m="http://schemas.openxmlformats.org/officeDocument/2006/math">
+                    <m:oMathParaPr>
+                      <m:jc m:val="centerGroup"/>
+                    </m:oMathParaPr>
+                    <m:oMath xmlns:m="http://schemas.openxmlformats.org/officeDocument/2006/math">
+                      <m:r>
+                        <a:rPr lang="it-IT" sz="1000" i="1" dirty="0">
+                          <a:latin typeface="Cambria Math" panose="02040503050406030204" pitchFamily="18" charset="0"/>
+                          <a:ea typeface="Cambria Math" panose="02040503050406030204" pitchFamily="18" charset="0"/>
+                        </a:rPr>
+                        <m:t>𝑝</m:t>
+                      </m:r>
+                      <m:r>
+                        <a:rPr lang="it-IT" sz="1000" i="1" dirty="0">
+                          <a:latin typeface="Cambria Math" panose="02040503050406030204" pitchFamily="18" charset="0"/>
+                          <a:ea typeface="Cambria Math" panose="02040503050406030204" pitchFamily="18" charset="0"/>
+                        </a:rPr>
+                        <m:t>=</m:t>
+                      </m:r>
+                      <m:r>
+                        <a:rPr lang="it-IT" sz="1000" i="1" dirty="0">
+                          <a:latin typeface="Cambria Math" panose="02040503050406030204" pitchFamily="18" charset="0"/>
+                          <a:ea typeface="Cambria Math" panose="02040503050406030204" pitchFamily="18" charset="0"/>
+                        </a:rPr>
+                        <m:t>0</m:t>
+                      </m:r>
+                    </m:oMath>
+                  </m:oMathPara>
+                </a14:m>
+                <a:endParaRPr lang="it-IT" sz="1000" baseline="-25000" dirty="0"/>
+              </a:p>
+              <a:p>
+                <a:pPr/>
+                <a14:m>
+                  <m:oMathPara xmlns:m="http://schemas.openxmlformats.org/officeDocument/2006/math">
+                    <m:oMathParaPr>
+                      <m:jc m:val="centerGroup"/>
+                    </m:oMathParaPr>
+                    <m:oMath xmlns:m="http://schemas.openxmlformats.org/officeDocument/2006/math">
+                      <m:r>
+                        <a:rPr lang="it-IT" sz="1000" i="1" baseline="-25000" dirty="0" smtClean="0">
+                          <a:latin typeface="Cambria Math" panose="02040503050406030204" pitchFamily="18" charset="0"/>
+                        </a:rPr>
+                        <m:t> </m:t>
+                      </m:r>
+                    </m:oMath>
+                  </m:oMathPara>
+                </a14:m>
+                <a:endParaRPr lang="it-IT" sz="1000" baseline="-25000" dirty="0"/>
+              </a:p>
+            </p:txBody>
+          </p:sp>
+        </mc:Choice>
+        <mc:Fallback>
+          <p:sp>
+            <p:nvSpPr>
+              <p:cNvPr id="95" name="CasellaDiTesto 94"/>
+              <p:cNvSpPr txBox="1">
+                <a:spLocks noRot="1" noChangeAspect="1" noMove="1" noResize="1" noEditPoints="1" noAdjustHandles="1" noChangeArrowheads="1" noChangeShapeType="1" noTextEdit="1"/>
+              </p:cNvSpPr>
+              <p:nvPr/>
+            </p:nvSpPr>
+            <p:spPr>
+              <a:xfrm>
+                <a:off x="2162116" y="5638016"/>
+                <a:ext cx="1939222" cy="869533"/>
+              </a:xfrm>
+              <a:prstGeom prst="rect">
+                <a:avLst/>
+              </a:prstGeom>
+              <a:blipFill>
+                <a:blip r:embed="rId32"/>
+                <a:stretch>
+                  <a:fillRect/>
                 </a:stretch>
               </a:blipFill>
             </p:spPr>
@@ -14515,8 +15850,8 @@
         </p:nvSpPr>
         <p:spPr>
           <a:xfrm>
-            <a:off x="8869700" y="3388199"/>
-            <a:ext cx="3287568" cy="784830"/>
+            <a:off x="8869700" y="3817427"/>
+            <a:ext cx="3287568" cy="1477328"/>
           </a:xfrm>
           <a:prstGeom prst="rect">
             <a:avLst/>
@@ -14530,9 +15865,14 @@
           <a:lstStyle/>
           <a:p>
             <a:r>
-              <a:rPr lang="it-IT" sz="1500" dirty="0"/>
-              <a:t>Output:</a:t>
-            </a:r>
+              <a:rPr lang="it-IT" sz="1500" dirty="0" smtClean="0"/>
+              <a:t>Input</a:t>
+            </a:r>
+            <a:r>
+              <a:rPr lang="it-IT" sz="1500" dirty="0" smtClean="0"/>
+              <a:t>:</a:t>
+            </a:r>
+            <a:endParaRPr lang="it-IT" sz="1500" dirty="0"/>
           </a:p>
           <a:p>
             <a:pPr marL="447675" indent="-180975">
@@ -14543,33 +15883,31 @@
               </a:tabLst>
             </a:pPr>
             <a:r>
-              <a:rPr lang="it-IT" sz="1500" i="1" dirty="0"/>
-              <a:t>position </a:t>
-            </a:r>
-            <a:r>
-              <a:rPr lang="it-IT" sz="1500" dirty="0"/>
-              <a:t>(posizione attuale dell’asteroide (</a:t>
-            </a:r>
-            <a:r>
-              <a:rPr lang="it-IT" sz="1500" i="1" dirty="0"/>
-              <a:t>x</a:t>
-            </a:r>
-            <a:r>
-              <a:rPr lang="it-IT" sz="1500" i="1" baseline="-25000" dirty="0"/>
-              <a:t>a</a:t>
-            </a:r>
-            <a:r>
-              <a:rPr lang="it-IT" sz="1500" i="1" dirty="0"/>
-              <a:t>,y</a:t>
-            </a:r>
-            <a:r>
-              <a:rPr lang="it-IT" sz="1500" i="1" baseline="-25000" dirty="0"/>
-              <a:t>a</a:t>
-            </a:r>
-            <a:r>
-              <a:rPr lang="it-IT" sz="1500" dirty="0"/>
-              <a:t>) )</a:t>
-            </a:r>
+              <a:rPr lang="it-IT" sz="1500" i="1" dirty="0" smtClean="0"/>
+              <a:t>Stop </a:t>
+            </a:r>
+            <a:r>
+              <a:rPr lang="it-IT" sz="1500" dirty="0" smtClean="0"/>
+              <a:t>(Segnale inviato dalla navicella che indica una collisione)</a:t>
+            </a:r>
+          </a:p>
+          <a:p>
+            <a:pPr marL="447675" indent="-180975">
+              <a:buFont typeface="Arial" panose="020B0604020202020204" pitchFamily="34" charset="0"/>
+              <a:buChar char="•"/>
+              <a:tabLst>
+                <a:tab pos="447675" algn="l"/>
+              </a:tabLst>
+            </a:pPr>
+            <a:r>
+              <a:rPr lang="it-IT" sz="1500" dirty="0" err="1" smtClean="0"/>
+              <a:t>RestartA</a:t>
+            </a:r>
+            <a:r>
+              <a:rPr lang="it-IT" sz="1500" dirty="0" smtClean="0"/>
+              <a:t> (Segnale inviato dalla navicella che indica di inizializzare la posizione dell’asteroide)</a:t>
+            </a:r>
+            <a:endParaRPr lang="it-IT" sz="1500" dirty="0"/>
           </a:p>
         </p:txBody>
       </p:sp>
@@ -15486,13 +16824,13 @@
                             <a:rPr lang="it-IT" sz="1000" i="1" dirty="0" smtClean="0">
                               <a:latin typeface="Cambria Math" panose="02040503050406030204" pitchFamily="18" charset="0"/>
                             </a:rPr>
-                            <m:t>𝑝𝑜𝑠𝑖𝑡𝑖</m:t>
+                            <m:t>𝑝𝑜𝑠𝑖𝑡𝑖𝑜</m:t>
                           </m:r>
                           <m:r>
                             <a:rPr lang="it-IT" sz="1000" b="0" i="1" dirty="0" smtClean="0">
                               <a:latin typeface="Cambria Math" panose="02040503050406030204" pitchFamily="18" charset="0"/>
                             </a:rPr>
-                            <m:t>𝑜𝑛</m:t>
+                            <m:t>𝑛</m:t>
                           </m:r>
                         </m:oMath>
                       </m:oMathPara>
@@ -16540,7 +17878,7 @@
         <p:spPr>
           <a:xfrm>
             <a:off x="8869700" y="944745"/>
-            <a:ext cx="2861732" cy="2631490"/>
+            <a:ext cx="2861732" cy="3093154"/>
           </a:xfrm>
           <a:prstGeom prst="rect">
             <a:avLst/>
@@ -16608,8 +17946,23 @@
             </a:r>
             <a:r>
               <a:rPr lang="it-IT" sz="1500" dirty="0"/>
-              <a:t>(posizione asteroide)</a:t>
-            </a:r>
+              <a:t>(posizione asteroide</a:t>
+            </a:r>
+            <a:r>
+              <a:rPr lang="it-IT" sz="1500" dirty="0" smtClean="0"/>
+              <a:t>)</a:t>
+            </a:r>
+          </a:p>
+          <a:p>
+            <a:pPr marL="447675" lvl="1" indent="-180975">
+              <a:buFont typeface="Arial" panose="020B0604020202020204" pitchFamily="34" charset="0"/>
+              <a:buChar char="•"/>
+            </a:pPr>
+            <a:r>
+              <a:rPr lang="it-IT" sz="1500" dirty="0" smtClean="0"/>
+              <a:t>p (punteggio, aumenta ad ogni rimbalzo)</a:t>
+            </a:r>
+            <a:endParaRPr lang="it-IT" sz="1500" dirty="0"/>
           </a:p>
           <a:p>
             <a:pPr marL="266700" indent="-266700">
@@ -16715,6 +18068,478 @@
           </a:p>
         </p:txBody>
       </p:sp>
+      <p:cxnSp>
+        <p:nvCxnSpPr>
+          <p:cNvPr id="34" name="Connettore 7 33"/>
+          <p:cNvCxnSpPr>
+            <a:stCxn id="31" idx="3"/>
+            <a:endCxn id="6" idx="5"/>
+          </p:cNvCxnSpPr>
+          <p:nvPr/>
+        </p:nvCxnSpPr>
+        <p:spPr>
+          <a:xfrm rot="5400000">
+            <a:off x="5289299" y="2511162"/>
+            <a:ext cx="126956" cy="2174401"/>
+          </a:xfrm>
+          <a:prstGeom prst="curvedConnector3">
+            <a:avLst>
+              <a:gd name="adj1" fmla="val 409783"/>
+            </a:avLst>
+          </a:prstGeom>
+          <a:ln>
+            <a:solidFill>
+              <a:schemeClr val="tx1"/>
+            </a:solidFill>
+            <a:tailEnd type="triangle"/>
+          </a:ln>
+        </p:spPr>
+        <p:style>
+          <a:lnRef idx="1">
+            <a:schemeClr val="accent1"/>
+          </a:lnRef>
+          <a:fillRef idx="0">
+            <a:schemeClr val="accent1"/>
+          </a:fillRef>
+          <a:effectRef idx="0">
+            <a:schemeClr val="accent1"/>
+          </a:effectRef>
+          <a:fontRef idx="minor">
+            <a:schemeClr val="tx1"/>
+          </a:fontRef>
+        </p:style>
+      </p:cxnSp>
+      <mc:AlternateContent xmlns:mc="http://schemas.openxmlformats.org/markup-compatibility/2006">
+        <mc:Choice xmlns:a14="http://schemas.microsoft.com/office/drawing/2010/main" Requires="a14">
+          <p:sp>
+            <p:nvSpPr>
+              <p:cNvPr id="35" name="CasellaDiTesto 34"/>
+              <p:cNvSpPr txBox="1"/>
+              <p:nvPr/>
+            </p:nvSpPr>
+            <p:spPr>
+              <a:xfrm>
+                <a:off x="4265575" y="3817427"/>
+                <a:ext cx="2346108" cy="242695"/>
+              </a:xfrm>
+              <a:prstGeom prst="rect">
+                <a:avLst/>
+              </a:prstGeom>
+              <a:noFill/>
+            </p:spPr>
+            <p:txBody>
+              <a:bodyPr wrap="square" rtlCol="0">
+                <a:spAutoFit/>
+              </a:bodyPr>
+              <a:lstStyle/>
+              <a:p>
+                <a:pPr/>
+                <a14:m>
+                  <m:oMathPara xmlns:m="http://schemas.openxmlformats.org/officeDocument/2006/math">
+                    <m:oMathParaPr>
+                      <m:jc m:val="centerGroup"/>
+                    </m:oMathParaPr>
+                    <m:oMath xmlns:m="http://schemas.openxmlformats.org/officeDocument/2006/math">
+                      <m:r>
+                        <a:rPr lang="it-IT" sz="1000" b="0" i="1" dirty="0" smtClean="0">
+                          <a:latin typeface="Cambria Math" panose="02040503050406030204" pitchFamily="18" charset="0"/>
+                        </a:rPr>
+                        <m:t>𝑅𝑒𝑠𝑡𝑎𝑟𝑡𝐴</m:t>
+                      </m:r>
+                      <m:r>
+                        <a:rPr lang="it-IT" sz="1000" b="0" i="1" dirty="0" smtClean="0">
+                          <a:latin typeface="Cambria Math" panose="02040503050406030204" pitchFamily="18" charset="0"/>
+                        </a:rPr>
+                        <m:t>/</m:t>
+                      </m:r>
+                    </m:oMath>
+                  </m:oMathPara>
+                </a14:m>
+                <a:endParaRPr lang="it-IT" sz="1000" baseline="-25000" dirty="0"/>
+              </a:p>
+            </p:txBody>
+          </p:sp>
+        </mc:Choice>
+        <mc:Fallback>
+          <p:sp>
+            <p:nvSpPr>
+              <p:cNvPr id="35" name="CasellaDiTesto 34"/>
+              <p:cNvSpPr txBox="1">
+                <a:spLocks noRot="1" noChangeAspect="1" noMove="1" noResize="1" noEditPoints="1" noAdjustHandles="1" noChangeArrowheads="1" noChangeShapeType="1" noTextEdit="1"/>
+              </p:cNvSpPr>
+              <p:nvPr/>
+            </p:nvSpPr>
+            <p:spPr>
+              <a:xfrm>
+                <a:off x="4265575" y="3817427"/>
+                <a:ext cx="2346108" cy="242695"/>
+              </a:xfrm>
+              <a:prstGeom prst="rect">
+                <a:avLst/>
+              </a:prstGeom>
+              <a:blipFill>
+                <a:blip r:embed="rId13"/>
+                <a:stretch>
+                  <a:fillRect b="-5000"/>
+                </a:stretch>
+              </a:blipFill>
+            </p:spPr>
+            <p:txBody>
+              <a:bodyPr/>
+              <a:lstStyle/>
+              <a:p>
+                <a:r>
+                  <a:rPr lang="it-IT">
+                    <a:noFill/>
+                  </a:rPr>
+                  <a:t> </a:t>
+                </a:r>
+              </a:p>
+            </p:txBody>
+          </p:sp>
+        </mc:Fallback>
+      </mc:AlternateContent>
+      <p:sp>
+        <p:nvSpPr>
+          <p:cNvPr id="37" name="CasellaDiTesto 36"/>
+          <p:cNvSpPr txBox="1"/>
+          <p:nvPr/>
+        </p:nvSpPr>
+        <p:spPr>
+          <a:xfrm>
+            <a:off x="8869700" y="5294755"/>
+            <a:ext cx="3287568" cy="784830"/>
+          </a:xfrm>
+          <a:prstGeom prst="rect">
+            <a:avLst/>
+          </a:prstGeom>
+          <a:noFill/>
+        </p:spPr>
+        <p:txBody>
+          <a:bodyPr wrap="square" rtlCol="0">
+            <a:spAutoFit/>
+          </a:bodyPr>
+          <a:lstStyle/>
+          <a:p>
+            <a:r>
+              <a:rPr lang="it-IT" sz="1500" dirty="0"/>
+              <a:t>Output:</a:t>
+            </a:r>
+          </a:p>
+          <a:p>
+            <a:pPr marL="447675" indent="-180975">
+              <a:buFont typeface="Arial" panose="020B0604020202020204" pitchFamily="34" charset="0"/>
+              <a:buChar char="•"/>
+              <a:tabLst>
+                <a:tab pos="447675" algn="l"/>
+              </a:tabLst>
+            </a:pPr>
+            <a:r>
+              <a:rPr lang="it-IT" sz="1500" i="1" dirty="0"/>
+              <a:t>position </a:t>
+            </a:r>
+            <a:r>
+              <a:rPr lang="it-IT" sz="1500" dirty="0"/>
+              <a:t>(posizione attuale dell’asteroide (</a:t>
+            </a:r>
+            <a:r>
+              <a:rPr lang="it-IT" sz="1500" i="1" dirty="0"/>
+              <a:t>x</a:t>
+            </a:r>
+            <a:r>
+              <a:rPr lang="it-IT" sz="1500" i="1" baseline="-25000" dirty="0"/>
+              <a:t>a</a:t>
+            </a:r>
+            <a:r>
+              <a:rPr lang="it-IT" sz="1500" i="1" dirty="0"/>
+              <a:t>,y</a:t>
+            </a:r>
+            <a:r>
+              <a:rPr lang="it-IT" sz="1500" i="1" baseline="-25000" dirty="0"/>
+              <a:t>a</a:t>
+            </a:r>
+            <a:r>
+              <a:rPr lang="it-IT" sz="1500" dirty="0"/>
+              <a:t>) )</a:t>
+            </a:r>
+          </a:p>
+        </p:txBody>
+      </p:sp>
+      <mc:AlternateContent xmlns:mc="http://schemas.openxmlformats.org/markup-compatibility/2006">
+        <mc:Choice xmlns:a14="http://schemas.microsoft.com/office/drawing/2010/main" Requires="a14">
+          <p:sp>
+            <p:nvSpPr>
+              <p:cNvPr id="41" name="CasellaDiTesto 40"/>
+              <p:cNvSpPr txBox="1"/>
+              <p:nvPr/>
+            </p:nvSpPr>
+            <p:spPr>
+              <a:xfrm>
+                <a:off x="4337695" y="4019141"/>
+                <a:ext cx="2166700" cy="727635"/>
+              </a:xfrm>
+              <a:prstGeom prst="rect">
+                <a:avLst/>
+              </a:prstGeom>
+              <a:noFill/>
+            </p:spPr>
+            <p:txBody>
+              <a:bodyPr wrap="square" rtlCol="0">
+                <a:spAutoFit/>
+              </a:bodyPr>
+              <a:lstStyle/>
+              <a:p>
+                <a:pPr/>
+                <a14:m>
+                  <m:oMathPara xmlns:m="http://schemas.openxmlformats.org/officeDocument/2006/math">
+                    <m:oMathParaPr>
+                      <m:jc m:val="centerGroup"/>
+                    </m:oMathParaPr>
+                    <m:oMath xmlns:m="http://schemas.openxmlformats.org/officeDocument/2006/math">
+                      <m:r>
+                        <a:rPr lang="it-IT" sz="1000" b="0" i="1" dirty="0" smtClean="0">
+                          <a:latin typeface="Cambria Math" panose="02040503050406030204" pitchFamily="18" charset="0"/>
+                        </a:rPr>
+                        <m:t>𝑦</m:t>
+                      </m:r>
+                      <m:r>
+                        <a:rPr lang="it-IT" sz="1000" i="1" baseline="-25000" dirty="0" err="1" smtClean="0">
+                          <a:latin typeface="Cambria Math" panose="02040503050406030204" pitchFamily="18" charset="0"/>
+                        </a:rPr>
+                        <m:t>𝑎</m:t>
+                      </m:r>
+                      <m:r>
+                        <a:rPr lang="it-IT" sz="1000" i="1" dirty="0" smtClean="0">
+                          <a:latin typeface="Cambria Math" panose="02040503050406030204" pitchFamily="18" charset="0"/>
+                        </a:rPr>
+                        <m:t>=</m:t>
+                      </m:r>
+                      <m:sSup>
+                        <m:sSupPr>
+                          <m:ctrlPr>
+                            <a:rPr lang="it-IT" sz="1000" b="0" i="1" dirty="0" smtClean="0">
+                              <a:latin typeface="Cambria Math" panose="02040503050406030204" pitchFamily="18" charset="0"/>
+                            </a:rPr>
+                          </m:ctrlPr>
+                        </m:sSupPr>
+                        <m:e>
+                          <m:r>
+                            <a:rPr lang="it-IT" sz="1000" b="0" i="1" dirty="0" smtClean="0">
+                              <a:latin typeface="Cambria Math" panose="02040503050406030204" pitchFamily="18" charset="0"/>
+                            </a:rPr>
+                            <m:t>𝑦</m:t>
+                          </m:r>
+                        </m:e>
+                        <m:sup>
+                          <m:r>
+                            <a:rPr lang="it-IT" sz="1000" b="0" i="1" dirty="0" smtClean="0">
+                              <a:latin typeface="Cambria Math" panose="02040503050406030204" pitchFamily="18" charset="0"/>
+                            </a:rPr>
+                            <m:t>𝑖</m:t>
+                          </m:r>
+                        </m:sup>
+                      </m:sSup>
+                    </m:oMath>
+                  </m:oMathPara>
+                </a14:m>
+                <a:endParaRPr lang="it-IT" sz="1000" b="0" i="0" dirty="0" smtClean="0">
+                  <a:latin typeface="Cambria Math" panose="02040503050406030204" pitchFamily="18" charset="0"/>
+                </a:endParaRPr>
+              </a:p>
+              <a:p>
+                <a:pPr/>
+                <a14:m>
+                  <m:oMathPara xmlns:m="http://schemas.openxmlformats.org/officeDocument/2006/math">
+                    <m:oMathParaPr>
+                      <m:jc m:val="centerGroup"/>
+                    </m:oMathParaPr>
+                    <m:oMath xmlns:m="http://schemas.openxmlformats.org/officeDocument/2006/math">
+                      <m:r>
+                        <a:rPr lang="it-IT" sz="1000" b="0" i="1" dirty="0" smtClean="0">
+                          <a:latin typeface="Cambria Math" panose="02040503050406030204" pitchFamily="18" charset="0"/>
+                        </a:rPr>
+                        <m:t>𝑥</m:t>
+                      </m:r>
+                      <m:r>
+                        <a:rPr lang="it-IT" sz="1000" i="1" baseline="-25000" dirty="0" err="1" smtClean="0">
+                          <a:latin typeface="Cambria Math" panose="02040503050406030204" pitchFamily="18" charset="0"/>
+                        </a:rPr>
+                        <m:t>𝑎</m:t>
+                      </m:r>
+                      <m:r>
+                        <a:rPr lang="it-IT" sz="1000" i="1" dirty="0" smtClean="0">
+                          <a:latin typeface="Cambria Math" panose="02040503050406030204" pitchFamily="18" charset="0"/>
+                        </a:rPr>
+                        <m:t>=</m:t>
+                      </m:r>
+                      <m:sSup>
+                        <m:sSupPr>
+                          <m:ctrlPr>
+                            <a:rPr lang="it-IT" sz="1000" i="1" dirty="0" smtClean="0">
+                              <a:latin typeface="Cambria Math" panose="02040503050406030204" pitchFamily="18" charset="0"/>
+                            </a:rPr>
+                          </m:ctrlPr>
+                        </m:sSupPr>
+                        <m:e>
+                          <m:r>
+                            <a:rPr lang="it-IT" sz="1000" b="0" i="1" dirty="0" smtClean="0">
+                              <a:latin typeface="Cambria Math" panose="02040503050406030204" pitchFamily="18" charset="0"/>
+                            </a:rPr>
+                            <m:t>𝑥</m:t>
+                          </m:r>
+                        </m:e>
+                        <m:sup>
+                          <m:r>
+                            <a:rPr lang="it-IT" sz="1000" b="0" i="1" dirty="0" smtClean="0">
+                              <a:latin typeface="Cambria Math" panose="02040503050406030204" pitchFamily="18" charset="0"/>
+                            </a:rPr>
+                            <m:t>𝑖</m:t>
+                          </m:r>
+                        </m:sup>
+                      </m:sSup>
+                    </m:oMath>
+                  </m:oMathPara>
+                </a14:m>
+                <a:endParaRPr lang="it-IT" sz="1000" b="0" i="1" dirty="0" smtClean="0">
+                  <a:latin typeface="Cambria Math" panose="02040503050406030204" pitchFamily="18" charset="0"/>
+                </a:endParaRPr>
+              </a:p>
+              <a:p>
+                <a:pPr/>
+                <a14:m>
+                  <m:oMathPara xmlns:m="http://schemas.openxmlformats.org/officeDocument/2006/math">
+                    <m:oMathParaPr>
+                      <m:jc m:val="centerGroup"/>
+                    </m:oMathParaPr>
+                    <m:oMath xmlns:m="http://schemas.openxmlformats.org/officeDocument/2006/math">
+                      <m:r>
+                        <a:rPr lang="it-IT" sz="1000" i="1" dirty="0">
+                          <a:latin typeface="Cambria Math" panose="02040503050406030204" pitchFamily="18" charset="0"/>
+                          <a:ea typeface="Cambria Math" panose="02040503050406030204" pitchFamily="18" charset="0"/>
+                        </a:rPr>
+                        <m:t>𝛾</m:t>
+                      </m:r>
+                      <m:r>
+                        <a:rPr lang="it-IT" sz="1000" i="1" dirty="0">
+                          <a:latin typeface="Cambria Math" panose="02040503050406030204" pitchFamily="18" charset="0"/>
+                          <a:ea typeface="Cambria Math" panose="02040503050406030204" pitchFamily="18" charset="0"/>
+                        </a:rPr>
+                        <m:t>=</m:t>
+                      </m:r>
+                      <m:sSup>
+                        <m:sSupPr>
+                          <m:ctrlPr>
+                            <a:rPr lang="it-IT" sz="1000" i="1" dirty="0">
+                              <a:latin typeface="Cambria Math" panose="02040503050406030204" pitchFamily="18" charset="0"/>
+                            </a:rPr>
+                          </m:ctrlPr>
+                        </m:sSupPr>
+                        <m:e>
+                          <m:r>
+                            <a:rPr lang="it-IT" sz="1000" i="1" dirty="0">
+                              <a:latin typeface="Cambria Math" panose="02040503050406030204" pitchFamily="18" charset="0"/>
+                              <a:ea typeface="Cambria Math" panose="02040503050406030204" pitchFamily="18" charset="0"/>
+                            </a:rPr>
+                            <m:t>𝛾</m:t>
+                          </m:r>
+                        </m:e>
+                        <m:sup>
+                          <m:r>
+                            <a:rPr lang="it-IT" sz="1000" i="1" dirty="0">
+                              <a:latin typeface="Cambria Math" panose="02040503050406030204" pitchFamily="18" charset="0"/>
+                            </a:rPr>
+                            <m:t>𝑖</m:t>
+                          </m:r>
+                        </m:sup>
+                      </m:sSup>
+                    </m:oMath>
+                  </m:oMathPara>
+                </a14:m>
+                <a:endParaRPr lang="it-IT" sz="1000" i="1" dirty="0" smtClean="0">
+                  <a:latin typeface="Cambria Math" panose="02040503050406030204" pitchFamily="18" charset="0"/>
+                </a:endParaRPr>
+              </a:p>
+              <a:p>
+                <a:pPr/>
+                <a14:m>
+                  <m:oMathPara xmlns:m="http://schemas.openxmlformats.org/officeDocument/2006/math">
+                    <m:oMathParaPr>
+                      <m:jc m:val="centerGroup"/>
+                    </m:oMathParaPr>
+                    <m:oMath xmlns:m="http://schemas.openxmlformats.org/officeDocument/2006/math">
+                      <m:r>
+                        <a:rPr lang="it-IT" sz="1000" b="0" i="1" dirty="0" smtClean="0">
+                          <a:latin typeface="Cambria Math" panose="02040503050406030204" pitchFamily="18" charset="0"/>
+                          <a:ea typeface="Cambria Math" panose="02040503050406030204" pitchFamily="18" charset="0"/>
+                        </a:rPr>
+                        <m:t>𝑝</m:t>
+                      </m:r>
+                      <m:r>
+                        <a:rPr lang="it-IT" sz="1000" b="0" i="1" dirty="0" smtClean="0">
+                          <a:latin typeface="Cambria Math" panose="02040503050406030204" pitchFamily="18" charset="0"/>
+                          <a:ea typeface="Cambria Math" panose="02040503050406030204" pitchFamily="18" charset="0"/>
+                        </a:rPr>
+                        <m:t>=</m:t>
+                      </m:r>
+                      <m:r>
+                        <a:rPr lang="it-IT" sz="1000" b="0" i="1" dirty="0" smtClean="0">
+                          <a:latin typeface="Cambria Math" panose="02040503050406030204" pitchFamily="18" charset="0"/>
+                        </a:rPr>
+                        <m:t>0</m:t>
+                      </m:r>
+                      <m:r>
+                        <a:rPr lang="it-IT" sz="1000" i="1" baseline="-25000" dirty="0" smtClean="0">
+                          <a:latin typeface="Cambria Math" panose="02040503050406030204" pitchFamily="18" charset="0"/>
+                        </a:rPr>
+                        <m:t> </m:t>
+                      </m:r>
+                    </m:oMath>
+                  </m:oMathPara>
+                </a14:m>
+                <a:endParaRPr lang="it-IT" sz="1000" baseline="-25000" dirty="0"/>
+              </a:p>
+            </p:txBody>
+          </p:sp>
+        </mc:Choice>
+        <mc:Fallback>
+          <p:sp>
+            <p:nvSpPr>
+              <p:cNvPr id="41" name="CasellaDiTesto 40"/>
+              <p:cNvSpPr txBox="1">
+                <a:spLocks noRot="1" noChangeAspect="1" noMove="1" noResize="1" noEditPoints="1" noAdjustHandles="1" noChangeArrowheads="1" noChangeShapeType="1" noTextEdit="1"/>
+              </p:cNvSpPr>
+              <p:nvPr/>
+            </p:nvSpPr>
+            <p:spPr>
+              <a:xfrm>
+                <a:off x="4337695" y="4019141"/>
+                <a:ext cx="2166700" cy="727635"/>
+              </a:xfrm>
+              <a:prstGeom prst="rect">
+                <a:avLst/>
+              </a:prstGeom>
+              <a:blipFill>
+                <a:blip r:embed="rId14"/>
+                <a:stretch>
+                  <a:fillRect/>
+                </a:stretch>
+              </a:blipFill>
+            </p:spPr>
+            <p:txBody>
+              <a:bodyPr/>
+              <a:lstStyle/>
+              <a:p>
+                <a:r>
+                  <a:rPr lang="it-IT">
+                    <a:noFill/>
+                  </a:rPr>
+                  <a:t> </a:t>
+                </a:r>
+              </a:p>
+            </p:txBody>
+          </p:sp>
+        </mc:Fallback>
+      </mc:AlternateContent>
     </p:spTree>
     <p:extLst>
       <p:ext uri="{BB962C8B-B14F-4D97-AF65-F5344CB8AC3E}">
@@ -24718,6 +26543,14 @@
   <p:clrMapOvr>
     <a:masterClrMapping/>
   </p:clrMapOvr>
+  <mc:AlternateContent xmlns:mc="http://schemas.openxmlformats.org/markup-compatibility/2006">
+    <mc:Choice xmlns:p14="http://schemas.microsoft.com/office/powerpoint/2010/main" Requires="p14">
+      <p:transition spd="slow" p14:dur="2000"/>
+    </mc:Choice>
+    <mc:Fallback>
+      <p:transition spd="slow"/>
+    </mc:Fallback>
+  </mc:AlternateContent>
 </p:sld>
 </file>
 
@@ -25384,6 +27217,14 @@
   <p:clrMapOvr>
     <a:masterClrMapping/>
   </p:clrMapOvr>
+  <mc:AlternateContent xmlns:mc="http://schemas.openxmlformats.org/markup-compatibility/2006">
+    <mc:Choice xmlns:p14="http://schemas.microsoft.com/office/powerpoint/2010/main" Requires="p14">
+      <p:transition spd="slow" p14:dur="2000"/>
+    </mc:Choice>
+    <mc:Fallback>
+      <p:transition spd="slow"/>
+    </mc:Fallback>
+  </mc:AlternateContent>
 </p:sld>
 </file>
 
@@ -26050,6 +27891,14 @@
   <p:clrMapOvr>
     <a:masterClrMapping/>
   </p:clrMapOvr>
+  <mc:AlternateContent xmlns:mc="http://schemas.openxmlformats.org/markup-compatibility/2006">
+    <mc:Choice xmlns:p14="http://schemas.microsoft.com/office/powerpoint/2010/main" Requires="p14">
+      <p:transition spd="slow" p14:dur="2000"/>
+    </mc:Choice>
+    <mc:Fallback>
+      <p:transition spd="slow"/>
+    </mc:Fallback>
+  </mc:AlternateContent>
 </p:sld>
 </file>
 
@@ -26716,6 +28565,14 @@
   <p:clrMapOvr>
     <a:masterClrMapping/>
   </p:clrMapOvr>
+  <mc:AlternateContent xmlns:mc="http://schemas.openxmlformats.org/markup-compatibility/2006">
+    <mc:Choice xmlns:p14="http://schemas.microsoft.com/office/powerpoint/2010/main" Requires="p14">
+      <p:transition spd="slow" p14:dur="2000"/>
+    </mc:Choice>
+    <mc:Fallback>
+      <p:transition spd="slow"/>
+    </mc:Fallback>
+  </mc:AlternateContent>
 </p:sld>
 </file>
 

</xml_diff>

<commit_message>
Aggiunta nuova slide e modificata freccia della macchina gerarchica in base alla pagina 128
</commit_message>
<xml_diff>
--- a/Progetto sistemi.pptx
+++ b/Progetto sistemi.pptx
@@ -5,10 +5,10 @@
     <p:sldMasterId id="2147483648" r:id="rId1"/>
   </p:sldMasterIdLst>
   <p:notesMasterIdLst>
-    <p:notesMasterId r:id="rId25"/>
+    <p:notesMasterId r:id="rId26"/>
   </p:notesMasterIdLst>
   <p:handoutMasterIdLst>
-    <p:handoutMasterId r:id="rId26"/>
+    <p:handoutMasterId r:id="rId27"/>
   </p:handoutMasterIdLst>
   <p:sldIdLst>
     <p:sldId id="256" r:id="rId2"/>
@@ -26,14 +26,15 @@
     <p:sldId id="283" r:id="rId14"/>
     <p:sldId id="284" r:id="rId15"/>
     <p:sldId id="270" r:id="rId16"/>
-    <p:sldId id="271" r:id="rId17"/>
-    <p:sldId id="272" r:id="rId18"/>
-    <p:sldId id="273" r:id="rId19"/>
-    <p:sldId id="275" r:id="rId20"/>
-    <p:sldId id="276" r:id="rId21"/>
-    <p:sldId id="277" r:id="rId22"/>
-    <p:sldId id="278" r:id="rId23"/>
-    <p:sldId id="279" r:id="rId24"/>
+    <p:sldId id="286" r:id="rId17"/>
+    <p:sldId id="271" r:id="rId18"/>
+    <p:sldId id="272" r:id="rId19"/>
+    <p:sldId id="273" r:id="rId20"/>
+    <p:sldId id="275" r:id="rId21"/>
+    <p:sldId id="276" r:id="rId22"/>
+    <p:sldId id="277" r:id="rId23"/>
+    <p:sldId id="278" r:id="rId24"/>
+    <p:sldId id="279" r:id="rId25"/>
   </p:sldIdLst>
   <p:sldSz cx="12192000" cy="6858000"/>
   <p:notesSz cx="6858000" cy="9144000"/>
@@ -156,6 +157,7 @@
             <p14:sldId id="283"/>
             <p14:sldId id="284"/>
             <p14:sldId id="270"/>
+            <p14:sldId id="286"/>
             <p14:sldId id="271"/>
             <p14:sldId id="272"/>
             <p14:sldId id="273"/>
@@ -1091,7 +1093,7 @@
           <a:p>
             <a:fld id="{AF5D5AC8-672A-409E-B76F-2374AA227A07}" type="slidenum">
               <a:rPr lang="it-IT" smtClean="0"/>
-              <a:t>16</a:t>
+              <a:t>17</a:t>
             </a:fld>
             <a:endParaRPr lang="it-IT"/>
           </a:p>
@@ -1175,7 +1177,7 @@
           <a:p>
             <a:fld id="{AF5D5AC8-672A-409E-B76F-2374AA227A07}" type="slidenum">
               <a:rPr lang="it-IT" smtClean="0"/>
-              <a:t>17</a:t>
+              <a:t>18</a:t>
             </a:fld>
             <a:endParaRPr lang="it-IT"/>
           </a:p>
@@ -1305,7 +1307,7 @@
           <a:p>
             <a:fld id="{AF5D5AC8-672A-409E-B76F-2374AA227A07}" type="slidenum">
               <a:rPr lang="it-IT" smtClean="0"/>
-              <a:t>18</a:t>
+              <a:t>19</a:t>
             </a:fld>
             <a:endParaRPr lang="it-IT"/>
           </a:p>
@@ -1389,7 +1391,7 @@
           <a:p>
             <a:fld id="{AF5D5AC8-672A-409E-B76F-2374AA227A07}" type="slidenum">
               <a:rPr lang="it-IT" smtClean="0"/>
-              <a:t>21</a:t>
+              <a:t>22</a:t>
             </a:fld>
             <a:endParaRPr lang="it-IT"/>
           </a:p>
@@ -1473,7 +1475,7 @@
           <a:p>
             <a:fld id="{AF5D5AC8-672A-409E-B76F-2374AA227A07}" type="slidenum">
               <a:rPr lang="it-IT" smtClean="0"/>
-              <a:t>23</a:t>
+              <a:t>24</a:t>
             </a:fld>
             <a:endParaRPr lang="it-IT"/>
           </a:p>
@@ -5052,14 +5054,6 @@
   <p:clrMapOvr>
     <a:masterClrMapping/>
   </p:clrMapOvr>
-  <mc:AlternateContent xmlns:mc="http://schemas.openxmlformats.org/markup-compatibility/2006">
-    <mc:Choice xmlns:p14="http://schemas.microsoft.com/office/powerpoint/2010/main" Requires="p14">
-      <p:transition spd="slow" p14:dur="2000"/>
-    </mc:Choice>
-    <mc:Fallback>
-      <p:transition spd="slow"/>
-    </mc:Fallback>
-  </mc:AlternateContent>
 </p:sld>
 </file>
 
@@ -5834,14 +5828,6 @@
   <p:clrMapOvr>
     <a:masterClrMapping/>
   </p:clrMapOvr>
-  <mc:AlternateContent xmlns:mc="http://schemas.openxmlformats.org/markup-compatibility/2006">
-    <mc:Choice xmlns:p14="http://schemas.microsoft.com/office/powerpoint/2010/main" Requires="p14">
-      <p:transition spd="slow" p14:dur="2000"/>
-    </mc:Choice>
-    <mc:Fallback>
-      <p:transition spd="slow"/>
-    </mc:Fallback>
-  </mc:AlternateContent>
 </p:sld>
 </file>
 
@@ -6610,14 +6596,6 @@
   <p:clrMapOvr>
     <a:masterClrMapping/>
   </p:clrMapOvr>
-  <mc:AlternateContent xmlns:mc="http://schemas.openxmlformats.org/markup-compatibility/2006">
-    <mc:Choice xmlns:p14="http://schemas.microsoft.com/office/powerpoint/2010/main" Requires="p14">
-      <p:transition spd="slow" p14:dur="2000"/>
-    </mc:Choice>
-    <mc:Fallback>
-      <p:transition spd="slow"/>
-    </mc:Fallback>
-  </mc:AlternateContent>
 </p:sld>
 </file>
 
@@ -7386,14 +7364,6 @@
   <p:clrMapOvr>
     <a:masterClrMapping/>
   </p:clrMapOvr>
-  <mc:AlternateContent xmlns:mc="http://schemas.openxmlformats.org/markup-compatibility/2006">
-    <mc:Choice xmlns:p14="http://schemas.microsoft.com/office/powerpoint/2010/main" Requires="p14">
-      <p:transition spd="slow" p14:dur="2000"/>
-    </mc:Choice>
-    <mc:Fallback>
-      <p:transition spd="slow"/>
-    </mc:Fallback>
-  </mc:AlternateContent>
 </p:sld>
 </file>
 
@@ -8162,14 +8132,6 @@
   <p:clrMapOvr>
     <a:masterClrMapping/>
   </p:clrMapOvr>
-  <mc:AlternateContent xmlns:mc="http://schemas.openxmlformats.org/markup-compatibility/2006">
-    <mc:Choice xmlns:p14="http://schemas.microsoft.com/office/powerpoint/2010/main" Requires="p14">
-      <p:transition spd="slow" p14:dur="2000"/>
-    </mc:Choice>
-    <mc:Fallback>
-      <p:transition spd="slow"/>
-    </mc:Fallback>
-  </mc:AlternateContent>
 </p:sld>
 </file>
 
@@ -8268,10 +8230,6 @@
             <a:pPr marL="0" indent="0">
               <a:buNone/>
             </a:pPr>
-            <a:r>
-              <a:rPr lang="it-IT" dirty="0"/>
-              <a:t/>
-            </a:r>
             <a:br>
               <a:rPr lang="it-IT" dirty="0"/>
             </a:br>
@@ -8323,6 +8281,136 @@
 </file>
 
 <file path=ppt/slides/slide16.xml><?xml version="1.0" encoding="utf-8"?>
+<p:sld xmlns:a="http://schemas.openxmlformats.org/drawingml/2006/main" xmlns:r="http://schemas.openxmlformats.org/officeDocument/2006/relationships" xmlns:p="http://schemas.openxmlformats.org/presentationml/2006/main">
+  <p:cSld>
+    <p:spTree>
+      <p:nvGrpSpPr>
+        <p:cNvPr id="1" name=""/>
+        <p:cNvGrpSpPr/>
+        <p:nvPr/>
+      </p:nvGrpSpPr>
+      <p:grpSpPr>
+        <a:xfrm>
+          <a:off x="0" y="0"/>
+          <a:ext cx="0" cy="0"/>
+          <a:chOff x="0" y="0"/>
+          <a:chExt cx="0" cy="0"/>
+        </a:xfrm>
+      </p:grpSpPr>
+      <p:sp>
+        <p:nvSpPr>
+          <p:cNvPr id="2" name="Titolo 1">
+            <a:extLst>
+              <a:ext uri="{FF2B5EF4-FFF2-40B4-BE49-F238E27FC236}">
+                <a16:creationId xmlns:a16="http://schemas.microsoft.com/office/drawing/2014/main" id="{E9DC76C1-F8F7-4F69-A998-17CAFCBAB50B}"/>
+              </a:ext>
+            </a:extLst>
+          </p:cNvPr>
+          <p:cNvSpPr>
+            <a:spLocks noGrp="1"/>
+          </p:cNvSpPr>
+          <p:nvPr>
+            <p:ph type="title"/>
+          </p:nvPr>
+        </p:nvSpPr>
+        <p:spPr/>
+        <p:txBody>
+          <a:bodyPr/>
+          <a:lstStyle/>
+          <a:p>
+            <a:r>
+              <a:rPr lang="it-IT" dirty="0"/>
+              <a:t>Implementazione in </a:t>
+            </a:r>
+            <a:r>
+              <a:rPr lang="it-IT" dirty="0" err="1"/>
+              <a:t>Unity</a:t>
+            </a:r>
+            <a:endParaRPr lang="it-IT" dirty="0"/>
+          </a:p>
+        </p:txBody>
+      </p:sp>
+      <p:sp>
+        <p:nvSpPr>
+          <p:cNvPr id="3" name="Segnaposto contenuto 2">
+            <a:extLst>
+              <a:ext uri="{FF2B5EF4-FFF2-40B4-BE49-F238E27FC236}">
+                <a16:creationId xmlns:a16="http://schemas.microsoft.com/office/drawing/2014/main" id="{AC026E89-350F-4B44-8CFD-0046836A72E4}"/>
+              </a:ext>
+            </a:extLst>
+          </p:cNvPr>
+          <p:cNvSpPr>
+            <a:spLocks noGrp="1"/>
+          </p:cNvSpPr>
+          <p:nvPr>
+            <p:ph idx="1"/>
+          </p:nvPr>
+        </p:nvSpPr>
+        <p:spPr/>
+        <p:txBody>
+          <a:bodyPr/>
+          <a:lstStyle/>
+          <a:p>
+            <a:pPr marL="0" indent="0">
+              <a:buNone/>
+            </a:pPr>
+            <a:r>
+              <a:rPr lang="it-IT" dirty="0"/>
+              <a:t>Tutti gli oggetti in scena (asteroidi, navicella e bordi) hanno un «RigidBody2D»</a:t>
+            </a:r>
+            <a:br>
+              <a:rPr lang="it-IT" dirty="0"/>
+            </a:br>
+            <a:endParaRPr lang="it-IT" dirty="0"/>
+          </a:p>
+          <a:p>
+            <a:pPr marL="0" indent="0">
+              <a:buNone/>
+            </a:pPr>
+            <a:r>
+              <a:rPr lang="it-IT" dirty="0"/>
+              <a:t>«RigidBody2d» è un componente che fa si che un oggetto sia sotto il controllo del motore fisico</a:t>
+            </a:r>
+          </a:p>
+          <a:p>
+            <a:pPr marL="0" indent="0">
+              <a:buNone/>
+            </a:pPr>
+            <a:endParaRPr lang="it-IT" dirty="0"/>
+          </a:p>
+          <a:p>
+            <a:pPr marL="0" indent="0">
+              <a:buNone/>
+            </a:pPr>
+            <a:r>
+              <a:rPr lang="it-IT" dirty="0"/>
+              <a:t>Senza esso non potremmo modificare la velocità degli oggetti oppure specificare cosa </a:t>
+            </a:r>
+            <a:r>
+              <a:rPr lang="it-IT"/>
+              <a:t>fare quando essi </a:t>
+            </a:r>
+            <a:r>
+              <a:rPr lang="it-IT" dirty="0"/>
+              <a:t>collidono</a:t>
+            </a:r>
+          </a:p>
+        </p:txBody>
+      </p:sp>
+    </p:spTree>
+    <p:extLst>
+      <p:ext uri="{BB962C8B-B14F-4D97-AF65-F5344CB8AC3E}">
+        <p14:creationId xmlns:p14="http://schemas.microsoft.com/office/powerpoint/2010/main" val="4089860860"/>
+      </p:ext>
+    </p:extLst>
+  </p:cSld>
+  <p:clrMapOvr>
+    <a:masterClrMapping/>
+  </p:clrMapOvr>
+</p:sld>
+</file>
+
+<file path=ppt/slides/slide17.xml><?xml version="1.0" encoding="utf-8"?>
 <p:sld xmlns:a="http://schemas.openxmlformats.org/drawingml/2006/main" xmlns:r="http://schemas.openxmlformats.org/officeDocument/2006/relationships" xmlns:p="http://schemas.openxmlformats.org/presentationml/2006/main">
   <p:cSld>
     <p:spTree>
@@ -8462,7 +8550,7 @@
 </p:sld>
 </file>
 
-<file path=ppt/slides/slide17.xml><?xml version="1.0" encoding="utf-8"?>
+<file path=ppt/slides/slide18.xml><?xml version="1.0" encoding="utf-8"?>
 <p:sld xmlns:a="http://schemas.openxmlformats.org/drawingml/2006/main" xmlns:r="http://schemas.openxmlformats.org/officeDocument/2006/relationships" xmlns:p="http://schemas.openxmlformats.org/presentationml/2006/main">
   <p:cSld>
     <p:spTree>
@@ -8597,7 +8685,7 @@
 </p:sld>
 </file>
 
-<file path=ppt/slides/slide18.xml><?xml version="1.0" encoding="utf-8"?>
+<file path=ppt/slides/slide19.xml><?xml version="1.0" encoding="utf-8"?>
 <p:sld xmlns:a="http://schemas.openxmlformats.org/drawingml/2006/main" xmlns:r="http://schemas.openxmlformats.org/officeDocument/2006/relationships" xmlns:p="http://schemas.openxmlformats.org/presentationml/2006/main">
   <p:cSld>
     <p:spTree>
@@ -8716,108 +8804,6 @@
     <p:extLst>
       <p:ext uri="{BB962C8B-B14F-4D97-AF65-F5344CB8AC3E}">
         <p14:creationId xmlns:p14="http://schemas.microsoft.com/office/powerpoint/2010/main" val="767860872"/>
-      </p:ext>
-    </p:extLst>
-  </p:cSld>
-  <p:clrMapOvr>
-    <a:masterClrMapping/>
-  </p:clrMapOvr>
-</p:sld>
-</file>
-
-<file path=ppt/slides/slide19.xml><?xml version="1.0" encoding="utf-8"?>
-<p:sld xmlns:a="http://schemas.openxmlformats.org/drawingml/2006/main" xmlns:r="http://schemas.openxmlformats.org/officeDocument/2006/relationships" xmlns:p="http://schemas.openxmlformats.org/presentationml/2006/main">
-  <p:cSld>
-    <p:spTree>
-      <p:nvGrpSpPr>
-        <p:cNvPr id="1" name=""/>
-        <p:cNvGrpSpPr/>
-        <p:nvPr/>
-      </p:nvGrpSpPr>
-      <p:grpSpPr>
-        <a:xfrm>
-          <a:off x="0" y="0"/>
-          <a:ext cx="0" cy="0"/>
-          <a:chOff x="0" y="0"/>
-          <a:chExt cx="0" cy="0"/>
-        </a:xfrm>
-      </p:grpSpPr>
-      <p:sp>
-        <p:nvSpPr>
-          <p:cNvPr id="2" name="Titolo 1">
-            <a:extLst>
-              <a:ext uri="{FF2B5EF4-FFF2-40B4-BE49-F238E27FC236}">
-                <a16:creationId xmlns:a16="http://schemas.microsoft.com/office/drawing/2014/main" id="{763A2169-1ECF-4FDB-B88A-F810E0934637}"/>
-              </a:ext>
-            </a:extLst>
-          </p:cNvPr>
-          <p:cNvSpPr>
-            <a:spLocks noGrp="1"/>
-          </p:cNvSpPr>
-          <p:nvPr>
-            <p:ph type="title"/>
-          </p:nvPr>
-        </p:nvSpPr>
-        <p:spPr/>
-        <p:txBody>
-          <a:bodyPr/>
-          <a:lstStyle/>
-          <a:p>
-            <a:r>
-              <a:rPr lang="it-IT" dirty="0"/>
-              <a:t>Rimbalzo </a:t>
-            </a:r>
-            <a:r>
-              <a:rPr lang="it-IT" dirty="0" err="1"/>
-              <a:t>Asteroid</a:t>
-            </a:r>
-            <a:endParaRPr lang="it-IT" dirty="0"/>
-          </a:p>
-        </p:txBody>
-      </p:sp>
-      <p:sp>
-        <p:nvSpPr>
-          <p:cNvPr id="3" name="Segnaposto contenuto 2">
-            <a:extLst>
-              <a:ext uri="{FF2B5EF4-FFF2-40B4-BE49-F238E27FC236}">
-                <a16:creationId xmlns:a16="http://schemas.microsoft.com/office/drawing/2014/main" id="{402764E4-A8F0-4CFE-81A1-186BEB8BC0FD}"/>
-              </a:ext>
-            </a:extLst>
-          </p:cNvPr>
-          <p:cNvSpPr>
-            <a:spLocks noGrp="1"/>
-          </p:cNvSpPr>
-          <p:nvPr>
-            <p:ph idx="1"/>
-          </p:nvPr>
-        </p:nvSpPr>
-        <p:spPr/>
-        <p:txBody>
-          <a:bodyPr/>
-          <a:lstStyle/>
-          <a:p>
-            <a:pPr marL="0" indent="0">
-              <a:buNone/>
-            </a:pPr>
-            <a:r>
-              <a:rPr lang="it-IT" dirty="0"/>
-              <a:t>Per rilevare il contatto tra l’asteroide e il bordo utilizziamo dei collider che ci offre </a:t>
-            </a:r>
-            <a:r>
-              <a:rPr lang="it-IT" dirty="0" err="1"/>
-              <a:t>Unity</a:t>
-            </a:r>
-            <a:r>
-              <a:rPr lang="it-IT" dirty="0"/>
-              <a:t>, andando a definire un collider sferico per l’asteroide e un collider sui bordi possiamo con la funzione «OnTriggerEnter2D» specificare il comportamento che l’asteroide deve avere quando colpisce qualcosa</a:t>
-            </a:r>
-          </a:p>
-        </p:txBody>
-      </p:sp>
-    </p:spTree>
-    <p:extLst>
-      <p:ext uri="{BB962C8B-B14F-4D97-AF65-F5344CB8AC3E}">
-        <p14:creationId xmlns:p14="http://schemas.microsoft.com/office/powerpoint/2010/main" val="2179192037"/>
       </p:ext>
     </p:extLst>
   </p:cSld>
@@ -9071,6 +9057,108 @@
           <p:cNvPr id="2" name="Titolo 1">
             <a:extLst>
               <a:ext uri="{FF2B5EF4-FFF2-40B4-BE49-F238E27FC236}">
+                <a16:creationId xmlns:a16="http://schemas.microsoft.com/office/drawing/2014/main" id="{763A2169-1ECF-4FDB-B88A-F810E0934637}"/>
+              </a:ext>
+            </a:extLst>
+          </p:cNvPr>
+          <p:cNvSpPr>
+            <a:spLocks noGrp="1"/>
+          </p:cNvSpPr>
+          <p:nvPr>
+            <p:ph type="title"/>
+          </p:nvPr>
+        </p:nvSpPr>
+        <p:spPr/>
+        <p:txBody>
+          <a:bodyPr/>
+          <a:lstStyle/>
+          <a:p>
+            <a:r>
+              <a:rPr lang="it-IT" dirty="0"/>
+              <a:t>Rimbalzo </a:t>
+            </a:r>
+            <a:r>
+              <a:rPr lang="it-IT" dirty="0" err="1"/>
+              <a:t>Asteroid</a:t>
+            </a:r>
+            <a:endParaRPr lang="it-IT" dirty="0"/>
+          </a:p>
+        </p:txBody>
+      </p:sp>
+      <p:sp>
+        <p:nvSpPr>
+          <p:cNvPr id="3" name="Segnaposto contenuto 2">
+            <a:extLst>
+              <a:ext uri="{FF2B5EF4-FFF2-40B4-BE49-F238E27FC236}">
+                <a16:creationId xmlns:a16="http://schemas.microsoft.com/office/drawing/2014/main" id="{402764E4-A8F0-4CFE-81A1-186BEB8BC0FD}"/>
+              </a:ext>
+            </a:extLst>
+          </p:cNvPr>
+          <p:cNvSpPr>
+            <a:spLocks noGrp="1"/>
+          </p:cNvSpPr>
+          <p:nvPr>
+            <p:ph idx="1"/>
+          </p:nvPr>
+        </p:nvSpPr>
+        <p:spPr/>
+        <p:txBody>
+          <a:bodyPr/>
+          <a:lstStyle/>
+          <a:p>
+            <a:pPr marL="0" indent="0">
+              <a:buNone/>
+            </a:pPr>
+            <a:r>
+              <a:rPr lang="it-IT" dirty="0"/>
+              <a:t>Per rilevare il contatto tra l’asteroide e il bordo utilizziamo dei collider che ci offre </a:t>
+            </a:r>
+            <a:r>
+              <a:rPr lang="it-IT" dirty="0" err="1"/>
+              <a:t>Unity</a:t>
+            </a:r>
+            <a:r>
+              <a:rPr lang="it-IT" dirty="0"/>
+              <a:t>, andando a definire un collider sferico per l’asteroide e un collider sui bordi possiamo con la funzione «OnTriggerEnter2D» specificare il comportamento che l’asteroide deve avere quando colpisce qualcosa</a:t>
+            </a:r>
+          </a:p>
+        </p:txBody>
+      </p:sp>
+    </p:spTree>
+    <p:extLst>
+      <p:ext uri="{BB962C8B-B14F-4D97-AF65-F5344CB8AC3E}">
+        <p14:creationId xmlns:p14="http://schemas.microsoft.com/office/powerpoint/2010/main" val="2179192037"/>
+      </p:ext>
+    </p:extLst>
+  </p:cSld>
+  <p:clrMapOvr>
+    <a:masterClrMapping/>
+  </p:clrMapOvr>
+</p:sld>
+</file>
+
+<file path=ppt/slides/slide21.xml><?xml version="1.0" encoding="utf-8"?>
+<p:sld xmlns:a="http://schemas.openxmlformats.org/drawingml/2006/main" xmlns:r="http://schemas.openxmlformats.org/officeDocument/2006/relationships" xmlns:p="http://schemas.openxmlformats.org/presentationml/2006/main">
+  <p:cSld>
+    <p:spTree>
+      <p:nvGrpSpPr>
+        <p:cNvPr id="1" name=""/>
+        <p:cNvGrpSpPr/>
+        <p:nvPr/>
+      </p:nvGrpSpPr>
+      <p:grpSpPr>
+        <a:xfrm>
+          <a:off x="0" y="0"/>
+          <a:ext cx="0" cy="0"/>
+          <a:chOff x="0" y="0"/>
+          <a:chExt cx="0" cy="0"/>
+        </a:xfrm>
+      </p:grpSpPr>
+      <p:sp>
+        <p:nvSpPr>
+          <p:cNvPr id="2" name="Titolo 1">
+            <a:extLst>
+              <a:ext uri="{FF2B5EF4-FFF2-40B4-BE49-F238E27FC236}">
                 <a16:creationId xmlns:a16="http://schemas.microsoft.com/office/drawing/2014/main" id="{A8746ED2-5676-43D0-BB63-0A13E1E0A531}"/>
               </a:ext>
             </a:extLst>
@@ -9158,7 +9246,7 @@
 </p:sld>
 </file>
 
-<file path=ppt/slides/slide21.xml><?xml version="1.0" encoding="utf-8"?>
+<file path=ppt/slides/slide22.xml><?xml version="1.0" encoding="utf-8"?>
 <p:sld xmlns:a="http://schemas.openxmlformats.org/drawingml/2006/main" xmlns:r="http://schemas.openxmlformats.org/officeDocument/2006/relationships" xmlns:p="http://schemas.openxmlformats.org/presentationml/2006/main">
   <p:cSld>
     <p:spTree>
@@ -9296,10 +9384,6 @@
             <a:pPr marL="0" indent="0">
               <a:buNone/>
             </a:pPr>
-            <a:r>
-              <a:rPr lang="it-IT" dirty="0"/>
-              <a:t/>
-            </a:r>
             <a:br>
               <a:rPr lang="it-IT" dirty="0"/>
             </a:br>
@@ -9380,7 +9464,7 @@
 </p:sld>
 </file>
 
-<file path=ppt/slides/slide22.xml><?xml version="1.0" encoding="utf-8"?>
+<file path=ppt/slides/slide23.xml><?xml version="1.0" encoding="utf-8"?>
 <p:sld xmlns:a="http://schemas.openxmlformats.org/drawingml/2006/main" xmlns:r="http://schemas.openxmlformats.org/officeDocument/2006/relationships" xmlns:p="http://schemas.openxmlformats.org/presentationml/2006/main">
   <p:cSld>
     <p:spTree>
@@ -9516,7 +9600,7 @@
 </p:sld>
 </file>
 
-<file path=ppt/slides/slide23.xml><?xml version="1.0" encoding="utf-8"?>
+<file path=ppt/slides/slide24.xml><?xml version="1.0" encoding="utf-8"?>
 <p:sld xmlns:a="http://schemas.openxmlformats.org/drawingml/2006/main" xmlns:r="http://schemas.openxmlformats.org/officeDocument/2006/relationships" xmlns:p="http://schemas.openxmlformats.org/presentationml/2006/main">
   <p:cSld>
     <p:spTree>
@@ -10373,13 +10457,7 @@
                           <a:rPr lang="it-IT" sz="1000" i="1" dirty="0" smtClean="0">
                             <a:latin typeface="Cambria Math" panose="02040503050406030204" pitchFamily="18" charset="0"/>
                           </a:rPr>
-                          <m:t>𝑝𝑜𝑠𝑖𝑡𝑖𝑜</m:t>
-                        </m:r>
-                        <m:r>
-                          <a:rPr lang="it-IT" sz="1000" b="0" i="1" dirty="0" smtClean="0">
-                            <a:latin typeface="Cambria Math" panose="02040503050406030204" pitchFamily="18" charset="0"/>
-                          </a:rPr>
-                          <m:t>𝑛</m:t>
+                          <m:t>𝑝𝑜𝑠𝑖𝑡𝑖𝑜𝑛</m:t>
                         </m:r>
                       </m:oMath>
                     </m:oMathPara>
@@ -11806,8 +11884,8 @@
           </a:fontRef>
         </p:style>
       </p:cxnSp>
-      <mc:AlternateContent xmlns:mc="http://schemas.openxmlformats.org/markup-compatibility/2006">
-        <mc:Choice xmlns:a14="http://schemas.microsoft.com/office/drawing/2010/main" Requires="a14">
+      <mc:AlternateContent xmlns:mc="http://schemas.openxmlformats.org/markup-compatibility/2006" xmlns:a14="http://schemas.microsoft.com/office/drawing/2010/main">
+        <mc:Choice Requires="a14">
           <p:sp>
             <p:nvSpPr>
               <p:cNvPr id="88" name="CasellaDiTesto 87"/>
@@ -11851,7 +11929,7 @@
             </p:txBody>
           </p:sp>
         </mc:Choice>
-        <mc:Fallback>
+        <mc:Fallback xmlns="">
           <p:sp>
             <p:nvSpPr>
               <p:cNvPr id="88" name="CasellaDiTesto 87"/>
@@ -12380,13 +12458,7 @@
                           <a:rPr lang="it-IT" sz="1000" i="1" dirty="0" smtClean="0">
                             <a:latin typeface="Cambria Math" panose="02040503050406030204" pitchFamily="18" charset="0"/>
                           </a:rPr>
-                          <m:t>𝑝𝑜𝑠𝑖𝑡𝑖𝑜</m:t>
-                        </m:r>
-                        <m:r>
-                          <a:rPr lang="it-IT" sz="1000" b="0" i="1" dirty="0" smtClean="0">
-                            <a:latin typeface="Cambria Math" panose="02040503050406030204" pitchFamily="18" charset="0"/>
-                          </a:rPr>
-                          <m:t>𝑛</m:t>
+                          <m:t>𝑝𝑜𝑠𝑖𝑡𝑖𝑜𝑛</m:t>
                         </m:r>
                       </m:oMath>
                     </m:oMathPara>
@@ -13612,8 +13684,8 @@
           </a:fontRef>
         </p:style>
       </p:cxnSp>
-      <mc:AlternateContent xmlns:mc="http://schemas.openxmlformats.org/markup-compatibility/2006">
-        <mc:Choice xmlns:a14="http://schemas.microsoft.com/office/drawing/2010/main" Requires="a14">
+      <mc:AlternateContent xmlns:mc="http://schemas.openxmlformats.org/markup-compatibility/2006" xmlns:a14="http://schemas.microsoft.com/office/drawing/2010/main">
+        <mc:Choice Requires="a14">
           <p:sp>
             <p:nvSpPr>
               <p:cNvPr id="153" name="CasellaDiTesto 152"/>
@@ -13657,7 +13729,7 @@
             </p:txBody>
           </p:sp>
         </mc:Choice>
-        <mc:Fallback>
+        <mc:Fallback xmlns="">
           <p:sp>
             <p:nvSpPr>
               <p:cNvPr id="153" name="CasellaDiTesto 152"/>
@@ -13757,14 +13829,13 @@
               <a:t>Input: </a:t>
             </a:r>
             <a:r>
-              <a:rPr lang="it-IT" sz="900" i="1" dirty="0" err="1" smtClean="0"/>
+              <a:rPr lang="it-IT" sz="900" i="1" dirty="0" err="1"/>
               <a:t>Stop,RestartA</a:t>
             </a:r>
             <a:r>
-              <a:rPr lang="it-IT" sz="900" dirty="0" smtClean="0"/>
+              <a:rPr lang="it-IT" sz="900" dirty="0"/>
               <a:t> </a:t>
             </a:r>
-            <a:endParaRPr lang="it-IT" sz="900" dirty="0"/>
           </a:p>
           <a:p>
             <a:r>
@@ -13840,8 +13911,8 @@
           </a:p>
         </p:txBody>
       </p:sp>
-      <mc:AlternateContent xmlns:mc="http://schemas.openxmlformats.org/markup-compatibility/2006">
-        <mc:Choice xmlns:a14="http://schemas.microsoft.com/office/drawing/2010/main" Requires="a14">
+      <mc:AlternateContent xmlns:mc="http://schemas.openxmlformats.org/markup-compatibility/2006" xmlns:a14="http://schemas.microsoft.com/office/drawing/2010/main">
+        <mc:Choice Requires="a14">
           <p:sp>
             <p:nvSpPr>
               <p:cNvPr id="166" name="CasellaDiTesto 165"/>
@@ -13963,14 +14034,13 @@
                   <a:t>Input: </a:t>
                 </a:r>
                 <a:r>
-                  <a:rPr lang="it-IT" sz="900" i="1" dirty="0" err="1" smtClean="0"/>
+                  <a:rPr lang="it-IT" sz="900" i="1" dirty="0" err="1"/>
                   <a:t>Stop,RestartA</a:t>
                 </a:r>
                 <a:r>
-                  <a:rPr lang="it-IT" sz="900" dirty="0" smtClean="0"/>
+                  <a:rPr lang="it-IT" sz="900" dirty="0"/>
                   <a:t> </a:t>
                 </a:r>
-                <a:endParaRPr lang="it-IT" sz="900" dirty="0"/>
               </a:p>
               <a:p>
                 <a:r>
@@ -13993,7 +14063,7 @@
             </p:txBody>
           </p:sp>
         </mc:Choice>
-        <mc:Fallback>
+        <mc:Fallback xmlns="">
           <p:sp>
             <p:nvSpPr>
               <p:cNvPr id="166" name="CasellaDiTesto 165"/>
@@ -14093,14 +14163,13 @@
               <a:t>Input: </a:t>
             </a:r>
             <a:r>
-              <a:rPr lang="it-IT" sz="1200" dirty="0" err="1" smtClean="0"/>
+              <a:rPr lang="it-IT" sz="1200" dirty="0" err="1"/>
               <a:t>position,w,a,s,d,RestartS</a:t>
             </a:r>
             <a:r>
-              <a:rPr lang="it-IT" sz="1200" dirty="0" smtClean="0"/>
+              <a:rPr lang="it-IT" sz="1200" dirty="0"/>
               <a:t>  </a:t>
             </a:r>
-            <a:endParaRPr lang="it-IT" sz="1200" dirty="0"/>
           </a:p>
           <a:p>
             <a:r>
@@ -14112,7 +14181,7 @@
               <a:t>: </a:t>
             </a:r>
             <a:r>
-              <a:rPr lang="it-IT" sz="1200" dirty="0" err="1" smtClean="0"/>
+              <a:rPr lang="it-IT" sz="1200" dirty="0" err="1"/>
               <a:t>Stop,RestartA</a:t>
             </a:r>
             <a:endParaRPr lang="it-IT" sz="1200" dirty="0"/>
@@ -14299,8 +14368,8 @@
           </a:fontRef>
         </p:style>
       </p:cxnSp>
-      <mc:AlternateContent xmlns:mc="http://schemas.openxmlformats.org/markup-compatibility/2006">
-        <mc:Choice xmlns:a14="http://schemas.microsoft.com/office/drawing/2010/main" Requires="a14">
+      <mc:AlternateContent xmlns:mc="http://schemas.openxmlformats.org/markup-compatibility/2006" xmlns:a14="http://schemas.microsoft.com/office/drawing/2010/main">
+        <mc:Choice Requires="a14">
           <p:sp>
             <p:nvSpPr>
               <p:cNvPr id="183" name="CasellaDiTesto 182"/>
@@ -14422,14 +14491,13 @@
                   <a:t>Input: </a:t>
                 </a:r>
                 <a:r>
-                  <a:rPr lang="it-IT" sz="900" i="1" dirty="0" err="1" smtClean="0"/>
+                  <a:rPr lang="it-IT" sz="900" i="1" dirty="0" err="1"/>
                   <a:t>Stop,RestartA</a:t>
                 </a:r>
                 <a:r>
-                  <a:rPr lang="it-IT" sz="900" dirty="0" smtClean="0"/>
+                  <a:rPr lang="it-IT" sz="900" dirty="0"/>
                   <a:t> </a:t>
                 </a:r>
-                <a:endParaRPr lang="it-IT" sz="900" dirty="0"/>
               </a:p>
               <a:p>
                 <a:r>
@@ -14452,7 +14520,7 @@
             </p:txBody>
           </p:sp>
         </mc:Choice>
-        <mc:Fallback>
+        <mc:Fallback xmlns="">
           <p:sp>
             <p:nvSpPr>
               <p:cNvPr id="183" name="CasellaDiTesto 182"/>
@@ -14514,7 +14582,8 @@
             <a:solidFill>
               <a:schemeClr val="tx1"/>
             </a:solidFill>
-            <a:tailEnd type="triangle"/>
+            <a:headEnd type="none" w="med" len="med"/>
+            <a:tailEnd type="arrow" w="med" len="med"/>
           </a:ln>
         </p:spPr>
         <p:style>
@@ -14532,8 +14601,8 @@
           </a:fontRef>
         </p:style>
       </p:cxnSp>
-      <mc:AlternateContent xmlns:mc="http://schemas.openxmlformats.org/markup-compatibility/2006">
-        <mc:Choice xmlns:a14="http://schemas.microsoft.com/office/drawing/2010/main" Requires="a14">
+      <mc:AlternateContent xmlns:mc="http://schemas.openxmlformats.org/markup-compatibility/2006" xmlns:a14="http://schemas.microsoft.com/office/drawing/2010/main">
+        <mc:Choice Requires="a14">
           <p:sp>
             <p:nvSpPr>
               <p:cNvPr id="72" name="CasellaDiTesto 71"/>
@@ -14589,7 +14658,7 @@
             </p:txBody>
           </p:sp>
         </mc:Choice>
-        <mc:Fallback>
+        <mc:Fallback xmlns="">
           <p:sp>
             <p:nvSpPr>
               <p:cNvPr id="72" name="CasellaDiTesto 71"/>
@@ -14665,8 +14734,8 @@
           </a:fontRef>
         </p:style>
       </p:cxnSp>
-      <mc:AlternateContent xmlns:mc="http://schemas.openxmlformats.org/markup-compatibility/2006">
-        <mc:Choice xmlns:a14="http://schemas.microsoft.com/office/drawing/2010/main" Requires="a14">
+      <mc:AlternateContent xmlns:mc="http://schemas.openxmlformats.org/markup-compatibility/2006" xmlns:a14="http://schemas.microsoft.com/office/drawing/2010/main">
+        <mc:Choice Requires="a14">
           <p:sp>
             <p:nvSpPr>
               <p:cNvPr id="77" name="CasellaDiTesto 76"/>
@@ -14710,7 +14779,7 @@
             </p:txBody>
           </p:sp>
         </mc:Choice>
-        <mc:Fallback>
+        <mc:Fallback xmlns="">
           <p:sp>
             <p:nvSpPr>
               <p:cNvPr id="77" name="CasellaDiTesto 76"/>
@@ -14857,8 +14926,8 @@
           </a:fontRef>
         </p:style>
       </p:cxnSp>
-      <mc:AlternateContent xmlns:mc="http://schemas.openxmlformats.org/markup-compatibility/2006">
-        <mc:Choice xmlns:a14="http://schemas.microsoft.com/office/drawing/2010/main" Requires="a14">
+      <mc:AlternateContent xmlns:mc="http://schemas.openxmlformats.org/markup-compatibility/2006" xmlns:a14="http://schemas.microsoft.com/office/drawing/2010/main">
+        <mc:Choice Requires="a14">
           <p:sp>
             <p:nvSpPr>
               <p:cNvPr id="81" name="CasellaDiTesto 80"/>
@@ -14902,7 +14971,7 @@
             </p:txBody>
           </p:sp>
         </mc:Choice>
-        <mc:Fallback>
+        <mc:Fallback xmlns="">
           <p:sp>
             <p:nvSpPr>
               <p:cNvPr id="81" name="CasellaDiTesto 80"/>
@@ -14982,8 +15051,8 @@
           </a:fontRef>
         </p:style>
       </p:cxnSp>
-      <mc:AlternateContent xmlns:mc="http://schemas.openxmlformats.org/markup-compatibility/2006">
-        <mc:Choice xmlns:a14="http://schemas.microsoft.com/office/drawing/2010/main" Requires="a14">
+      <mc:AlternateContent xmlns:mc="http://schemas.openxmlformats.org/markup-compatibility/2006" xmlns:a14="http://schemas.microsoft.com/office/drawing/2010/main">
+        <mc:Choice Requires="a14">
           <p:sp>
             <p:nvSpPr>
               <p:cNvPr id="90" name="CasellaDiTesto 89"/>
@@ -15033,7 +15102,7 @@
             </p:txBody>
           </p:sp>
         </mc:Choice>
-        <mc:Fallback>
+        <mc:Fallback xmlns="">
           <p:sp>
             <p:nvSpPr>
               <p:cNvPr id="90" name="CasellaDiTesto 89"/>
@@ -15072,8 +15141,8 @@
           </p:sp>
         </mc:Fallback>
       </mc:AlternateContent>
-      <mc:AlternateContent xmlns:mc="http://schemas.openxmlformats.org/markup-compatibility/2006">
-        <mc:Choice xmlns:a14="http://schemas.microsoft.com/office/drawing/2010/main" Requires="a14">
+      <mc:AlternateContent xmlns:mc="http://schemas.openxmlformats.org/markup-compatibility/2006" xmlns:a14="http://schemas.microsoft.com/office/drawing/2010/main">
+        <mc:Choice Requires="a14">
           <p:sp>
             <p:nvSpPr>
               <p:cNvPr id="91" name="CasellaDiTesto 90"/>
@@ -15149,7 +15218,7 @@
                     </m:oMath>
                   </m:oMathPara>
                 </a14:m>
-                <a:endParaRPr lang="it-IT" sz="1000" b="0" i="1" dirty="0" smtClean="0">
+                <a:endParaRPr lang="it-IT" sz="1000" b="0" i="1" dirty="0">
                   <a:latin typeface="Cambria Math" panose="02040503050406030204" pitchFamily="18" charset="0"/>
                 </a:endParaRPr>
               </a:p>
@@ -15207,11 +15276,12 @@
                     </m:oMath>
                   </m:oMathPara>
                 </a14:m>
-                <a:endParaRPr lang="it-IT" sz="1000" b="0" i="1" dirty="0" smtClean="0">
+                <a:endParaRPr lang="it-IT" sz="1000" b="0" i="1" dirty="0">
                   <a:latin typeface="Cambria Math" panose="02040503050406030204" pitchFamily="18" charset="0"/>
                 </a:endParaRPr>
               </a:p>
               <a:p>
+                <a:pPr/>
                 <a14:m>
                   <m:oMathPara xmlns:m="http://schemas.openxmlformats.org/officeDocument/2006/math">
                     <m:oMathParaPr>
@@ -15267,11 +15337,12 @@
                     </m:oMath>
                   </m:oMathPara>
                 </a14:m>
-                <a:endParaRPr lang="it-IT" sz="1000" i="1" baseline="-25000" dirty="0" smtClean="0">
+                <a:endParaRPr lang="it-IT" sz="1000" i="1" baseline="-25000" dirty="0">
                   <a:latin typeface="Cambria Math" panose="02040503050406030204" pitchFamily="18" charset="0"/>
                 </a:endParaRPr>
               </a:p>
               <a:p>
+                <a:pPr/>
                 <a14:m>
                   <m:oMathPara xmlns:m="http://schemas.openxmlformats.org/officeDocument/2006/math">
                     <m:oMathParaPr>
@@ -15305,17 +15376,15 @@
                 <a:endParaRPr lang="it-IT" sz="1000" baseline="-25000" dirty="0"/>
               </a:p>
               <a:p>
-                <a:pPr/>
-                <a:endParaRPr lang="it-IT" sz="1000" baseline="-25000" dirty="0" smtClean="0"/>
+                <a:endParaRPr lang="it-IT" sz="1000" baseline="-25000" dirty="0"/>
               </a:p>
               <a:p>
-                <a:pPr/>
                 <a:endParaRPr lang="it-IT" sz="1000" baseline="-25000" dirty="0"/>
               </a:p>
             </p:txBody>
           </p:sp>
         </mc:Choice>
-        <mc:Fallback>
+        <mc:Fallback xmlns="">
           <p:sp>
             <p:nvSpPr>
               <p:cNvPr id="91" name="CasellaDiTesto 90"/>
@@ -15392,8 +15461,8 @@
           </a:fontRef>
         </p:style>
       </p:cxnSp>
-      <mc:AlternateContent xmlns:mc="http://schemas.openxmlformats.org/markup-compatibility/2006">
-        <mc:Choice xmlns:a14="http://schemas.microsoft.com/office/drawing/2010/main" Requires="a14">
+      <mc:AlternateContent xmlns:mc="http://schemas.openxmlformats.org/markup-compatibility/2006" xmlns:a14="http://schemas.microsoft.com/office/drawing/2010/main">
+        <mc:Choice Requires="a14">
           <p:sp>
             <p:nvSpPr>
               <p:cNvPr id="94" name="CasellaDiTesto 93"/>
@@ -15443,7 +15512,7 @@
             </p:txBody>
           </p:sp>
         </mc:Choice>
-        <mc:Fallback>
+        <mc:Fallback xmlns="">
           <p:sp>
             <p:nvSpPr>
               <p:cNvPr id="94" name="CasellaDiTesto 93"/>
@@ -15482,8 +15551,8 @@
           </p:sp>
         </mc:Fallback>
       </mc:AlternateContent>
-      <mc:AlternateContent xmlns:mc="http://schemas.openxmlformats.org/markup-compatibility/2006">
-        <mc:Choice xmlns:a14="http://schemas.microsoft.com/office/drawing/2010/main" Requires="a14">
+      <mc:AlternateContent xmlns:mc="http://schemas.openxmlformats.org/markup-compatibility/2006" xmlns:a14="http://schemas.microsoft.com/office/drawing/2010/main">
+        <mc:Choice Requires="a14">
           <p:sp>
             <p:nvSpPr>
               <p:cNvPr id="95" name="CasellaDiTesto 94"/>
@@ -15559,7 +15628,7 @@
                     </m:oMath>
                   </m:oMathPara>
                 </a14:m>
-                <a:endParaRPr lang="it-IT" sz="1000" b="0" i="1" dirty="0" smtClean="0">
+                <a:endParaRPr lang="it-IT" sz="1000" b="0" i="1" dirty="0">
                   <a:latin typeface="Cambria Math" panose="02040503050406030204" pitchFamily="18" charset="0"/>
                 </a:endParaRPr>
               </a:p>
@@ -15617,11 +15686,12 @@
                     </m:oMath>
                   </m:oMathPara>
                 </a14:m>
-                <a:endParaRPr lang="it-IT" sz="1000" b="0" i="1" dirty="0" smtClean="0">
+                <a:endParaRPr lang="it-IT" sz="1000" b="0" i="1" dirty="0">
                   <a:latin typeface="Cambria Math" panose="02040503050406030204" pitchFamily="18" charset="0"/>
                 </a:endParaRPr>
               </a:p>
               <a:p>
+                <a:pPr/>
                 <a14:m>
                   <m:oMathPara xmlns:m="http://schemas.openxmlformats.org/officeDocument/2006/math">
                     <m:oMathParaPr>
@@ -15671,11 +15741,12 @@
                     </m:oMath>
                   </m:oMathPara>
                 </a14:m>
-                <a:endParaRPr lang="it-IT" sz="1000" i="1" dirty="0" smtClean="0">
+                <a:endParaRPr lang="it-IT" sz="1000" i="1" dirty="0">
                   <a:latin typeface="Cambria Math" panose="02040503050406030204" pitchFamily="18" charset="0"/>
                 </a:endParaRPr>
               </a:p>
               <a:p>
+                <a:pPr/>
                 <a14:m>
                   <m:oMathPara xmlns:m="http://schemas.openxmlformats.org/officeDocument/2006/math">
                     <m:oMathParaPr>
@@ -15694,14 +15765,7 @@
                           <a:latin typeface="Cambria Math" panose="02040503050406030204" pitchFamily="18" charset="0"/>
                           <a:ea typeface="Cambria Math" panose="02040503050406030204" pitchFamily="18" charset="0"/>
                         </a:rPr>
-                        <m:t>=</m:t>
-                      </m:r>
-                      <m:r>
-                        <a:rPr lang="it-IT" sz="1000" i="1" dirty="0">
-                          <a:latin typeface="Cambria Math" panose="02040503050406030204" pitchFamily="18" charset="0"/>
-                          <a:ea typeface="Cambria Math" panose="02040503050406030204" pitchFamily="18" charset="0"/>
-                        </a:rPr>
-                        <m:t>0</m:t>
+                        <m:t>=0</m:t>
                       </m:r>
                     </m:oMath>
                   </m:oMathPara>
@@ -15730,7 +15794,7 @@
             </p:txBody>
           </p:sp>
         </mc:Choice>
-        <mc:Fallback>
+        <mc:Fallback xmlns="">
           <p:sp>
             <p:nvSpPr>
               <p:cNvPr id="95" name="CasellaDiTesto 94"/>
@@ -15865,14 +15929,9 @@
           <a:lstStyle/>
           <a:p>
             <a:r>
-              <a:rPr lang="it-IT" sz="1500" dirty="0" smtClean="0"/>
-              <a:t>Input</a:t>
-            </a:r>
-            <a:r>
-              <a:rPr lang="it-IT" sz="1500" dirty="0" smtClean="0"/>
-              <a:t>:</a:t>
-            </a:r>
-            <a:endParaRPr lang="it-IT" sz="1500" dirty="0"/>
+              <a:rPr lang="it-IT" sz="1500" dirty="0"/>
+              <a:t>Input:</a:t>
+            </a:r>
           </a:p>
           <a:p>
             <a:pPr marL="447675" indent="-180975">
@@ -15883,11 +15942,11 @@
               </a:tabLst>
             </a:pPr>
             <a:r>
-              <a:rPr lang="it-IT" sz="1500" i="1" dirty="0" smtClean="0"/>
+              <a:rPr lang="it-IT" sz="1500" i="1" dirty="0"/>
               <a:t>Stop </a:t>
             </a:r>
             <a:r>
-              <a:rPr lang="it-IT" sz="1500" dirty="0" smtClean="0"/>
+              <a:rPr lang="it-IT" sz="1500" dirty="0"/>
               <a:t>(Segnale inviato dalla navicella che indica una collisione)</a:t>
             </a:r>
           </a:p>
@@ -15900,14 +15959,13 @@
               </a:tabLst>
             </a:pPr>
             <a:r>
-              <a:rPr lang="it-IT" sz="1500" dirty="0" err="1" smtClean="0"/>
+              <a:rPr lang="it-IT" sz="1500" dirty="0" err="1"/>
               <a:t>RestartA</a:t>
             </a:r>
             <a:r>
-              <a:rPr lang="it-IT" sz="1500" dirty="0" smtClean="0"/>
+              <a:rPr lang="it-IT" sz="1500" dirty="0"/>
               <a:t> (Segnale inviato dalla navicella che indica di inizializzare la posizione dell’asteroide)</a:t>
             </a:r>
-            <a:endParaRPr lang="it-IT" sz="1500" dirty="0"/>
           </a:p>
         </p:txBody>
       </p:sp>
@@ -16824,13 +16882,7 @@
                             <a:rPr lang="it-IT" sz="1000" i="1" dirty="0" smtClean="0">
                               <a:latin typeface="Cambria Math" panose="02040503050406030204" pitchFamily="18" charset="0"/>
                             </a:rPr>
-                            <m:t>𝑝𝑜𝑠𝑖𝑡𝑖𝑜</m:t>
-                          </m:r>
-                          <m:r>
-                            <a:rPr lang="it-IT" sz="1000" b="0" i="1" dirty="0" smtClean="0">
-                              <a:latin typeface="Cambria Math" panose="02040503050406030204" pitchFamily="18" charset="0"/>
-                            </a:rPr>
-                            <m:t>𝑛</m:t>
+                            <m:t>𝑝𝑜𝑠𝑖𝑡𝑖𝑜𝑛</m:t>
                           </m:r>
                         </m:oMath>
                       </m:oMathPara>
@@ -17946,11 +17998,7 @@
             </a:r>
             <a:r>
               <a:rPr lang="it-IT" sz="1500" dirty="0"/>
-              <a:t>(posizione asteroide</a:t>
-            </a:r>
-            <a:r>
-              <a:rPr lang="it-IT" sz="1500" dirty="0" smtClean="0"/>
-              <a:t>)</a:t>
+              <a:t>(posizione asteroide)</a:t>
             </a:r>
           </a:p>
           <a:p>
@@ -17959,10 +18007,9 @@
               <a:buChar char="•"/>
             </a:pPr>
             <a:r>
-              <a:rPr lang="it-IT" sz="1500" dirty="0" smtClean="0"/>
+              <a:rPr lang="it-IT" sz="1500" dirty="0"/>
               <a:t>p (punteggio, aumenta ad ogni rimbalzo)</a:t>
             </a:r>
-            <a:endParaRPr lang="it-IT" sz="1500" dirty="0"/>
           </a:p>
           <a:p>
             <a:pPr marL="266700" indent="-266700">
@@ -18109,8 +18156,8 @@
           </a:fontRef>
         </p:style>
       </p:cxnSp>
-      <mc:AlternateContent xmlns:mc="http://schemas.openxmlformats.org/markup-compatibility/2006">
-        <mc:Choice xmlns:a14="http://schemas.microsoft.com/office/drawing/2010/main" Requires="a14">
+      <mc:AlternateContent xmlns:mc="http://schemas.openxmlformats.org/markup-compatibility/2006" xmlns:a14="http://schemas.microsoft.com/office/drawing/2010/main">
+        <mc:Choice Requires="a14">
           <p:sp>
             <p:nvSpPr>
               <p:cNvPr id="35" name="CasellaDiTesto 34"/>
@@ -18160,7 +18207,7 @@
             </p:txBody>
           </p:sp>
         </mc:Choice>
-        <mc:Fallback>
+        <mc:Fallback xmlns="">
           <p:sp>
             <p:nvSpPr>
               <p:cNvPr id="35" name="CasellaDiTesto 34"/>
@@ -18265,8 +18312,8 @@
           </a:p>
         </p:txBody>
       </p:sp>
-      <mc:AlternateContent xmlns:mc="http://schemas.openxmlformats.org/markup-compatibility/2006">
-        <mc:Choice xmlns:a14="http://schemas.microsoft.com/office/drawing/2010/main" Requires="a14">
+      <mc:AlternateContent xmlns:mc="http://schemas.openxmlformats.org/markup-compatibility/2006" xmlns:a14="http://schemas.microsoft.com/office/drawing/2010/main">
+        <mc:Choice Requires="a14">
           <p:sp>
             <p:nvSpPr>
               <p:cNvPr id="41" name="CasellaDiTesto 40"/>
@@ -18342,7 +18389,7 @@
                     </m:oMath>
                   </m:oMathPara>
                 </a14:m>
-                <a:endParaRPr lang="it-IT" sz="1000" b="0" i="0" dirty="0" smtClean="0">
+                <a:endParaRPr lang="it-IT" sz="1000" b="0" i="0" dirty="0">
                   <a:latin typeface="Cambria Math" panose="02040503050406030204" pitchFamily="18" charset="0"/>
                 </a:endParaRPr>
               </a:p>
@@ -18400,7 +18447,7 @@
                     </m:oMath>
                   </m:oMathPara>
                 </a14:m>
-                <a:endParaRPr lang="it-IT" sz="1000" b="0" i="1" dirty="0" smtClean="0">
+                <a:endParaRPr lang="it-IT" sz="1000" b="0" i="1" dirty="0">
                   <a:latin typeface="Cambria Math" panose="02040503050406030204" pitchFamily="18" charset="0"/>
                 </a:endParaRPr>
               </a:p>
@@ -18455,7 +18502,7 @@
                     </m:oMath>
                   </m:oMathPara>
                 </a14:m>
-                <a:endParaRPr lang="it-IT" sz="1000" i="1" dirty="0" smtClean="0">
+                <a:endParaRPr lang="it-IT" sz="1000" i="1" dirty="0">
                   <a:latin typeface="Cambria Math" panose="02040503050406030204" pitchFamily="18" charset="0"/>
                 </a:endParaRPr>
               </a:p>
@@ -18479,19 +18526,7 @@
                           <a:latin typeface="Cambria Math" panose="02040503050406030204" pitchFamily="18" charset="0"/>
                           <a:ea typeface="Cambria Math" panose="02040503050406030204" pitchFamily="18" charset="0"/>
                         </a:rPr>
-                        <m:t>=</m:t>
-                      </m:r>
-                      <m:r>
-                        <a:rPr lang="it-IT" sz="1000" b="0" i="1" dirty="0" smtClean="0">
-                          <a:latin typeface="Cambria Math" panose="02040503050406030204" pitchFamily="18" charset="0"/>
-                        </a:rPr>
-                        <m:t>0</m:t>
-                      </m:r>
-                      <m:r>
-                        <a:rPr lang="it-IT" sz="1000" i="1" baseline="-25000" dirty="0" smtClean="0">
-                          <a:latin typeface="Cambria Math" panose="02040503050406030204" pitchFamily="18" charset="0"/>
-                        </a:rPr>
-                        <m:t> </m:t>
+                        <m:t>=0 </m:t>
                       </m:r>
                     </m:oMath>
                   </m:oMathPara>
@@ -18501,7 +18536,7 @@
             </p:txBody>
           </p:sp>
         </mc:Choice>
-        <mc:Fallback>
+        <mc:Fallback xmlns="">
           <p:sp>
             <p:nvSpPr>
               <p:cNvPr id="41" name="CasellaDiTesto 40"/>
@@ -26543,14 +26578,6 @@
   <p:clrMapOvr>
     <a:masterClrMapping/>
   </p:clrMapOvr>
-  <mc:AlternateContent xmlns:mc="http://schemas.openxmlformats.org/markup-compatibility/2006">
-    <mc:Choice xmlns:p14="http://schemas.microsoft.com/office/powerpoint/2010/main" Requires="p14">
-      <p:transition spd="slow" p14:dur="2000"/>
-    </mc:Choice>
-    <mc:Fallback>
-      <p:transition spd="slow"/>
-    </mc:Fallback>
-  </mc:AlternateContent>
 </p:sld>
 </file>
 
@@ -27217,14 +27244,6 @@
   <p:clrMapOvr>
     <a:masterClrMapping/>
   </p:clrMapOvr>
-  <mc:AlternateContent xmlns:mc="http://schemas.openxmlformats.org/markup-compatibility/2006">
-    <mc:Choice xmlns:p14="http://schemas.microsoft.com/office/powerpoint/2010/main" Requires="p14">
-      <p:transition spd="slow" p14:dur="2000"/>
-    </mc:Choice>
-    <mc:Fallback>
-      <p:transition spd="slow"/>
-    </mc:Fallback>
-  </mc:AlternateContent>
 </p:sld>
 </file>
 
@@ -27891,14 +27910,6 @@
   <p:clrMapOvr>
     <a:masterClrMapping/>
   </p:clrMapOvr>
-  <mc:AlternateContent xmlns:mc="http://schemas.openxmlformats.org/markup-compatibility/2006">
-    <mc:Choice xmlns:p14="http://schemas.microsoft.com/office/powerpoint/2010/main" Requires="p14">
-      <p:transition spd="slow" p14:dur="2000"/>
-    </mc:Choice>
-    <mc:Fallback>
-      <p:transition spd="slow"/>
-    </mc:Fallback>
-  </mc:AlternateContent>
 </p:sld>
 </file>
 
@@ -28565,14 +28576,6 @@
   <p:clrMapOvr>
     <a:masterClrMapping/>
   </p:clrMapOvr>
-  <mc:AlternateContent xmlns:mc="http://schemas.openxmlformats.org/markup-compatibility/2006">
-    <mc:Choice xmlns:p14="http://schemas.microsoft.com/office/powerpoint/2010/main" Requires="p14">
-      <p:transition spd="slow" p14:dur="2000"/>
-    </mc:Choice>
-    <mc:Fallback>
-      <p:transition spd="slow"/>
-    </mc:Fallback>
-  </mc:AlternateContent>
 </p:sld>
 </file>
 

</xml_diff>

<commit_message>
Usato velocity al posto di add force e modificato di conseguenza le slide
</commit_message>
<xml_diff>
--- a/Progetto sistemi.pptx
+++ b/Progetto sistemi.pptx
@@ -5,10 +5,10 @@
     <p:sldMasterId id="2147483648" r:id="rId1"/>
   </p:sldMasterIdLst>
   <p:notesMasterIdLst>
-    <p:notesMasterId r:id="rId26"/>
+    <p:notesMasterId r:id="rId27"/>
   </p:notesMasterIdLst>
   <p:handoutMasterIdLst>
-    <p:handoutMasterId r:id="rId27"/>
+    <p:handoutMasterId r:id="rId28"/>
   </p:handoutMasterIdLst>
   <p:sldIdLst>
     <p:sldId id="256" r:id="rId2"/>
@@ -30,11 +30,12 @@
     <p:sldId id="271" r:id="rId18"/>
     <p:sldId id="272" r:id="rId19"/>
     <p:sldId id="273" r:id="rId20"/>
-    <p:sldId id="275" r:id="rId21"/>
-    <p:sldId id="276" r:id="rId22"/>
-    <p:sldId id="277" r:id="rId23"/>
-    <p:sldId id="278" r:id="rId24"/>
-    <p:sldId id="279" r:id="rId25"/>
+    <p:sldId id="287" r:id="rId21"/>
+    <p:sldId id="275" r:id="rId22"/>
+    <p:sldId id="276" r:id="rId23"/>
+    <p:sldId id="277" r:id="rId24"/>
+    <p:sldId id="278" r:id="rId25"/>
+    <p:sldId id="279" r:id="rId26"/>
   </p:sldIdLst>
   <p:sldSz cx="12192000" cy="6858000"/>
   <p:notesSz cx="6858000" cy="9144000"/>
@@ -161,6 +162,7 @@
             <p14:sldId id="271"/>
             <p14:sldId id="272"/>
             <p14:sldId id="273"/>
+            <p14:sldId id="287"/>
             <p14:sldId id="275"/>
             <p14:sldId id="276"/>
             <p14:sldId id="277"/>
@@ -1370,7 +1372,10 @@
           <a:bodyPr/>
           <a:lstStyle/>
           <a:p>
-            <a:endParaRPr lang="it-IT" dirty="0"/>
+            <a:r>
+              <a:rPr lang="it-IT" dirty="0"/>
+              <a:t>La velocità è definita in metri al secondo</a:t>
+            </a:r>
           </a:p>
         </p:txBody>
       </p:sp>
@@ -1391,7 +1396,7 @@
           <a:p>
             <a:fld id="{AF5D5AC8-672A-409E-B76F-2374AA227A07}" type="slidenum">
               <a:rPr lang="it-IT" smtClean="0"/>
-              <a:t>22</a:t>
+              <a:t>20</a:t>
             </a:fld>
             <a:endParaRPr lang="it-IT"/>
           </a:p>
@@ -1400,7 +1405,7 @@
     </p:spTree>
     <p:extLst>
       <p:ext uri="{BB962C8B-B14F-4D97-AF65-F5344CB8AC3E}">
-        <p14:creationId xmlns:p14="http://schemas.microsoft.com/office/powerpoint/2010/main" val="2549722405"/>
+        <p14:creationId xmlns:p14="http://schemas.microsoft.com/office/powerpoint/2010/main" val="815827806"/>
       </p:ext>
     </p:extLst>
   </p:cSld>
@@ -1475,7 +1480,91 @@
           <a:p>
             <a:fld id="{AF5D5AC8-672A-409E-B76F-2374AA227A07}" type="slidenum">
               <a:rPr lang="it-IT" smtClean="0"/>
-              <a:t>24</a:t>
+              <a:t>23</a:t>
+            </a:fld>
+            <a:endParaRPr lang="it-IT"/>
+          </a:p>
+        </p:txBody>
+      </p:sp>
+    </p:spTree>
+    <p:extLst>
+      <p:ext uri="{BB962C8B-B14F-4D97-AF65-F5344CB8AC3E}">
+        <p14:creationId xmlns:p14="http://schemas.microsoft.com/office/powerpoint/2010/main" val="2549722405"/>
+      </p:ext>
+    </p:extLst>
+  </p:cSld>
+  <p:clrMapOvr>
+    <a:masterClrMapping/>
+  </p:clrMapOvr>
+</p:notes>
+</file>
+
+<file path=ppt/notesSlides/notesSlide9.xml><?xml version="1.0" encoding="utf-8"?>
+<p:notes xmlns:a="http://schemas.openxmlformats.org/drawingml/2006/main" xmlns:r="http://schemas.openxmlformats.org/officeDocument/2006/relationships" xmlns:p="http://schemas.openxmlformats.org/presentationml/2006/main">
+  <p:cSld>
+    <p:spTree>
+      <p:nvGrpSpPr>
+        <p:cNvPr id="1" name=""/>
+        <p:cNvGrpSpPr/>
+        <p:nvPr/>
+      </p:nvGrpSpPr>
+      <p:grpSpPr>
+        <a:xfrm>
+          <a:off x="0" y="0"/>
+          <a:ext cx="0" cy="0"/>
+          <a:chOff x="0" y="0"/>
+          <a:chExt cx="0" cy="0"/>
+        </a:xfrm>
+      </p:grpSpPr>
+      <p:sp>
+        <p:nvSpPr>
+          <p:cNvPr id="2" name="Segnaposto immagine diapositiva 1"/>
+          <p:cNvSpPr>
+            <a:spLocks noGrp="1" noRot="1" noChangeAspect="1"/>
+          </p:cNvSpPr>
+          <p:nvPr>
+            <p:ph type="sldImg"/>
+          </p:nvPr>
+        </p:nvSpPr>
+        <p:spPr/>
+      </p:sp>
+      <p:sp>
+        <p:nvSpPr>
+          <p:cNvPr id="3" name="Segnaposto note 2"/>
+          <p:cNvSpPr>
+            <a:spLocks noGrp="1"/>
+          </p:cNvSpPr>
+          <p:nvPr>
+            <p:ph type="body" idx="1"/>
+          </p:nvPr>
+        </p:nvSpPr>
+        <p:spPr/>
+        <p:txBody>
+          <a:bodyPr/>
+          <a:lstStyle/>
+          <a:p>
+            <a:endParaRPr lang="it-IT" dirty="0"/>
+          </a:p>
+        </p:txBody>
+      </p:sp>
+      <p:sp>
+        <p:nvSpPr>
+          <p:cNvPr id="4" name="Segnaposto numero diapositiva 3"/>
+          <p:cNvSpPr>
+            <a:spLocks noGrp="1"/>
+          </p:cNvSpPr>
+          <p:nvPr>
+            <p:ph type="sldNum" sz="quarter" idx="10"/>
+          </p:nvPr>
+        </p:nvSpPr>
+        <p:spPr/>
+        <p:txBody>
+          <a:bodyPr/>
+          <a:lstStyle/>
+          <a:p>
+            <a:fld id="{AF5D5AC8-672A-409E-B76F-2374AA227A07}" type="slidenum">
+              <a:rPr lang="it-IT" smtClean="0"/>
+              <a:t>25</a:t>
             </a:fld>
             <a:endParaRPr lang="it-IT"/>
           </a:p>
@@ -8369,7 +8458,7 @@
             </a:pPr>
             <a:r>
               <a:rPr lang="it-IT" dirty="0"/>
-              <a:t>«RigidBody2d» è un componente che fa si che un oggetto sia sotto il controllo del motore fisico</a:t>
+              <a:t>«RigidBody2D» è un componente che fa si che un oggetto sia sotto il controllo del motore fisico</a:t>
             </a:r>
           </a:p>
           <a:p>
@@ -8384,15 +8473,7 @@
             </a:pPr>
             <a:r>
               <a:rPr lang="it-IT" dirty="0"/>
-              <a:t>Senza esso non potremmo modificare la velocità degli oggetti oppure specificare cosa </a:t>
-            </a:r>
-            <a:r>
-              <a:rPr lang="it-IT"/>
-              <a:t>fare quando essi </a:t>
-            </a:r>
-            <a:r>
-              <a:rPr lang="it-IT" dirty="0"/>
-              <a:t>collidono</a:t>
+              <a:t>Senza esso non potremmo modificare la velocità degli oggetti oppure specificare cosa fare quando essi collidono</a:t>
             </a:r>
           </a:p>
         </p:txBody>
@@ -8493,50 +8574,31 @@
             <a:pPr marL="0" indent="0">
               <a:buNone/>
             </a:pPr>
+            <a:endParaRPr lang="it-IT" dirty="0"/>
+          </a:p>
+          <a:p>
+            <a:pPr marL="0" indent="0">
+              <a:buNone/>
+            </a:pPr>
             <a:r>
               <a:rPr lang="it-IT" dirty="0"/>
-              <a:t>La direzione che deve prendere l’asteroide viene definita attraverso la creazione di un oggetto di tipo «Vector3» e di un oggetto di tipo «Ray2D»</a:t>
-            </a:r>
+              <a:t>Per andare a specificare la velocità da applicare all’asteroide quello che facciamo è utilizzare un oggetto «Vector3D»</a:t>
+            </a:r>
+          </a:p>
+          <a:p>
+            <a:pPr marL="0" indent="0">
+              <a:buNone/>
+            </a:pPr>
             <a:br>
               <a:rPr lang="it-IT" dirty="0"/>
             </a:br>
             <a:r>
               <a:rPr lang="it-IT" dirty="0"/>
-              <a:t>Per creare Vector3 abbiamo bisogno di 3 parametri, la x, la y e la zeta rispetto al centro del sistema di riferimento definito da «Ray2D»</a:t>
+              <a:t>Per creare quest’oggetto dobbiamo passare 3 parametri: uno per la x, uno per la y e uno per la zeta</a:t>
             </a:r>
           </a:p>
         </p:txBody>
       </p:sp>
-      <p:pic>
-        <p:nvPicPr>
-          <p:cNvPr id="4" name="Immagine 3">
-            <a:extLst>
-              <a:ext uri="{FF2B5EF4-FFF2-40B4-BE49-F238E27FC236}">
-                <a16:creationId xmlns:a16="http://schemas.microsoft.com/office/drawing/2014/main" id="{F6205A84-7517-478D-B14D-4E1398FB3B74}"/>
-              </a:ext>
-            </a:extLst>
-          </p:cNvPr>
-          <p:cNvPicPr>
-            <a:picLocks noChangeAspect="1"/>
-          </p:cNvPicPr>
-          <p:nvPr/>
-        </p:nvPicPr>
-        <p:blipFill>
-          <a:blip r:embed="rId3"/>
-          <a:stretch>
-            <a:fillRect/>
-          </a:stretch>
-        </p:blipFill>
-        <p:spPr>
-          <a:xfrm>
-            <a:off x="3738666" y="3671571"/>
-            <a:ext cx="4714668" cy="2908670"/>
-          </a:xfrm>
-          <a:prstGeom prst="rect">
-            <a:avLst/>
-          </a:prstGeom>
-        </p:spPr>
-      </p:pic>
     </p:spTree>
     <p:extLst>
       <p:ext uri="{BB962C8B-B14F-4D97-AF65-F5344CB8AC3E}">
@@ -8637,7 +8699,7 @@
             </a:br>
             <a:r>
               <a:rPr lang="it-IT" dirty="0"/>
-              <a:t>Quindi l’oggetto «Vector3D» può essere un punto qualsiasi in quest’area</a:t>
+              <a:t>Quindi l’oggetto «Vector3D» può essere vettore qualsiasi in quest’area</a:t>
             </a:r>
           </a:p>
         </p:txBody>
@@ -8765,17 +8827,17 @@
             </a:pPr>
             <a:r>
               <a:rPr lang="it-IT" dirty="0"/>
-              <a:t>Con «ray2D» passando come parametro l’oggetto «vector3D»  e la posizione dell’oggetto asteroide creiamo un segmento che parte dall’origine(l’asteroide stesso) e arriva al punto specificato dal parametro vector3D</a:t>
+              <a:t>Dato i parametri passati è possibile che il vettore sia molto piccolo, utilizziamo quindi il metodo «Vector3D.Normalize()» in modo che diventi con la stessa direzione e verso ma modulo 1</a:t>
             </a:r>
           </a:p>
         </p:txBody>
       </p:sp>
       <p:pic>
         <p:nvPicPr>
-          <p:cNvPr id="4" name="Immagine 3">
+          <p:cNvPr id="8" name="Immagine 7">
             <a:extLst>
               <a:ext uri="{FF2B5EF4-FFF2-40B4-BE49-F238E27FC236}">
-                <a16:creationId xmlns:a16="http://schemas.microsoft.com/office/drawing/2014/main" id="{2B958273-6141-471A-8AD3-9A97C3F6E246}"/>
+                <a16:creationId xmlns:a16="http://schemas.microsoft.com/office/drawing/2014/main" id="{A120D1FC-87B8-4ABB-8D73-BF822E10A3E7}"/>
               </a:ext>
             </a:extLst>
           </p:cNvPr>
@@ -8792,8 +8854,8 @@
         </p:blipFill>
         <p:spPr>
           <a:xfrm>
-            <a:off x="3920987" y="3075471"/>
-            <a:ext cx="3733800" cy="3467100"/>
+            <a:off x="4219575" y="3313457"/>
+            <a:ext cx="3752850" cy="3371850"/>
           </a:xfrm>
           <a:prstGeom prst="rect">
             <a:avLst/>
@@ -9057,6 +9119,140 @@
           <p:cNvPr id="2" name="Titolo 1">
             <a:extLst>
               <a:ext uri="{FF2B5EF4-FFF2-40B4-BE49-F238E27FC236}">
+                <a16:creationId xmlns:a16="http://schemas.microsoft.com/office/drawing/2014/main" id="{7105D77E-2211-4415-8A7C-FB8B80692C70}"/>
+              </a:ext>
+            </a:extLst>
+          </p:cNvPr>
+          <p:cNvSpPr>
+            <a:spLocks noGrp="1"/>
+          </p:cNvSpPr>
+          <p:nvPr>
+            <p:ph type="title"/>
+          </p:nvPr>
+        </p:nvSpPr>
+        <p:spPr/>
+        <p:txBody>
+          <a:bodyPr/>
+          <a:lstStyle/>
+          <a:p>
+            <a:r>
+              <a:rPr lang="it-IT" dirty="0" err="1"/>
+              <a:t>Asteroid</a:t>
+            </a:r>
+            <a:r>
+              <a:rPr lang="it-IT" dirty="0"/>
+              <a:t> in </a:t>
+            </a:r>
+            <a:r>
+              <a:rPr lang="it-IT" dirty="0" err="1"/>
+              <a:t>unity</a:t>
+            </a:r>
+            <a:endParaRPr lang="it-IT" dirty="0"/>
+          </a:p>
+        </p:txBody>
+      </p:sp>
+      <p:sp>
+        <p:nvSpPr>
+          <p:cNvPr id="3" name="Segnaposto contenuto 2">
+            <a:extLst>
+              <a:ext uri="{FF2B5EF4-FFF2-40B4-BE49-F238E27FC236}">
+                <a16:creationId xmlns:a16="http://schemas.microsoft.com/office/drawing/2014/main" id="{82CC1095-3799-4447-8534-53584A047113}"/>
+              </a:ext>
+            </a:extLst>
+          </p:cNvPr>
+          <p:cNvSpPr>
+            <a:spLocks noGrp="1"/>
+          </p:cNvSpPr>
+          <p:nvPr>
+            <p:ph idx="1"/>
+          </p:nvPr>
+        </p:nvSpPr>
+        <p:spPr/>
+        <p:txBody>
+          <a:bodyPr/>
+          <a:lstStyle/>
+          <a:p>
+            <a:pPr marL="0" indent="0">
+              <a:buNone/>
+            </a:pPr>
+            <a:r>
+              <a:rPr lang="it-IT" dirty="0"/>
+              <a:t>Una volta ottenuto il vettore normalizzato grazie al «RigidBody2D» possiamo andare a modificare la velocità dell’asteroide, per farlo utilizziamo «</a:t>
+            </a:r>
+            <a:r>
+              <a:rPr lang="it-IT" dirty="0" err="1"/>
+              <a:t>rb.velocity</a:t>
+            </a:r>
+            <a:r>
+              <a:rPr lang="it-IT" dirty="0"/>
+              <a:t> = vettore * speed» dove </a:t>
+            </a:r>
+            <a:r>
+              <a:rPr lang="it-IT" dirty="0" err="1"/>
+              <a:t>rb</a:t>
+            </a:r>
+            <a:r>
+              <a:rPr lang="it-IT" dirty="0"/>
+              <a:t> è proprio una variabile </a:t>
+            </a:r>
+            <a:r>
+              <a:rPr lang="it-IT" dirty="0" err="1"/>
+              <a:t>rigidBody</a:t>
+            </a:r>
+            <a:r>
+              <a:rPr lang="it-IT" dirty="0"/>
+              <a:t> che si riferisce all’asteroide</a:t>
+            </a:r>
+          </a:p>
+          <a:p>
+            <a:pPr marL="0" indent="0">
+              <a:buNone/>
+            </a:pPr>
+            <a:br>
+              <a:rPr lang="it-IT" dirty="0"/>
+            </a:br>
+            <a:r>
+              <a:rPr lang="it-IT" dirty="0"/>
+              <a:t>L’operazione moltiplica tutti i componenti del vettore per l’intero speed e dato che il primo fattore è stato precedentemente normalizzato avremmo un vettore con modulo proprio uguale a speed.</a:t>
+            </a:r>
+          </a:p>
+        </p:txBody>
+      </p:sp>
+    </p:spTree>
+    <p:extLst>
+      <p:ext uri="{BB962C8B-B14F-4D97-AF65-F5344CB8AC3E}">
+        <p14:creationId xmlns:p14="http://schemas.microsoft.com/office/powerpoint/2010/main" val="2832864841"/>
+      </p:ext>
+    </p:extLst>
+  </p:cSld>
+  <p:clrMapOvr>
+    <a:masterClrMapping/>
+  </p:clrMapOvr>
+</p:sld>
+</file>
+
+<file path=ppt/slides/slide21.xml><?xml version="1.0" encoding="utf-8"?>
+<p:sld xmlns:a="http://schemas.openxmlformats.org/drawingml/2006/main" xmlns:r="http://schemas.openxmlformats.org/officeDocument/2006/relationships" xmlns:p="http://schemas.openxmlformats.org/presentationml/2006/main">
+  <p:cSld>
+    <p:spTree>
+      <p:nvGrpSpPr>
+        <p:cNvPr id="1" name=""/>
+        <p:cNvGrpSpPr/>
+        <p:nvPr/>
+      </p:nvGrpSpPr>
+      <p:grpSpPr>
+        <a:xfrm>
+          <a:off x="0" y="0"/>
+          <a:ext cx="0" cy="0"/>
+          <a:chOff x="0" y="0"/>
+          <a:chExt cx="0" cy="0"/>
+        </a:xfrm>
+      </p:grpSpPr>
+      <p:sp>
+        <p:nvSpPr>
+          <p:cNvPr id="2" name="Titolo 1">
+            <a:extLst>
+              <a:ext uri="{FF2B5EF4-FFF2-40B4-BE49-F238E27FC236}">
                 <a16:creationId xmlns:a16="http://schemas.microsoft.com/office/drawing/2014/main" id="{763A2169-1ECF-4FDB-B88A-F810E0934637}"/>
               </a:ext>
             </a:extLst>
@@ -9137,7 +9333,7 @@
 </p:sld>
 </file>
 
-<file path=ppt/slides/slide21.xml><?xml version="1.0" encoding="utf-8"?>
+<file path=ppt/slides/slide22.xml><?xml version="1.0" encoding="utf-8"?>
 <p:sld xmlns:a="http://schemas.openxmlformats.org/drawingml/2006/main" xmlns:r="http://schemas.openxmlformats.org/officeDocument/2006/relationships" xmlns:p="http://schemas.openxmlformats.org/presentationml/2006/main">
   <p:cSld>
     <p:spTree>
@@ -9221,14 +9417,22 @@
             </a:r>
             <a:r>
               <a:rPr lang="it-IT" dirty="0"/>
-              <a:t> da un bordo del background quello che andiamo a fare è controllare quale bordo è stato colpito in modo da andare a modificare il «ray2D» dell’asteroide</a:t>
+              <a:t> da un bordo del background quello che andiamo a fare è controllare quale bordo è stato colpito in modo da andare a modificare il vettore dell’asteroide.</a:t>
             </a:r>
             <a:br>
               <a:rPr lang="it-IT" dirty="0"/>
             </a:br>
             <a:r>
               <a:rPr lang="it-IT" dirty="0"/>
-              <a:t>Ad esempio se è stato colpito il bordo di destra creiamo un «vector3D» uguale a quello precedente ma con la componente x moltiplicata per meno uno e andiamo a modificare il «ray2D» con questo nuovo «Vector3D»</a:t>
+              <a:t>Ad esempio se è stato colpito il bordo di destra creiamo un «vector3D» uguale a quello precedente ma con la componente x moltiplicata per meno uno e modifichiamo la velocità con «</a:t>
+            </a:r>
+            <a:r>
+              <a:rPr lang="it-IT" dirty="0" err="1"/>
+              <a:t>rb.velocity</a:t>
+            </a:r>
+            <a:r>
+              <a:rPr lang="it-IT" dirty="0"/>
+              <a:t> = vettore * speed» </a:t>
             </a:r>
           </a:p>
         </p:txBody>
@@ -9246,7 +9450,7 @@
 </p:sld>
 </file>
 
-<file path=ppt/slides/slide22.xml><?xml version="1.0" encoding="utf-8"?>
+<file path=ppt/slides/slide23.xml><?xml version="1.0" encoding="utf-8"?>
 <p:sld xmlns:a="http://schemas.openxmlformats.org/drawingml/2006/main" xmlns:r="http://schemas.openxmlformats.org/officeDocument/2006/relationships" xmlns:p="http://schemas.openxmlformats.org/presentationml/2006/main">
   <p:cSld>
     <p:spTree>
@@ -9324,7 +9528,7 @@
             </a:pPr>
             <a:r>
               <a:rPr lang="it-IT" dirty="0"/>
-              <a:t>	Ray2D prima del rimbalzo</a:t>
+              <a:t>	Velocità prima del rimbalzo</a:t>
             </a:r>
           </a:p>
           <a:p>
@@ -9366,7 +9570,7 @@
             </a:pPr>
             <a:r>
               <a:rPr lang="it-IT" dirty="0"/>
-              <a:t>	Ray2D dopo del rimbalzo</a:t>
+              <a:t>	Velocità dopo del rimbalzo</a:t>
             </a:r>
             <a:br>
               <a:rPr lang="it-IT" dirty="0"/>
@@ -9393,10 +9597,10 @@
       </p:sp>
       <p:pic>
         <p:nvPicPr>
-          <p:cNvPr id="4" name="Immagine 3">
+          <p:cNvPr id="8" name="Immagine 7">
             <a:extLst>
               <a:ext uri="{FF2B5EF4-FFF2-40B4-BE49-F238E27FC236}">
-                <a16:creationId xmlns:a16="http://schemas.microsoft.com/office/drawing/2014/main" id="{FBC8E21F-4E41-4080-8483-EA8E861C9ECF}"/>
+                <a16:creationId xmlns:a16="http://schemas.microsoft.com/office/drawing/2014/main" id="{4E87EA32-8938-41B4-849B-1083D6F45284}"/>
               </a:ext>
             </a:extLst>
           </p:cNvPr>
@@ -9413,8 +9617,8 @@
         </p:blipFill>
         <p:spPr>
           <a:xfrm>
-            <a:off x="7558708" y="1289662"/>
-            <a:ext cx="2847561" cy="2644163"/>
+            <a:off x="7446081" y="739775"/>
+            <a:ext cx="2886075" cy="2724150"/>
           </a:xfrm>
           <a:prstGeom prst="rect">
             <a:avLst/>
@@ -9423,10 +9627,10 @@
       </p:pic>
       <p:pic>
         <p:nvPicPr>
-          <p:cNvPr id="5" name="Immagine 4">
+          <p:cNvPr id="9" name="Immagine 8">
             <a:extLst>
               <a:ext uri="{FF2B5EF4-FFF2-40B4-BE49-F238E27FC236}">
-                <a16:creationId xmlns:a16="http://schemas.microsoft.com/office/drawing/2014/main" id="{486D790A-5C36-41D8-97A2-F556A8EBF38D}"/>
+                <a16:creationId xmlns:a16="http://schemas.microsoft.com/office/drawing/2014/main" id="{EC41E821-D7DF-4C66-8060-15B5402999CF}"/>
               </a:ext>
             </a:extLst>
           </p:cNvPr>
@@ -9443,8 +9647,8 @@
         </p:blipFill>
         <p:spPr>
           <a:xfrm>
-            <a:off x="7615856" y="4001294"/>
-            <a:ext cx="2685677" cy="2429569"/>
+            <a:off x="7346068" y="3959225"/>
+            <a:ext cx="3086100" cy="2533650"/>
           </a:xfrm>
           <a:prstGeom prst="rect">
             <a:avLst/>
@@ -9464,7 +9668,7 @@
 </p:sld>
 </file>
 
-<file path=ppt/slides/slide23.xml><?xml version="1.0" encoding="utf-8"?>
+<file path=ppt/slides/slide24.xml><?xml version="1.0" encoding="utf-8"?>
 <p:sld xmlns:a="http://schemas.openxmlformats.org/drawingml/2006/main" xmlns:r="http://schemas.openxmlformats.org/officeDocument/2006/relationships" xmlns:p="http://schemas.openxmlformats.org/presentationml/2006/main">
   <p:cSld>
     <p:spTree>
@@ -9600,7 +9804,7 @@
 </p:sld>
 </file>
 
-<file path=ppt/slides/slide24.xml><?xml version="1.0" encoding="utf-8"?>
+<file path=ppt/slides/slide25.xml><?xml version="1.0" encoding="utf-8"?>
 <p:sld xmlns:a="http://schemas.openxmlformats.org/drawingml/2006/main" xmlns:r="http://schemas.openxmlformats.org/officeDocument/2006/relationships" xmlns:p="http://schemas.openxmlformats.org/presentationml/2006/main">
   <p:cSld>
     <p:spTree>
@@ -9713,7 +9917,7 @@
             </a:pPr>
             <a:r>
               <a:rPr lang="it-IT" dirty="0"/>
-              <a:t>Avendo i collider sia sulla navicella sia sui bordi e non andando a definire nessun comportamento particolare con «OnTriggerEnter2D»  quello che succede è che la navicella si comporta come se fosse dinanzi ad un muro e non si muove oltre il bordo</a:t>
+              <a:t>Avendo i collider sia sulla navicella sia sui bordi,  non andando a definire nessun comportamento particolare con «OnTriggerEnter2D»,  quello che succede è che la navicella si comporta come se fosse dinanzi ad un muro e non si muove oltre il bordo</a:t>
             </a:r>
           </a:p>
         </p:txBody>

</xml_diff>

<commit_message>
Aggiunta transizione preventiva nella slide 3 (pagina 128)
</commit_message>
<xml_diff>
--- a/Progetto sistemi.pptx
+++ b/Progetto sistemi.pptx
@@ -4841,8 +4841,8 @@
           </a:p>
         </p:txBody>
       </p:sp>
-      <mc:AlternateContent xmlns:mc="http://schemas.openxmlformats.org/markup-compatibility/2006">
-        <mc:Choice xmlns:a14="http://schemas.microsoft.com/office/drawing/2010/main" Requires="a14">
+      <mc:AlternateContent xmlns:mc="http://schemas.openxmlformats.org/markup-compatibility/2006" xmlns:a14="http://schemas.microsoft.com/office/drawing/2010/main">
+        <mc:Choice Requires="a14">
           <p:sp>
             <p:nvSpPr>
               <p:cNvPr id="11" name="CasellaDiTesto 10"/>
@@ -4997,11 +4997,7 @@
                 </a:pPr>
                 <a:r>
                   <a:rPr lang="it-IT" sz="1500" i="1" dirty="0"/>
-                  <a:t>p</a:t>
-                </a:r>
-                <a:r>
-                  <a:rPr lang="it-IT" sz="1500" i="1" dirty="0" smtClean="0"/>
-                  <a:t>osition </a:t>
+                  <a:t>position </a:t>
                 </a:r>
                 <a14:m>
                   <m:oMath xmlns:m="http://schemas.openxmlformats.org/officeDocument/2006/math">
@@ -5047,7 +5043,7 @@
             </p:txBody>
           </p:sp>
         </mc:Choice>
-        <mc:Fallback>
+        <mc:Fallback xmlns="">
           <p:sp>
             <p:nvSpPr>
               <p:cNvPr id="11" name="CasellaDiTesto 10"/>
@@ -5086,8 +5082,8 @@
           </p:sp>
         </mc:Fallback>
       </mc:AlternateContent>
-      <mc:AlternateContent xmlns:mc="http://schemas.openxmlformats.org/markup-compatibility/2006">
-        <mc:Choice xmlns:a14="http://schemas.microsoft.com/office/drawing/2010/main" Requires="a14">
+      <mc:AlternateContent xmlns:mc="http://schemas.openxmlformats.org/markup-compatibility/2006" xmlns:a14="http://schemas.microsoft.com/office/drawing/2010/main">
+        <mc:Choice Requires="a14">
           <p:sp>
             <p:nvSpPr>
               <p:cNvPr id="12" name="CasellaDiTesto 11"/>
@@ -5121,11 +5117,11 @@
                   <a:buChar char="•"/>
                 </a:pPr>
                 <a:r>
-                  <a:rPr lang="it-IT" sz="1500" i="1" dirty="0" err="1" smtClean="0"/>
+                  <a:rPr lang="it-IT" sz="1500" i="1" dirty="0" err="1"/>
                   <a:t>StopA</a:t>
                 </a:r>
                 <a:r>
-                  <a:rPr lang="it-IT" sz="1500" i="1" dirty="0" smtClean="0"/>
+                  <a:rPr lang="it-IT" sz="1500" i="1" dirty="0"/>
                   <a:t> </a:t>
                 </a:r>
                 <a:r>
@@ -5160,19 +5156,18 @@
                   <a:t>absent</a:t>
                 </a:r>
                 <a:r>
-                  <a:rPr lang="it-IT" sz="1500" dirty="0" smtClean="0"/>
+                  <a:rPr lang="it-IT" sz="1500" dirty="0"/>
                   <a:t>)</a:t>
                 </a:r>
                 <a:r>
-                  <a:rPr lang="it-IT" sz="1500" i="1" dirty="0" smtClean="0"/>
+                  <a:rPr lang="it-IT" sz="1500" i="1" dirty="0"/>
                   <a:t> </a:t>
                 </a:r>
-                <a:endParaRPr lang="it-IT" sz="1500" i="1" dirty="0"/>
               </a:p>
             </p:txBody>
           </p:sp>
         </mc:Choice>
-        <mc:Fallback>
+        <mc:Fallback xmlns="">
           <p:sp>
             <p:nvSpPr>
               <p:cNvPr id="12" name="CasellaDiTesto 11"/>
@@ -5211,8 +5206,8 @@
           </p:sp>
         </mc:Fallback>
       </mc:AlternateContent>
-      <mc:AlternateContent xmlns:mc="http://schemas.openxmlformats.org/markup-compatibility/2006">
-        <mc:Choice xmlns:a14="http://schemas.microsoft.com/office/drawing/2010/main" Requires="a14">
+      <mc:AlternateContent xmlns:mc="http://schemas.openxmlformats.org/markup-compatibility/2006" xmlns:a14="http://schemas.microsoft.com/office/drawing/2010/main">
+        <mc:Choice Requires="a14">
           <p:sp>
             <p:nvSpPr>
               <p:cNvPr id="17" name="CasellaDiTesto 16"/>
@@ -5277,15 +5272,7 @@
                 </a14:m>
                 <a:r>
                   <a:rPr lang="it-IT" sz="1500" dirty="0"/>
-                  <a:t> </a:t>
-                </a:r>
-                <a:r>
-                  <a:rPr lang="it-IT" sz="1500" dirty="0" smtClean="0"/>
-                  <a:t>(</a:t>
-                </a:r>
-                <a:r>
-                  <a:rPr lang="it-IT" sz="1500" dirty="0"/>
-                  <a:t>Posizione navicella)</a:t>
+                  <a:t> (Posizione navicella)</a:t>
                 </a:r>
               </a:p>
               <a:p>
@@ -5356,12 +5343,8 @@
                   </m:oMath>
                 </a14:m>
                 <a:r>
-                  <a:rPr lang="it-IT" sz="1500" dirty="0" smtClean="0"/>
-                  <a:t> </a:t>
-                </a:r>
-                <a:r>
                   <a:rPr lang="it-IT" sz="1500" dirty="0"/>
-                  <a:t>(velocità costante)</a:t>
+                  <a:t> (velocità costante)</a:t>
                 </a:r>
               </a:p>
               <a:p>
@@ -5374,7 +5357,7 @@
             </p:txBody>
           </p:sp>
         </mc:Choice>
-        <mc:Fallback>
+        <mc:Fallback xmlns="">
           <p:sp>
             <p:nvSpPr>
               <p:cNvPr id="17" name="CasellaDiTesto 16"/>
@@ -5423,14 +5406,6 @@
   <p:clrMapOvr>
     <a:masterClrMapping/>
   </p:clrMapOvr>
-  <mc:AlternateContent xmlns:mc="http://schemas.openxmlformats.org/markup-compatibility/2006">
-    <mc:Choice xmlns:p14="http://schemas.microsoft.com/office/powerpoint/2010/main" Requires="p14">
-      <p:transition spd="slow" p14:dur="2000"/>
-    </mc:Choice>
-    <mc:Fallback>
-      <p:transition spd="slow"/>
-    </mc:Fallback>
-  </mc:AlternateContent>
 </p:sld>
 </file>
 
@@ -5903,8 +5878,8 @@
           </a:p>
         </p:txBody>
       </p:sp>
-      <mc:AlternateContent xmlns:mc="http://schemas.openxmlformats.org/markup-compatibility/2006">
-        <mc:Choice xmlns:a14="http://schemas.microsoft.com/office/drawing/2010/main" Requires="a14">
+      <mc:AlternateContent xmlns:mc="http://schemas.openxmlformats.org/markup-compatibility/2006" xmlns:a14="http://schemas.microsoft.com/office/drawing/2010/main">
+        <mc:Choice Requires="a14">
           <p:sp>
             <p:nvSpPr>
               <p:cNvPr id="13" name="CasellaDiTesto 12"/>
@@ -6059,11 +6034,7 @@
                 </a:pPr>
                 <a:r>
                   <a:rPr lang="it-IT" sz="1500" i="1" dirty="0"/>
-                  <a:t>p</a:t>
-                </a:r>
-                <a:r>
-                  <a:rPr lang="it-IT" sz="1500" i="1" dirty="0" smtClean="0"/>
-                  <a:t>osition </a:t>
+                  <a:t>position </a:t>
                 </a:r>
                 <a14:m>
                   <m:oMath xmlns:m="http://schemas.openxmlformats.org/officeDocument/2006/math">
@@ -6109,7 +6080,7 @@
             </p:txBody>
           </p:sp>
         </mc:Choice>
-        <mc:Fallback>
+        <mc:Fallback xmlns="">
           <p:sp>
             <p:nvSpPr>
               <p:cNvPr id="13" name="CasellaDiTesto 12"/>
@@ -6148,8 +6119,8 @@
           </p:sp>
         </mc:Fallback>
       </mc:AlternateContent>
-      <mc:AlternateContent xmlns:mc="http://schemas.openxmlformats.org/markup-compatibility/2006">
-        <mc:Choice xmlns:a14="http://schemas.microsoft.com/office/drawing/2010/main" Requires="a14">
+      <mc:AlternateContent xmlns:mc="http://schemas.openxmlformats.org/markup-compatibility/2006" xmlns:a14="http://schemas.microsoft.com/office/drawing/2010/main">
+        <mc:Choice Requires="a14">
           <p:sp>
             <p:nvSpPr>
               <p:cNvPr id="14" name="CasellaDiTesto 13"/>
@@ -6183,11 +6154,11 @@
                   <a:buChar char="•"/>
                 </a:pPr>
                 <a:r>
-                  <a:rPr lang="it-IT" sz="1500" i="1" dirty="0" err="1" smtClean="0"/>
+                  <a:rPr lang="it-IT" sz="1500" i="1" dirty="0" err="1"/>
                   <a:t>StopA</a:t>
                 </a:r>
                 <a:r>
-                  <a:rPr lang="it-IT" sz="1500" i="1" dirty="0" smtClean="0"/>
+                  <a:rPr lang="it-IT" sz="1500" i="1" dirty="0"/>
                   <a:t> </a:t>
                 </a:r>
                 <a:r>
@@ -6222,19 +6193,18 @@
                   <a:t>absent</a:t>
                 </a:r>
                 <a:r>
-                  <a:rPr lang="it-IT" sz="1500" dirty="0" smtClean="0"/>
+                  <a:rPr lang="it-IT" sz="1500" dirty="0"/>
                   <a:t>)</a:t>
                 </a:r>
                 <a:r>
-                  <a:rPr lang="it-IT" sz="1500" i="1" dirty="0" smtClean="0"/>
+                  <a:rPr lang="it-IT" sz="1500" i="1" dirty="0"/>
                   <a:t> </a:t>
                 </a:r>
-                <a:endParaRPr lang="it-IT" sz="1500" i="1" dirty="0"/>
               </a:p>
             </p:txBody>
           </p:sp>
         </mc:Choice>
-        <mc:Fallback>
+        <mc:Fallback xmlns="">
           <p:sp>
             <p:nvSpPr>
               <p:cNvPr id="14" name="CasellaDiTesto 13"/>
@@ -6273,8 +6243,8 @@
           </p:sp>
         </mc:Fallback>
       </mc:AlternateContent>
-      <mc:AlternateContent xmlns:mc="http://schemas.openxmlformats.org/markup-compatibility/2006">
-        <mc:Choice xmlns:a14="http://schemas.microsoft.com/office/drawing/2010/main" Requires="a14">
+      <mc:AlternateContent xmlns:mc="http://schemas.openxmlformats.org/markup-compatibility/2006" xmlns:a14="http://schemas.microsoft.com/office/drawing/2010/main">
+        <mc:Choice Requires="a14">
           <p:sp>
             <p:nvSpPr>
               <p:cNvPr id="15" name="CasellaDiTesto 14"/>
@@ -6339,15 +6309,7 @@
                 </a14:m>
                 <a:r>
                   <a:rPr lang="it-IT" sz="1500" dirty="0"/>
-                  <a:t> </a:t>
-                </a:r>
-                <a:r>
-                  <a:rPr lang="it-IT" sz="1500" dirty="0" smtClean="0"/>
-                  <a:t>(</a:t>
-                </a:r>
-                <a:r>
-                  <a:rPr lang="it-IT" sz="1500" dirty="0"/>
-                  <a:t>Posizione navicella)</a:t>
+                  <a:t> (Posizione navicella)</a:t>
                 </a:r>
               </a:p>
               <a:p>
@@ -6418,12 +6380,8 @@
                   </m:oMath>
                 </a14:m>
                 <a:r>
-                  <a:rPr lang="it-IT" sz="1500" dirty="0" smtClean="0"/>
-                  <a:t> </a:t>
-                </a:r>
-                <a:r>
                   <a:rPr lang="it-IT" sz="1500" dirty="0"/>
-                  <a:t>(velocità costante)</a:t>
+                  <a:t> (velocità costante)</a:t>
                 </a:r>
               </a:p>
               <a:p>
@@ -6436,7 +6394,7 @@
             </p:txBody>
           </p:sp>
         </mc:Choice>
-        <mc:Fallback>
+        <mc:Fallback xmlns="">
           <p:sp>
             <p:nvSpPr>
               <p:cNvPr id="15" name="CasellaDiTesto 14"/>
@@ -6485,14 +6443,6 @@
   <p:clrMapOvr>
     <a:masterClrMapping/>
   </p:clrMapOvr>
-  <mc:AlternateContent xmlns:mc="http://schemas.openxmlformats.org/markup-compatibility/2006">
-    <mc:Choice xmlns:p14="http://schemas.microsoft.com/office/powerpoint/2010/main" Requires="p14">
-      <p:transition spd="slow" p14:dur="2000"/>
-    </mc:Choice>
-    <mc:Fallback>
-      <p:transition spd="slow"/>
-    </mc:Fallback>
-  </mc:AlternateContent>
 </p:sld>
 </file>
 
@@ -6959,8 +6909,8 @@
           </a:p>
         </p:txBody>
       </p:sp>
-      <mc:AlternateContent xmlns:mc="http://schemas.openxmlformats.org/markup-compatibility/2006">
-        <mc:Choice xmlns:a14="http://schemas.microsoft.com/office/drawing/2010/main" Requires="a14">
+      <mc:AlternateContent xmlns:mc="http://schemas.openxmlformats.org/markup-compatibility/2006" xmlns:a14="http://schemas.microsoft.com/office/drawing/2010/main">
+        <mc:Choice Requires="a14">
           <p:sp>
             <p:nvSpPr>
               <p:cNvPr id="11" name="CasellaDiTesto 10"/>
@@ -7115,11 +7065,7 @@
                 </a:pPr>
                 <a:r>
                   <a:rPr lang="it-IT" sz="1500" i="1" dirty="0"/>
-                  <a:t>p</a:t>
-                </a:r>
-                <a:r>
-                  <a:rPr lang="it-IT" sz="1500" i="1" dirty="0" smtClean="0"/>
-                  <a:t>osition </a:t>
+                  <a:t>position </a:t>
                 </a:r>
                 <a14:m>
                   <m:oMath xmlns:m="http://schemas.openxmlformats.org/officeDocument/2006/math">
@@ -7165,7 +7111,7 @@
             </p:txBody>
           </p:sp>
         </mc:Choice>
-        <mc:Fallback>
+        <mc:Fallback xmlns="">
           <p:sp>
             <p:nvSpPr>
               <p:cNvPr id="11" name="CasellaDiTesto 10"/>
@@ -7204,8 +7150,8 @@
           </p:sp>
         </mc:Fallback>
       </mc:AlternateContent>
-      <mc:AlternateContent xmlns:mc="http://schemas.openxmlformats.org/markup-compatibility/2006">
-        <mc:Choice xmlns:a14="http://schemas.microsoft.com/office/drawing/2010/main" Requires="a14">
+      <mc:AlternateContent xmlns:mc="http://schemas.openxmlformats.org/markup-compatibility/2006" xmlns:a14="http://schemas.microsoft.com/office/drawing/2010/main">
+        <mc:Choice Requires="a14">
           <p:sp>
             <p:nvSpPr>
               <p:cNvPr id="12" name="CasellaDiTesto 11"/>
@@ -7239,11 +7185,11 @@
                   <a:buChar char="•"/>
                 </a:pPr>
                 <a:r>
-                  <a:rPr lang="it-IT" sz="1500" i="1" dirty="0" err="1" smtClean="0"/>
+                  <a:rPr lang="it-IT" sz="1500" i="1" dirty="0" err="1"/>
                   <a:t>StopA</a:t>
                 </a:r>
                 <a:r>
-                  <a:rPr lang="it-IT" sz="1500" i="1" dirty="0" smtClean="0"/>
+                  <a:rPr lang="it-IT" sz="1500" i="1" dirty="0"/>
                   <a:t> </a:t>
                 </a:r>
                 <a:r>
@@ -7278,19 +7224,18 @@
                   <a:t>absent</a:t>
                 </a:r>
                 <a:r>
-                  <a:rPr lang="it-IT" sz="1500" dirty="0" smtClean="0"/>
+                  <a:rPr lang="it-IT" sz="1500" dirty="0"/>
                   <a:t>)</a:t>
                 </a:r>
                 <a:r>
-                  <a:rPr lang="it-IT" sz="1500" i="1" dirty="0" smtClean="0"/>
+                  <a:rPr lang="it-IT" sz="1500" i="1" dirty="0"/>
                   <a:t> </a:t>
                 </a:r>
-                <a:endParaRPr lang="it-IT" sz="1500" i="1" dirty="0"/>
               </a:p>
             </p:txBody>
           </p:sp>
         </mc:Choice>
-        <mc:Fallback>
+        <mc:Fallback xmlns="">
           <p:sp>
             <p:nvSpPr>
               <p:cNvPr id="12" name="CasellaDiTesto 11"/>
@@ -7329,8 +7274,8 @@
           </p:sp>
         </mc:Fallback>
       </mc:AlternateContent>
-      <mc:AlternateContent xmlns:mc="http://schemas.openxmlformats.org/markup-compatibility/2006">
-        <mc:Choice xmlns:a14="http://schemas.microsoft.com/office/drawing/2010/main" Requires="a14">
+      <mc:AlternateContent xmlns:mc="http://schemas.openxmlformats.org/markup-compatibility/2006" xmlns:a14="http://schemas.microsoft.com/office/drawing/2010/main">
+        <mc:Choice Requires="a14">
           <p:sp>
             <p:nvSpPr>
               <p:cNvPr id="14" name="CasellaDiTesto 13"/>
@@ -7395,15 +7340,7 @@
                 </a14:m>
                 <a:r>
                   <a:rPr lang="it-IT" sz="1500" dirty="0"/>
-                  <a:t> </a:t>
-                </a:r>
-                <a:r>
-                  <a:rPr lang="it-IT" sz="1500" dirty="0" smtClean="0"/>
-                  <a:t>(</a:t>
-                </a:r>
-                <a:r>
-                  <a:rPr lang="it-IT" sz="1500" dirty="0"/>
-                  <a:t>Posizione navicella)</a:t>
+                  <a:t> (Posizione navicella)</a:t>
                 </a:r>
               </a:p>
               <a:p>
@@ -7474,12 +7411,8 @@
                   </m:oMath>
                 </a14:m>
                 <a:r>
-                  <a:rPr lang="it-IT" sz="1500" dirty="0" smtClean="0"/>
-                  <a:t> </a:t>
-                </a:r>
-                <a:r>
                   <a:rPr lang="it-IT" sz="1500" dirty="0"/>
-                  <a:t>(velocità costante)</a:t>
+                  <a:t> (velocità costante)</a:t>
                 </a:r>
               </a:p>
               <a:p>
@@ -7492,7 +7425,7 @@
             </p:txBody>
           </p:sp>
         </mc:Choice>
-        <mc:Fallback>
+        <mc:Fallback xmlns="">
           <p:sp>
             <p:nvSpPr>
               <p:cNvPr id="14" name="CasellaDiTesto 13"/>
@@ -7541,14 +7474,6 @@
   <p:clrMapOvr>
     <a:masterClrMapping/>
   </p:clrMapOvr>
-  <mc:AlternateContent xmlns:mc="http://schemas.openxmlformats.org/markup-compatibility/2006">
-    <mc:Choice xmlns:p14="http://schemas.microsoft.com/office/powerpoint/2010/main" Requires="p14">
-      <p:transition spd="slow" p14:dur="2000"/>
-    </mc:Choice>
-    <mc:Fallback>
-      <p:transition spd="slow"/>
-    </mc:Fallback>
-  </mc:AlternateContent>
 </p:sld>
 </file>
 
@@ -8015,8 +7940,8 @@
           </a:p>
         </p:txBody>
       </p:sp>
-      <mc:AlternateContent xmlns:mc="http://schemas.openxmlformats.org/markup-compatibility/2006">
-        <mc:Choice xmlns:a14="http://schemas.microsoft.com/office/drawing/2010/main" Requires="a14">
+      <mc:AlternateContent xmlns:mc="http://schemas.openxmlformats.org/markup-compatibility/2006" xmlns:a14="http://schemas.microsoft.com/office/drawing/2010/main">
+        <mc:Choice Requires="a14">
           <p:sp>
             <p:nvSpPr>
               <p:cNvPr id="11" name="CasellaDiTesto 10"/>
@@ -8171,11 +8096,7 @@
                 </a:pPr>
                 <a:r>
                   <a:rPr lang="it-IT" sz="1500" i="1" dirty="0"/>
-                  <a:t>p</a:t>
-                </a:r>
-                <a:r>
-                  <a:rPr lang="it-IT" sz="1500" i="1" dirty="0" smtClean="0"/>
-                  <a:t>osition </a:t>
+                  <a:t>position </a:t>
                 </a:r>
                 <a14:m>
                   <m:oMath xmlns:m="http://schemas.openxmlformats.org/officeDocument/2006/math">
@@ -8221,7 +8142,7 @@
             </p:txBody>
           </p:sp>
         </mc:Choice>
-        <mc:Fallback>
+        <mc:Fallback xmlns="">
           <p:sp>
             <p:nvSpPr>
               <p:cNvPr id="11" name="CasellaDiTesto 10"/>
@@ -8260,8 +8181,8 @@
           </p:sp>
         </mc:Fallback>
       </mc:AlternateContent>
-      <mc:AlternateContent xmlns:mc="http://schemas.openxmlformats.org/markup-compatibility/2006">
-        <mc:Choice xmlns:a14="http://schemas.microsoft.com/office/drawing/2010/main" Requires="a14">
+      <mc:AlternateContent xmlns:mc="http://schemas.openxmlformats.org/markup-compatibility/2006" xmlns:a14="http://schemas.microsoft.com/office/drawing/2010/main">
+        <mc:Choice Requires="a14">
           <p:sp>
             <p:nvSpPr>
               <p:cNvPr id="12" name="CasellaDiTesto 11"/>
@@ -8295,11 +8216,11 @@
                   <a:buChar char="•"/>
                 </a:pPr>
                 <a:r>
-                  <a:rPr lang="it-IT" sz="1500" i="1" dirty="0" err="1" smtClean="0"/>
+                  <a:rPr lang="it-IT" sz="1500" i="1" dirty="0" err="1"/>
                   <a:t>StopA</a:t>
                 </a:r>
                 <a:r>
-                  <a:rPr lang="it-IT" sz="1500" i="1" dirty="0" smtClean="0"/>
+                  <a:rPr lang="it-IT" sz="1500" i="1" dirty="0"/>
                   <a:t> </a:t>
                 </a:r>
                 <a:r>
@@ -8334,19 +8255,18 @@
                   <a:t>absent</a:t>
                 </a:r>
                 <a:r>
-                  <a:rPr lang="it-IT" sz="1500" dirty="0" smtClean="0"/>
+                  <a:rPr lang="it-IT" sz="1500" dirty="0"/>
                   <a:t>)</a:t>
                 </a:r>
                 <a:r>
-                  <a:rPr lang="it-IT" sz="1500" i="1" dirty="0" smtClean="0"/>
+                  <a:rPr lang="it-IT" sz="1500" i="1" dirty="0"/>
                   <a:t> </a:t>
                 </a:r>
-                <a:endParaRPr lang="it-IT" sz="1500" i="1" dirty="0"/>
               </a:p>
             </p:txBody>
           </p:sp>
         </mc:Choice>
-        <mc:Fallback>
+        <mc:Fallback xmlns="">
           <p:sp>
             <p:nvSpPr>
               <p:cNvPr id="12" name="CasellaDiTesto 11"/>
@@ -8385,8 +8305,8 @@
           </p:sp>
         </mc:Fallback>
       </mc:AlternateContent>
-      <mc:AlternateContent xmlns:mc="http://schemas.openxmlformats.org/markup-compatibility/2006">
-        <mc:Choice xmlns:a14="http://schemas.microsoft.com/office/drawing/2010/main" Requires="a14">
+      <mc:AlternateContent xmlns:mc="http://schemas.openxmlformats.org/markup-compatibility/2006" xmlns:a14="http://schemas.microsoft.com/office/drawing/2010/main">
+        <mc:Choice Requires="a14">
           <p:sp>
             <p:nvSpPr>
               <p:cNvPr id="17" name="CasellaDiTesto 16"/>
@@ -8451,15 +8371,7 @@
                 </a14:m>
                 <a:r>
                   <a:rPr lang="it-IT" sz="1500" dirty="0"/>
-                  <a:t> </a:t>
-                </a:r>
-                <a:r>
-                  <a:rPr lang="it-IT" sz="1500" dirty="0" smtClean="0"/>
-                  <a:t>(</a:t>
-                </a:r>
-                <a:r>
-                  <a:rPr lang="it-IT" sz="1500" dirty="0"/>
-                  <a:t>Posizione navicella)</a:t>
+                  <a:t> (Posizione navicella)</a:t>
                 </a:r>
               </a:p>
               <a:p>
@@ -8530,12 +8442,8 @@
                   </m:oMath>
                 </a14:m>
                 <a:r>
-                  <a:rPr lang="it-IT" sz="1500" dirty="0" smtClean="0"/>
-                  <a:t> </a:t>
-                </a:r>
-                <a:r>
                   <a:rPr lang="it-IT" sz="1500" dirty="0"/>
-                  <a:t>(velocità costante)</a:t>
+                  <a:t> (velocità costante)</a:t>
                 </a:r>
               </a:p>
               <a:p>
@@ -8548,7 +8456,7 @@
             </p:txBody>
           </p:sp>
         </mc:Choice>
-        <mc:Fallback>
+        <mc:Fallback xmlns="">
           <p:sp>
             <p:nvSpPr>
               <p:cNvPr id="17" name="CasellaDiTesto 16"/>
@@ -8597,14 +8505,6 @@
   <p:clrMapOvr>
     <a:masterClrMapping/>
   </p:clrMapOvr>
-  <mc:AlternateContent xmlns:mc="http://schemas.openxmlformats.org/markup-compatibility/2006">
-    <mc:Choice xmlns:p14="http://schemas.microsoft.com/office/powerpoint/2010/main" Requires="p14">
-      <p:transition spd="slow" p14:dur="2000"/>
-    </mc:Choice>
-    <mc:Fallback>
-      <p:transition spd="slow"/>
-    </mc:Fallback>
-  </mc:AlternateContent>
 </p:sld>
 </file>
 
@@ -9071,8 +8971,8 @@
           </a:p>
         </p:txBody>
       </p:sp>
-      <mc:AlternateContent xmlns:mc="http://schemas.openxmlformats.org/markup-compatibility/2006">
-        <mc:Choice xmlns:a14="http://schemas.microsoft.com/office/drawing/2010/main" Requires="a14">
+      <mc:AlternateContent xmlns:mc="http://schemas.openxmlformats.org/markup-compatibility/2006" xmlns:a14="http://schemas.microsoft.com/office/drawing/2010/main">
+        <mc:Choice Requires="a14">
           <p:sp>
             <p:nvSpPr>
               <p:cNvPr id="11" name="CasellaDiTesto 10"/>
@@ -9227,11 +9127,7 @@
                 </a:pPr>
                 <a:r>
                   <a:rPr lang="it-IT" sz="1500" i="1" dirty="0"/>
-                  <a:t>p</a:t>
-                </a:r>
-                <a:r>
-                  <a:rPr lang="it-IT" sz="1500" i="1" dirty="0" smtClean="0"/>
-                  <a:t>osition </a:t>
+                  <a:t>position </a:t>
                 </a:r>
                 <a14:m>
                   <m:oMath xmlns:m="http://schemas.openxmlformats.org/officeDocument/2006/math">
@@ -9277,7 +9173,7 @@
             </p:txBody>
           </p:sp>
         </mc:Choice>
-        <mc:Fallback>
+        <mc:Fallback xmlns="">
           <p:sp>
             <p:nvSpPr>
               <p:cNvPr id="11" name="CasellaDiTesto 10"/>
@@ -9316,8 +9212,8 @@
           </p:sp>
         </mc:Fallback>
       </mc:AlternateContent>
-      <mc:AlternateContent xmlns:mc="http://schemas.openxmlformats.org/markup-compatibility/2006">
-        <mc:Choice xmlns:a14="http://schemas.microsoft.com/office/drawing/2010/main" Requires="a14">
+      <mc:AlternateContent xmlns:mc="http://schemas.openxmlformats.org/markup-compatibility/2006" xmlns:a14="http://schemas.microsoft.com/office/drawing/2010/main">
+        <mc:Choice Requires="a14">
           <p:sp>
             <p:nvSpPr>
               <p:cNvPr id="12" name="CasellaDiTesto 11"/>
@@ -9351,11 +9247,11 @@
                   <a:buChar char="•"/>
                 </a:pPr>
                 <a:r>
-                  <a:rPr lang="it-IT" sz="1500" i="1" dirty="0" err="1" smtClean="0"/>
+                  <a:rPr lang="it-IT" sz="1500" i="1" dirty="0" err="1"/>
                   <a:t>StopA</a:t>
                 </a:r>
                 <a:r>
-                  <a:rPr lang="it-IT" sz="1500" i="1" dirty="0" smtClean="0"/>
+                  <a:rPr lang="it-IT" sz="1500" i="1" dirty="0"/>
                   <a:t> </a:t>
                 </a:r>
                 <a:r>
@@ -9390,19 +9286,18 @@
                   <a:t>absent</a:t>
                 </a:r>
                 <a:r>
-                  <a:rPr lang="it-IT" sz="1500" dirty="0" smtClean="0"/>
+                  <a:rPr lang="it-IT" sz="1500" dirty="0"/>
                   <a:t>)</a:t>
                 </a:r>
                 <a:r>
-                  <a:rPr lang="it-IT" sz="1500" i="1" dirty="0" smtClean="0"/>
+                  <a:rPr lang="it-IT" sz="1500" i="1" dirty="0"/>
                   <a:t> </a:t>
                 </a:r>
-                <a:endParaRPr lang="it-IT" sz="1500" i="1" dirty="0"/>
               </a:p>
             </p:txBody>
           </p:sp>
         </mc:Choice>
-        <mc:Fallback>
+        <mc:Fallback xmlns="">
           <p:sp>
             <p:nvSpPr>
               <p:cNvPr id="12" name="CasellaDiTesto 11"/>
@@ -9441,8 +9336,8 @@
           </p:sp>
         </mc:Fallback>
       </mc:AlternateContent>
-      <mc:AlternateContent xmlns:mc="http://schemas.openxmlformats.org/markup-compatibility/2006">
-        <mc:Choice xmlns:a14="http://schemas.microsoft.com/office/drawing/2010/main" Requires="a14">
+      <mc:AlternateContent xmlns:mc="http://schemas.openxmlformats.org/markup-compatibility/2006" xmlns:a14="http://schemas.microsoft.com/office/drawing/2010/main">
+        <mc:Choice Requires="a14">
           <p:sp>
             <p:nvSpPr>
               <p:cNvPr id="17" name="CasellaDiTesto 16"/>
@@ -9507,15 +9402,7 @@
                 </a14:m>
                 <a:r>
                   <a:rPr lang="it-IT" sz="1500" dirty="0"/>
-                  <a:t> </a:t>
-                </a:r>
-                <a:r>
-                  <a:rPr lang="it-IT" sz="1500" dirty="0" smtClean="0"/>
-                  <a:t>(</a:t>
-                </a:r>
-                <a:r>
-                  <a:rPr lang="it-IT" sz="1500" dirty="0"/>
-                  <a:t>Posizione navicella)</a:t>
+                  <a:t> (Posizione navicella)</a:t>
                 </a:r>
               </a:p>
               <a:p>
@@ -9586,12 +9473,8 @@
                   </m:oMath>
                 </a14:m>
                 <a:r>
-                  <a:rPr lang="it-IT" sz="1500" dirty="0" smtClean="0"/>
-                  <a:t> </a:t>
-                </a:r>
-                <a:r>
                   <a:rPr lang="it-IT" sz="1500" dirty="0"/>
-                  <a:t>(velocità costante)</a:t>
+                  <a:t> (velocità costante)</a:t>
                 </a:r>
               </a:p>
               <a:p>
@@ -9604,7 +9487,7 @@
             </p:txBody>
           </p:sp>
         </mc:Choice>
-        <mc:Fallback>
+        <mc:Fallback xmlns="">
           <p:sp>
             <p:nvSpPr>
               <p:cNvPr id="17" name="CasellaDiTesto 16"/>
@@ -9653,14 +9536,6 @@
   <p:clrMapOvr>
     <a:masterClrMapping/>
   </p:clrMapOvr>
-  <mc:AlternateContent xmlns:mc="http://schemas.openxmlformats.org/markup-compatibility/2006">
-    <mc:Choice xmlns:p14="http://schemas.microsoft.com/office/powerpoint/2010/main" Requires="p14">
-      <p:transition spd="slow" p14:dur="2000"/>
-    </mc:Choice>
-    <mc:Fallback>
-      <p:transition spd="slow"/>
-    </mc:Fallback>
-  </mc:AlternateContent>
 </p:sld>
 </file>
 
@@ -9759,10 +9634,6 @@
             <a:pPr marL="0" indent="0">
               <a:buNone/>
             </a:pPr>
-            <a:r>
-              <a:rPr lang="it-IT" dirty="0"/>
-              <a:t/>
-            </a:r>
             <a:br>
               <a:rPr lang="it-IT" dirty="0"/>
             </a:br>
@@ -10033,10 +9904,6 @@
             <a:pPr marL="0" indent="0">
               <a:buNone/>
             </a:pPr>
-            <a:r>
-              <a:rPr lang="it-IT" dirty="0"/>
-              <a:t/>
-            </a:r>
             <a:br>
               <a:rPr lang="it-IT" dirty="0"/>
             </a:br>
@@ -10656,10 +10523,6 @@
             <a:pPr marL="0" indent="0">
               <a:buNone/>
             </a:pPr>
-            <a:r>
-              <a:rPr lang="it-IT" dirty="0"/>
-              <a:t/>
-            </a:r>
             <a:br>
               <a:rPr lang="it-IT" dirty="0"/>
             </a:br>
@@ -11040,10 +10903,6 @@
             <a:pPr marL="0" indent="0">
               <a:buNone/>
             </a:pPr>
-            <a:r>
-              <a:rPr lang="it-IT" dirty="0"/>
-              <a:t/>
-            </a:r>
             <a:br>
               <a:rPr lang="it-IT" dirty="0"/>
             </a:br>
@@ -11612,8 +11471,8 @@
           </a:fontRef>
         </p:style>
       </p:cxnSp>
-      <mc:AlternateContent xmlns:mc="http://schemas.openxmlformats.org/markup-compatibility/2006">
-        <mc:Choice xmlns:a14="http://schemas.microsoft.com/office/drawing/2010/main" Requires="a14">
+      <mc:AlternateContent xmlns:mc="http://schemas.openxmlformats.org/markup-compatibility/2006" xmlns:a14="http://schemas.microsoft.com/office/drawing/2010/main">
+        <mc:Choice Requires="a14">
           <p:sp>
             <p:nvSpPr>
               <p:cNvPr id="28" name="CasellaDiTesto 27"/>
@@ -11681,7 +11540,7 @@
             </p:txBody>
           </p:sp>
         </mc:Choice>
-        <mc:Fallback>
+        <mc:Fallback xmlns="">
           <p:sp>
             <p:nvSpPr>
               <p:cNvPr id="28" name="CasellaDiTesto 27"/>
@@ -11940,8 +11799,8 @@
             </a:fontRef>
           </p:style>
         </p:cxnSp>
-        <mc:AlternateContent xmlns:mc="http://schemas.openxmlformats.org/markup-compatibility/2006">
-          <mc:Choice xmlns:a14="http://schemas.microsoft.com/office/drawing/2010/main" Requires="a14">
+        <mc:AlternateContent xmlns:mc="http://schemas.openxmlformats.org/markup-compatibility/2006" xmlns:a14="http://schemas.microsoft.com/office/drawing/2010/main">
+          <mc:Choice Requires="a14">
             <p:sp>
               <p:nvSpPr>
                 <p:cNvPr id="32" name="CasellaDiTesto 31"/>
@@ -11991,7 +11850,7 @@
               </p:txBody>
             </p:sp>
           </mc:Choice>
-          <mc:Fallback>
+          <mc:Fallback xmlns="">
             <p:sp>
               <p:nvSpPr>
                 <p:cNvPr id="32" name="CasellaDiTesto 31"/>
@@ -13544,8 +13403,8 @@
           </a:fontRef>
         </p:style>
       </p:cxnSp>
-      <mc:AlternateContent xmlns:mc="http://schemas.openxmlformats.org/markup-compatibility/2006">
-        <mc:Choice xmlns:a14="http://schemas.microsoft.com/office/drawing/2010/main" Requires="a14">
+      <mc:AlternateContent xmlns:mc="http://schemas.openxmlformats.org/markup-compatibility/2006" xmlns:a14="http://schemas.microsoft.com/office/drawing/2010/main">
+        <mc:Choice Requires="a14">
           <p:sp>
             <p:nvSpPr>
               <p:cNvPr id="88" name="CasellaDiTesto 87"/>
@@ -13589,7 +13448,7 @@
             </p:txBody>
           </p:sp>
         </mc:Choice>
-        <mc:Fallback>
+        <mc:Fallback xmlns="">
           <p:sp>
             <p:nvSpPr>
               <p:cNvPr id="88" name="CasellaDiTesto 87"/>
@@ -13941,8 +13800,8 @@
             </a:fontRef>
           </p:style>
         </p:cxnSp>
-        <mc:AlternateContent xmlns:mc="http://schemas.openxmlformats.org/markup-compatibility/2006">
-          <mc:Choice xmlns:a14="http://schemas.microsoft.com/office/drawing/2010/main" Requires="a14">
+        <mc:AlternateContent xmlns:mc="http://schemas.openxmlformats.org/markup-compatibility/2006" xmlns:a14="http://schemas.microsoft.com/office/drawing/2010/main">
+          <mc:Choice Requires="a14">
             <p:sp>
               <p:nvSpPr>
                 <p:cNvPr id="128" name="CasellaDiTesto 127"/>
@@ -13992,7 +13851,7 @@
               </p:txBody>
             </p:sp>
           </mc:Choice>
-          <mc:Fallback>
+          <mc:Fallback xmlns="">
             <p:sp>
               <p:nvSpPr>
                 <p:cNvPr id="128" name="CasellaDiTesto 127"/>
@@ -15344,8 +15203,8 @@
           </a:fontRef>
         </p:style>
       </p:cxnSp>
-      <mc:AlternateContent xmlns:mc="http://schemas.openxmlformats.org/markup-compatibility/2006">
-        <mc:Choice xmlns:a14="http://schemas.microsoft.com/office/drawing/2010/main" Requires="a14">
+      <mc:AlternateContent xmlns:mc="http://schemas.openxmlformats.org/markup-compatibility/2006" xmlns:a14="http://schemas.microsoft.com/office/drawing/2010/main">
+        <mc:Choice Requires="a14">
           <p:sp>
             <p:nvSpPr>
               <p:cNvPr id="153" name="CasellaDiTesto 152"/>
@@ -15389,7 +15248,7 @@
             </p:txBody>
           </p:sp>
         </mc:Choice>
-        <mc:Fallback>
+        <mc:Fallback xmlns="">
           <p:sp>
             <p:nvSpPr>
               <p:cNvPr id="153" name="CasellaDiTesto 152"/>
@@ -15475,29 +15334,24 @@
               <a:t> </a:t>
             </a:r>
             <a:r>
-              <a:rPr lang="it-IT" sz="900" dirty="0" err="1" smtClean="0"/>
+              <a:rPr lang="it-IT" sz="900" dirty="0" err="1"/>
               <a:t>int</a:t>
             </a:r>
             <a:endParaRPr lang="it-IT" sz="900" dirty="0"/>
           </a:p>
           <a:p>
             <a:r>
-              <a:rPr lang="it-IT" sz="900" dirty="0" smtClean="0"/>
-              <a:t>Input</a:t>
+              <a:rPr lang="it-IT" sz="900" dirty="0"/>
+              <a:t>Input: </a:t>
+            </a:r>
+            <a:r>
+              <a:rPr lang="it-IT" sz="900" i="1" dirty="0" err="1"/>
+              <a:t>StopA,RestartA</a:t>
             </a:r>
             <a:r>
               <a:rPr lang="it-IT" sz="900" dirty="0"/>
-              <a:t>: </a:t>
-            </a:r>
-            <a:r>
-              <a:rPr lang="it-IT" sz="900" i="1" dirty="0" err="1" smtClean="0"/>
-              <a:t>StopA,RestartA</a:t>
-            </a:r>
-            <a:r>
-              <a:rPr lang="it-IT" sz="900" dirty="0" smtClean="0"/>
               <a:t> </a:t>
             </a:r>
-            <a:endParaRPr lang="it-IT" sz="900" dirty="0"/>
           </a:p>
           <a:p>
             <a:r>
@@ -15573,8 +15427,8 @@
           </a:p>
         </p:txBody>
       </p:sp>
-      <mc:AlternateContent xmlns:mc="http://schemas.openxmlformats.org/markup-compatibility/2006">
-        <mc:Choice xmlns:a14="http://schemas.microsoft.com/office/drawing/2010/main" Requires="a14">
+      <mc:AlternateContent xmlns:mc="http://schemas.openxmlformats.org/markup-compatibility/2006" xmlns:a14="http://schemas.microsoft.com/office/drawing/2010/main">
+        <mc:Choice Requires="a14">
           <p:sp>
             <p:nvSpPr>
               <p:cNvPr id="166" name="CasellaDiTesto 165"/>
@@ -15696,14 +15550,13 @@
                   <a:t>Input: </a:t>
                 </a:r>
                 <a:r>
-                  <a:rPr lang="it-IT" sz="900" i="1" dirty="0" err="1" smtClean="0"/>
+                  <a:rPr lang="it-IT" sz="900" i="1" dirty="0" err="1"/>
                   <a:t>StopA,RestartA</a:t>
                 </a:r>
                 <a:r>
-                  <a:rPr lang="it-IT" sz="900" dirty="0" smtClean="0"/>
+                  <a:rPr lang="it-IT" sz="900" dirty="0"/>
                   <a:t> </a:t>
                 </a:r>
-                <a:endParaRPr lang="it-IT" sz="900" dirty="0"/>
               </a:p>
               <a:p>
                 <a:r>
@@ -15726,7 +15579,7 @@
             </p:txBody>
           </p:sp>
         </mc:Choice>
-        <mc:Fallback>
+        <mc:Fallback xmlns="">
           <p:sp>
             <p:nvSpPr>
               <p:cNvPr id="166" name="CasellaDiTesto 165"/>
@@ -16031,8 +15884,8 @@
           </a:fontRef>
         </p:style>
       </p:cxnSp>
-      <mc:AlternateContent xmlns:mc="http://schemas.openxmlformats.org/markup-compatibility/2006">
-        <mc:Choice xmlns:a14="http://schemas.microsoft.com/office/drawing/2010/main" Requires="a14">
+      <mc:AlternateContent xmlns:mc="http://schemas.openxmlformats.org/markup-compatibility/2006" xmlns:a14="http://schemas.microsoft.com/office/drawing/2010/main">
+        <mc:Choice Requires="a14">
           <p:sp>
             <p:nvSpPr>
               <p:cNvPr id="183" name="CasellaDiTesto 182"/>
@@ -16154,14 +16007,13 @@
                   <a:t>Input: </a:t>
                 </a:r>
                 <a:r>
-                  <a:rPr lang="it-IT" sz="900" i="1" dirty="0" err="1" smtClean="0"/>
+                  <a:rPr lang="it-IT" sz="900" i="1" dirty="0" err="1"/>
                   <a:t>StopA,RestartA</a:t>
                 </a:r>
                 <a:r>
-                  <a:rPr lang="it-IT" sz="900" dirty="0" smtClean="0"/>
+                  <a:rPr lang="it-IT" sz="900" dirty="0"/>
                   <a:t> </a:t>
                 </a:r>
-                <a:endParaRPr lang="it-IT" sz="900" dirty="0"/>
               </a:p>
               <a:p>
                 <a:r>
@@ -16184,7 +16036,7 @@
             </p:txBody>
           </p:sp>
         </mc:Choice>
-        <mc:Fallback>
+        <mc:Fallback xmlns="">
           <p:sp>
             <p:nvSpPr>
               <p:cNvPr id="183" name="CasellaDiTesto 182"/>
@@ -17497,6 +17349,60 @@
           </p:sp>
         </mc:Fallback>
       </mc:AlternateContent>
+      <p:sp>
+        <p:nvSpPr>
+          <p:cNvPr id="5" name="Ovale 4">
+            <a:extLst>
+              <a:ext uri="{FF2B5EF4-FFF2-40B4-BE49-F238E27FC236}">
+                <a16:creationId xmlns:a16="http://schemas.microsoft.com/office/drawing/2014/main" id="{7ABD0B03-F225-4569-9434-D68C81407EB2}"/>
+              </a:ext>
+            </a:extLst>
+          </p:cNvPr>
+          <p:cNvSpPr/>
+          <p:nvPr/>
+        </p:nvSpPr>
+        <p:spPr>
+          <a:xfrm>
+            <a:off x="8596459" y="3104167"/>
+            <a:ext cx="85725" cy="74189"/>
+          </a:xfrm>
+          <a:prstGeom prst="ellipse">
+            <a:avLst/>
+          </a:prstGeom>
+          <a:solidFill>
+            <a:srgbClr val="FF0000"/>
+          </a:solidFill>
+          <a:ln>
+            <a:solidFill>
+              <a:schemeClr val="tx2"/>
+            </a:solidFill>
+          </a:ln>
+        </p:spPr>
+        <p:style>
+          <a:lnRef idx="2">
+            <a:schemeClr val="accent1">
+              <a:shade val="50000"/>
+            </a:schemeClr>
+          </a:lnRef>
+          <a:fillRef idx="1">
+            <a:schemeClr val="accent1"/>
+          </a:fillRef>
+          <a:effectRef idx="0">
+            <a:schemeClr val="accent1"/>
+          </a:effectRef>
+          <a:fontRef idx="minor">
+            <a:schemeClr val="lt1"/>
+          </a:fontRef>
+        </p:style>
+        <p:txBody>
+          <a:bodyPr rtlCol="0" anchor="ctr"/>
+          <a:lstStyle/>
+          <a:p>
+            <a:pPr algn="ctr"/>
+            <a:endParaRPr lang="it-IT"/>
+          </a:p>
+        </p:txBody>
+      </p:sp>
     </p:spTree>
     <p:extLst>
       <p:ext uri="{BB962C8B-B14F-4D97-AF65-F5344CB8AC3E}">
@@ -17570,8 +17476,8 @@
           </a:p>
         </p:txBody>
       </p:sp>
-      <mc:AlternateContent xmlns:mc="http://schemas.openxmlformats.org/markup-compatibility/2006">
-        <mc:Choice xmlns:a14="http://schemas.microsoft.com/office/drawing/2010/main" Requires="a14">
+      <mc:AlternateContent xmlns:mc="http://schemas.openxmlformats.org/markup-compatibility/2006" xmlns:a14="http://schemas.microsoft.com/office/drawing/2010/main">
+        <mc:Choice Requires="a14">
           <p:sp>
             <p:nvSpPr>
               <p:cNvPr id="45" name="CasellaDiTesto 44"/>
@@ -17608,11 +17514,11 @@
                   </a:tabLst>
                 </a:pPr>
                 <a:r>
-                  <a:rPr lang="it-IT" sz="1500" i="1" dirty="0" err="1" smtClean="0"/>
+                  <a:rPr lang="it-IT" sz="1500" i="1" dirty="0" err="1"/>
                   <a:t>StopA</a:t>
                 </a:r>
                 <a:r>
-                  <a:rPr lang="it-IT" sz="1500" i="1" dirty="0" smtClean="0"/>
+                  <a:rPr lang="it-IT" sz="1500" i="1" dirty="0"/>
                   <a:t> </a:t>
                 </a:r>
                 <a:r>
@@ -17647,12 +17553,8 @@
                   <a:t>absent</a:t>
                 </a:r>
                 <a:r>
-                  <a:rPr lang="it-IT" sz="1500" dirty="0" smtClean="0"/>
-                  <a:t>) </a:t>
-                </a:r>
-                <a:r>
-                  <a:rPr lang="it-IT" sz="1500" dirty="0" smtClean="0"/>
-                  <a:t>(Segnale inviato dalla navicella che indica una collisione) </a:t>
+                  <a:rPr lang="it-IT" sz="1500" dirty="0"/>
+                  <a:t>) (Segnale inviato dalla navicella che indica una collisione) </a:t>
                 </a:r>
               </a:p>
               <a:p>
@@ -17664,7 +17566,7 @@
                   </a:tabLst>
                 </a:pPr>
                 <a:r>
-                  <a:rPr lang="it-IT" sz="1500" dirty="0" err="1" smtClean="0"/>
+                  <a:rPr lang="it-IT" sz="1500" dirty="0" err="1"/>
                   <a:t>RestartA</a:t>
                 </a:r>
                 <a:r>
@@ -17699,22 +17601,14 @@
                   <a:t>absent</a:t>
                 </a:r>
                 <a:r>
-                  <a:rPr lang="it-IT" sz="1500" dirty="0" smtClean="0"/>
-                  <a:t>) </a:t>
-                </a:r>
-                <a:r>
-                  <a:rPr lang="it-IT" sz="1500" dirty="0" smtClean="0"/>
-                  <a:t>(</a:t>
-                </a:r>
-                <a:r>
                   <a:rPr lang="it-IT" sz="1500" dirty="0"/>
-                  <a:t>Segnale inviato dalla navicella che indica di inizializzare la posizione dell’asteroide)</a:t>
+                  <a:t>) (Segnale inviato dalla navicella che indica di inizializzare la posizione dell’asteroide)</a:t>
                 </a:r>
               </a:p>
             </p:txBody>
           </p:sp>
         </mc:Choice>
-        <mc:Fallback>
+        <mc:Fallback xmlns="">
           <p:sp>
             <p:nvSpPr>
               <p:cNvPr id="45" name="CasellaDiTesto 44"/>
@@ -19329,8 +19223,8 @@
           </a:fontRef>
         </p:style>
       </p:cxnSp>
-      <mc:AlternateContent xmlns:mc="http://schemas.openxmlformats.org/markup-compatibility/2006">
-        <mc:Choice xmlns:a14="http://schemas.microsoft.com/office/drawing/2010/main" Requires="a14">
+      <mc:AlternateContent xmlns:mc="http://schemas.openxmlformats.org/markup-compatibility/2006" xmlns:a14="http://schemas.microsoft.com/office/drawing/2010/main">
+        <mc:Choice Requires="a14">
           <p:sp>
             <p:nvSpPr>
               <p:cNvPr id="27" name="CasellaDiTesto 26"/>
@@ -19380,7 +19274,7 @@
             </p:txBody>
           </p:sp>
         </mc:Choice>
-        <mc:Fallback>
+        <mc:Fallback xmlns="">
           <p:sp>
             <p:nvSpPr>
               <p:cNvPr id="27" name="CasellaDiTesto 26"/>
@@ -19705,8 +19599,8 @@
           </a:p>
         </p:txBody>
       </p:sp>
-      <mc:AlternateContent xmlns:mc="http://schemas.openxmlformats.org/markup-compatibility/2006">
-        <mc:Choice xmlns:a14="http://schemas.microsoft.com/office/drawing/2010/main" Requires="a14">
+      <mc:AlternateContent xmlns:mc="http://schemas.openxmlformats.org/markup-compatibility/2006" xmlns:a14="http://schemas.microsoft.com/office/drawing/2010/main">
+        <mc:Choice Requires="a14">
           <p:sp>
             <p:nvSpPr>
               <p:cNvPr id="32" name="CasellaDiTesto 31"/>
@@ -19730,7 +19624,7 @@
               <a:lstStyle/>
               <a:p>
                 <a:r>
-                  <a:rPr lang="it-IT" sz="1500" dirty="0" smtClean="0"/>
+                  <a:rPr lang="it-IT" sz="1500" dirty="0"/>
                   <a:t>Parametri del sistema</a:t>
                 </a:r>
               </a:p>
@@ -19793,7 +19687,6 @@
                   <a:rPr lang="it-IT" sz="1500" dirty="0"/>
                   <a:t> (posizione asteroide) </a:t>
                 </a:r>
-                <a:endParaRPr lang="it-IT" sz="1500" dirty="0"/>
               </a:p>
               <a:p>
                 <a:pPr marL="447675" lvl="1" indent="-180975">
@@ -19834,7 +19727,6 @@
                   <a:rPr lang="it-IT" sz="1500" dirty="0"/>
                   <a:t> (posizione asteroide) </a:t>
                 </a:r>
-                <a:endParaRPr lang="it-IT" sz="1500" dirty="0"/>
               </a:p>
               <a:p>
                 <a:pPr marL="447675" lvl="1" indent="-180975">
@@ -19867,7 +19759,6 @@
                   <a:rPr lang="it-IT" sz="1500" dirty="0"/>
                   <a:t> (punteggio, aumenta ad ogni rimbalzo) </a:t>
                 </a:r>
-                <a:endParaRPr lang="it-IT" sz="1500" dirty="0"/>
               </a:p>
               <a:p>
                 <a:pPr marL="266700" indent="-266700">
@@ -19914,7 +19805,6 @@
                   <a:rPr lang="it-IT" sz="1500" dirty="0"/>
                   <a:t> (velocità) </a:t>
                 </a:r>
-                <a:endParaRPr lang="it-IT" sz="1500" dirty="0"/>
               </a:p>
               <a:p>
                 <a:pPr marL="447675" lvl="1" indent="-180975">
@@ -19955,7 +19845,6 @@
                   <a:rPr lang="it-IT" sz="1500" dirty="0"/>
                   <a:t> (valore massimo, bordo) </a:t>
                 </a:r>
-                <a:endParaRPr lang="it-IT" sz="1500" dirty="0"/>
               </a:p>
               <a:p>
                 <a:pPr marL="447675" lvl="1" indent="-180975">
@@ -20003,7 +19892,6 @@
                   <a:rPr lang="it-IT" sz="1500" dirty="0"/>
                   <a:t> (valore minimo, bordo) </a:t>
                 </a:r>
-                <a:endParaRPr lang="it-IT" sz="1500" dirty="0"/>
               </a:p>
               <a:p>
                 <a:pPr marL="447675" lvl="1" indent="-180975">
@@ -20047,7 +19935,6 @@
                   <a:rPr lang="it-IT" sz="1500" dirty="0"/>
                   <a:t> (valore massimo, bordo) </a:t>
                 </a:r>
-                <a:endParaRPr lang="it-IT" sz="1500" dirty="0"/>
               </a:p>
               <a:p>
                 <a:pPr marL="447675" lvl="1" indent="-180975">
@@ -20088,7 +19975,6 @@
                   <a:rPr lang="it-IT" sz="1500" dirty="0"/>
                   <a:t> (valore minimo, bordo) </a:t>
                 </a:r>
-                <a:endParaRPr lang="it-IT" sz="1500" dirty="0"/>
               </a:p>
               <a:p>
                 <a:endParaRPr lang="it-IT" sz="1500" i="1" dirty="0"/>
@@ -20096,7 +19982,7 @@
             </p:txBody>
           </p:sp>
         </mc:Choice>
-        <mc:Fallback>
+        <mc:Fallback xmlns="">
           <p:sp>
             <p:nvSpPr>
               <p:cNvPr id="32" name="CasellaDiTesto 31"/>
@@ -20266,8 +20152,8 @@
           </p:sp>
         </mc:Fallback>
       </mc:AlternateContent>
-      <mc:AlternateContent xmlns:mc="http://schemas.openxmlformats.org/markup-compatibility/2006">
-        <mc:Choice xmlns:a14="http://schemas.microsoft.com/office/drawing/2010/main" Requires="a14">
+      <mc:AlternateContent xmlns:mc="http://schemas.openxmlformats.org/markup-compatibility/2006" xmlns:a14="http://schemas.microsoft.com/office/drawing/2010/main">
+        <mc:Choice Requires="a14">
           <p:sp>
             <p:nvSpPr>
               <p:cNvPr id="37" name="CasellaDiTesto 36"/>
@@ -20291,7 +20177,7 @@
               <a:lstStyle/>
               <a:p>
                 <a:r>
-                  <a:rPr lang="it-IT" sz="1500" dirty="0" smtClean="0"/>
+                  <a:rPr lang="it-IT" sz="1500" dirty="0"/>
                   <a:t>Output:</a:t>
                 </a:r>
               </a:p>
@@ -20304,7 +20190,7 @@
                   </a:tabLst>
                 </a:pPr>
                 <a:r>
-                  <a:rPr lang="it-IT" sz="1500" i="1" dirty="0" smtClean="0"/>
+                  <a:rPr lang="it-IT" sz="1500" i="1" dirty="0"/>
                   <a:t>Position </a:t>
                 </a:r>
                 <a14:m>
@@ -20354,7 +20240,7 @@
                   </m:oMath>
                 </a14:m>
                 <a:r>
-                  <a:rPr lang="it-IT" sz="1500" i="1" dirty="0" smtClean="0"/>
+                  <a:rPr lang="it-IT" sz="1500" i="1" dirty="0"/>
                   <a:t> </a:t>
                 </a:r>
                 <a:r>
@@ -20385,7 +20271,7 @@
             </p:txBody>
           </p:sp>
         </mc:Choice>
-        <mc:Fallback>
+        <mc:Fallback xmlns="">
           <p:sp>
             <p:nvSpPr>
               <p:cNvPr id="37" name="CasellaDiTesto 36"/>
@@ -20717,8 +20603,8 @@
           <a:chExt cx="0" cy="0"/>
         </a:xfrm>
       </p:grpSpPr>
-      <mc:AlternateContent xmlns:mc="http://schemas.openxmlformats.org/markup-compatibility/2006">
-        <mc:Choice xmlns:a14="http://schemas.microsoft.com/office/drawing/2010/main" Requires="a14">
+      <mc:AlternateContent xmlns:mc="http://schemas.openxmlformats.org/markup-compatibility/2006" xmlns:a14="http://schemas.microsoft.com/office/drawing/2010/main">
+        <mc:Choice Requires="a14">
           <p:sp>
             <p:nvSpPr>
               <p:cNvPr id="131" name="CasellaDiTesto 130"/>
@@ -20760,7 +20646,7 @@
                   <a:t> (</a:t>
                 </a:r>
                 <a:r>
-                  <a:rPr lang="it-IT" sz="1500" dirty="0" err="1" smtClean="0"/>
+                  <a:rPr lang="it-IT" sz="1500" dirty="0" err="1"/>
                   <a:t>present</a:t>
                 </a:r>
                 <a:r>
@@ -20779,7 +20665,7 @@
                   </m:oMath>
                 </a14:m>
                 <a:r>
-                  <a:rPr lang="it-IT" sz="1500" dirty="0" smtClean="0"/>
+                  <a:rPr lang="it-IT" sz="1500" dirty="0"/>
                   <a:t> </a:t>
                 </a:r>
                 <a:r>
@@ -20787,10 +20673,9 @@
                   <a:t>absent</a:t>
                 </a:r>
                 <a:r>
-                  <a:rPr lang="it-IT" sz="1500" dirty="0" smtClean="0"/>
+                  <a:rPr lang="it-IT" sz="1500" dirty="0"/>
                   <a:t>)</a:t>
                 </a:r>
-                <a:endParaRPr lang="it-IT" sz="1500" dirty="0"/>
               </a:p>
               <a:p>
                 <a:pPr marL="180975" indent="-180975">
@@ -20806,7 +20691,7 @@
                   <a:t>(</a:t>
                 </a:r>
                 <a:r>
-                  <a:rPr lang="it-IT" sz="1500" dirty="0" err="1" smtClean="0"/>
+                  <a:rPr lang="it-IT" sz="1500" dirty="0" err="1"/>
                   <a:t>present</a:t>
                 </a:r>
                 <a:r>
@@ -20825,7 +20710,7 @@
                   </m:oMath>
                 </a14:m>
                 <a:r>
-                  <a:rPr lang="it-IT" sz="1500" dirty="0" smtClean="0"/>
+                  <a:rPr lang="it-IT" sz="1500" dirty="0"/>
                   <a:t> </a:t>
                 </a:r>
                 <a:r>
@@ -20833,7 +20718,7 @@
                   <a:t>absent</a:t>
                 </a:r>
                 <a:r>
-                  <a:rPr lang="it-IT" sz="1500" dirty="0" smtClean="0"/>
+                  <a:rPr lang="it-IT" sz="1500" dirty="0"/>
                   <a:t>)</a:t>
                 </a:r>
               </a:p>
@@ -20851,7 +20736,7 @@
                   <a:t> (</a:t>
                 </a:r>
                 <a:r>
-                  <a:rPr lang="it-IT" sz="1500" dirty="0" err="1" smtClean="0"/>
+                  <a:rPr lang="it-IT" sz="1500" dirty="0" err="1"/>
                   <a:t>present</a:t>
                 </a:r>
                 <a:r>
@@ -20870,7 +20755,7 @@
                   </m:oMath>
                 </a14:m>
                 <a:r>
-                  <a:rPr lang="it-IT" sz="1500" dirty="0" smtClean="0"/>
+                  <a:rPr lang="it-IT" sz="1500" dirty="0"/>
                   <a:t> </a:t>
                 </a:r>
                 <a:r>
@@ -20878,10 +20763,9 @@
                   <a:t>absent</a:t>
                 </a:r>
                 <a:r>
-                  <a:rPr lang="it-IT" sz="1500" dirty="0" smtClean="0"/>
+                  <a:rPr lang="it-IT" sz="1500" dirty="0"/>
                   <a:t>)</a:t>
                 </a:r>
-                <a:endParaRPr lang="it-IT" sz="1500" dirty="0"/>
               </a:p>
               <a:p>
                 <a:pPr marL="180975" indent="-180975">
@@ -20897,11 +20781,11 @@
                   <a:t> (</a:t>
                 </a:r>
                 <a:r>
-                  <a:rPr lang="it-IT" sz="1500" dirty="0" err="1" smtClean="0"/>
+                  <a:rPr lang="it-IT" sz="1500" dirty="0" err="1"/>
                   <a:t>present</a:t>
                 </a:r>
                 <a:r>
-                  <a:rPr lang="it-IT" sz="1500" dirty="0" smtClean="0"/>
+                  <a:rPr lang="it-IT" sz="1500" dirty="0"/>
                   <a:t> </a:t>
                 </a:r>
                 <a14:m>
@@ -20916,7 +20800,7 @@
                   </m:oMath>
                 </a14:m>
                 <a:r>
-                  <a:rPr lang="it-IT" sz="1500" dirty="0" smtClean="0"/>
+                  <a:rPr lang="it-IT" sz="1500" dirty="0"/>
                   <a:t> </a:t>
                 </a:r>
                 <a:r>
@@ -20924,10 +20808,9 @@
                   <a:t>absent</a:t>
                 </a:r>
                 <a:r>
-                  <a:rPr lang="it-IT" sz="1500" dirty="0" smtClean="0"/>
+                  <a:rPr lang="it-IT" sz="1500" dirty="0"/>
                   <a:t>)</a:t>
                 </a:r>
-                <a:endParaRPr lang="it-IT" sz="1500" dirty="0"/>
               </a:p>
               <a:p>
                 <a:pPr marL="180975" indent="-180975">
@@ -20935,7 +20818,7 @@
                   <a:buChar char="•"/>
                 </a:pPr>
                 <a:r>
-                  <a:rPr lang="it-IT" sz="1500" i="1" dirty="0" smtClean="0"/>
+                  <a:rPr lang="it-IT" sz="1500" i="1" dirty="0"/>
                   <a:t>Position </a:t>
                 </a:r>
                 <a14:m>
@@ -20978,15 +20861,14 @@
                   </m:oMath>
                 </a14:m>
                 <a:r>
-                  <a:rPr lang="it-IT" sz="1500" i="1" dirty="0" smtClean="0"/>
+                  <a:rPr lang="it-IT" sz="1500" i="1" dirty="0"/>
                   <a:t> </a:t>
                 </a:r>
-                <a:endParaRPr lang="it-IT" sz="1500" i="1" dirty="0"/>
               </a:p>
             </p:txBody>
           </p:sp>
         </mc:Choice>
-        <mc:Fallback>
+        <mc:Fallback xmlns="">
           <p:sp>
             <p:nvSpPr>
               <p:cNvPr id="131" name="CasellaDiTesto 130"/>
@@ -21025,8 +20907,8 @@
           </p:sp>
         </mc:Fallback>
       </mc:AlternateContent>
-      <mc:AlternateContent xmlns:mc="http://schemas.openxmlformats.org/markup-compatibility/2006">
-        <mc:Choice xmlns:a14="http://schemas.microsoft.com/office/drawing/2010/main" Requires="a14">
+      <mc:AlternateContent xmlns:mc="http://schemas.openxmlformats.org/markup-compatibility/2006" xmlns:a14="http://schemas.microsoft.com/office/drawing/2010/main">
+        <mc:Choice Requires="a14">
           <p:sp>
             <p:nvSpPr>
               <p:cNvPr id="132" name="CasellaDiTesto 131"/>
@@ -21060,7 +20942,7 @@
                   <a:buChar char="•"/>
                 </a:pPr>
                 <a:r>
-                  <a:rPr lang="it-IT" sz="1500" i="1" dirty="0" smtClean="0"/>
+                  <a:rPr lang="it-IT" sz="1500" i="1" dirty="0"/>
                   <a:t>Stop </a:t>
                 </a:r>
                 <a:r>
@@ -21088,18 +20970,14 @@
                 </a14:m>
                 <a:r>
                   <a:rPr lang="it-IT" sz="1500" dirty="0"/>
-                  <a:t> </a:t>
-                </a:r>
-                <a:r>
-                  <a:rPr lang="it-IT" sz="1500" dirty="0" smtClean="0"/>
-                  <a:t>absent)</a:t>
+                  <a:t> absent)</a:t>
                 </a:r>
                 <a:endParaRPr lang="it-IT" sz="1500" i="1" dirty="0"/>
               </a:p>
             </p:txBody>
           </p:sp>
         </mc:Choice>
-        <mc:Fallback>
+        <mc:Fallback xmlns="">
           <p:sp>
             <p:nvSpPr>
               <p:cNvPr id="132" name="CasellaDiTesto 131"/>
@@ -21138,8 +21016,8 @@
           </p:sp>
         </mc:Fallback>
       </mc:AlternateContent>
-      <mc:AlternateContent xmlns:mc="http://schemas.openxmlformats.org/markup-compatibility/2006">
-        <mc:Choice xmlns:a14="http://schemas.microsoft.com/office/drawing/2010/main" Requires="a14">
+      <mc:AlternateContent xmlns:mc="http://schemas.openxmlformats.org/markup-compatibility/2006" xmlns:a14="http://schemas.microsoft.com/office/drawing/2010/main">
+        <mc:Choice Requires="a14">
           <p:sp>
             <p:nvSpPr>
               <p:cNvPr id="133" name="CasellaDiTesto 132"/>
@@ -21217,15 +21095,7 @@
                 </a14:m>
                 <a:r>
                   <a:rPr lang="it-IT" sz="1500" dirty="0"/>
-                  <a:t> </a:t>
-                </a:r>
-                <a:r>
-                  <a:rPr lang="it-IT" sz="1500" dirty="0" smtClean="0"/>
-                  <a:t> (</a:t>
-                </a:r>
-                <a:r>
-                  <a:rPr lang="it-IT" sz="1500" dirty="0"/>
-                  <a:t>posizione navicella)</a:t>
+                  <a:t>  (posizione navicella)</a:t>
                 </a:r>
               </a:p>
               <a:p>
@@ -21265,15 +21135,7 @@
                 </a14:m>
                 <a:r>
                   <a:rPr lang="it-IT" sz="1500" dirty="0"/>
-                  <a:t> </a:t>
-                </a:r>
-                <a:r>
-                  <a:rPr lang="it-IT" sz="1500" dirty="0" smtClean="0"/>
-                  <a:t> (</a:t>
-                </a:r>
-                <a:r>
-                  <a:rPr lang="it-IT" sz="1500" dirty="0"/>
-                  <a:t>posizione navicella)</a:t>
+                  <a:t>  (posizione navicella)</a:t>
                 </a:r>
               </a:p>
               <a:p>
@@ -21319,15 +21181,7 @@
                 </a14:m>
                 <a:r>
                   <a:rPr lang="it-IT" sz="1500" dirty="0"/>
-                  <a:t> </a:t>
-                </a:r>
-                <a:r>
-                  <a:rPr lang="it-IT" sz="1500" dirty="0" smtClean="0"/>
-                  <a:t> (</a:t>
-                </a:r>
-                <a:r>
-                  <a:rPr lang="it-IT" sz="1500" dirty="0"/>
-                  <a:t>velocità)</a:t>
+                  <a:t>  (velocità)</a:t>
                 </a:r>
               </a:p>
               <a:p>
@@ -21367,15 +21221,7 @@
                 </a14:m>
                 <a:r>
                   <a:rPr lang="it-IT" sz="1500" dirty="0"/>
-                  <a:t> </a:t>
-                </a:r>
-                <a:r>
-                  <a:rPr lang="it-IT" sz="1500" dirty="0" smtClean="0"/>
-                  <a:t>(</a:t>
-                </a:r>
-                <a:r>
-                  <a:rPr lang="it-IT" sz="1500" dirty="0"/>
-                  <a:t>valore massimo, bordo)</a:t>
+                  <a:t> (valore massimo, bordo)</a:t>
                 </a:r>
               </a:p>
               <a:p>
@@ -21415,15 +21261,7 @@
                 </a14:m>
                 <a:r>
                   <a:rPr lang="it-IT" sz="1500" dirty="0"/>
-                  <a:t> </a:t>
-                </a:r>
-                <a:r>
-                  <a:rPr lang="it-IT" sz="1500" dirty="0" smtClean="0"/>
-                  <a:t> (</a:t>
-                </a:r>
-                <a:r>
-                  <a:rPr lang="it-IT" sz="1500" dirty="0"/>
-                  <a:t>valore minimo, bordo)</a:t>
+                  <a:t>  (valore minimo, bordo)</a:t>
                 </a:r>
               </a:p>
               <a:p>
@@ -21466,15 +21304,7 @@
                 </a14:m>
                 <a:r>
                   <a:rPr lang="it-IT" sz="1500" dirty="0"/>
-                  <a:t> </a:t>
-                </a:r>
-                <a:r>
-                  <a:rPr lang="it-IT" sz="1500" dirty="0" smtClean="0"/>
-                  <a:t> (</a:t>
-                </a:r>
-                <a:r>
-                  <a:rPr lang="it-IT" sz="1500" dirty="0"/>
-                  <a:t>valore massimo, bordo)</a:t>
+                  <a:t>  (valore massimo, bordo)</a:t>
                 </a:r>
               </a:p>
               <a:p>
@@ -21514,15 +21344,7 @@
                 </a14:m>
                 <a:r>
                   <a:rPr lang="it-IT" sz="1500" dirty="0"/>
-                  <a:t> </a:t>
-                </a:r>
-                <a:r>
-                  <a:rPr lang="it-IT" sz="1500" dirty="0" smtClean="0"/>
-                  <a:t> (</a:t>
-                </a:r>
-                <a:r>
-                  <a:rPr lang="it-IT" sz="1500" dirty="0"/>
-                  <a:t>valore minimo, bordo)</a:t>
+                  <a:t>  (valore minimo, bordo)</a:t>
                 </a:r>
               </a:p>
               <a:p>
@@ -21531,7 +21353,7 @@
             </p:txBody>
           </p:sp>
         </mc:Choice>
-        <mc:Fallback>
+        <mc:Fallback xmlns="">
           <p:sp>
             <p:nvSpPr>
               <p:cNvPr id="133" name="CasellaDiTesto 132"/>
@@ -28634,8 +28456,8 @@
           </mc:Fallback>
         </mc:AlternateContent>
       </p:grpSp>
-      <mc:AlternateContent xmlns:mc="http://schemas.openxmlformats.org/markup-compatibility/2006">
-        <mc:Choice xmlns:a14="http://schemas.microsoft.com/office/drawing/2010/main" Requires="a14">
+      <mc:AlternateContent xmlns:mc="http://schemas.openxmlformats.org/markup-compatibility/2006" xmlns:a14="http://schemas.microsoft.com/office/drawing/2010/main">
+        <mc:Choice Requires="a14">
           <p:sp>
             <p:nvSpPr>
               <p:cNvPr id="11" name="CasellaDiTesto 10"/>
@@ -28790,11 +28612,7 @@
                 </a:pPr>
                 <a:r>
                   <a:rPr lang="it-IT" sz="1500" i="1" dirty="0"/>
-                  <a:t>p</a:t>
-                </a:r>
-                <a:r>
-                  <a:rPr lang="it-IT" sz="1500" i="1" dirty="0" smtClean="0"/>
-                  <a:t>osition </a:t>
+                  <a:t>position </a:t>
                 </a:r>
                 <a14:m>
                   <m:oMath xmlns:m="http://schemas.openxmlformats.org/officeDocument/2006/math">
@@ -28840,7 +28658,7 @@
             </p:txBody>
           </p:sp>
         </mc:Choice>
-        <mc:Fallback>
+        <mc:Fallback xmlns="">
           <p:sp>
             <p:nvSpPr>
               <p:cNvPr id="11" name="CasellaDiTesto 10"/>
@@ -28879,8 +28697,8 @@
           </p:sp>
         </mc:Fallback>
       </mc:AlternateContent>
-      <mc:AlternateContent xmlns:mc="http://schemas.openxmlformats.org/markup-compatibility/2006">
-        <mc:Choice xmlns:a14="http://schemas.microsoft.com/office/drawing/2010/main" Requires="a14">
+      <mc:AlternateContent xmlns:mc="http://schemas.openxmlformats.org/markup-compatibility/2006" xmlns:a14="http://schemas.microsoft.com/office/drawing/2010/main">
+        <mc:Choice Requires="a14">
           <p:sp>
             <p:nvSpPr>
               <p:cNvPr id="12" name="CasellaDiTesto 11"/>
@@ -28914,11 +28732,11 @@
                   <a:buChar char="•"/>
                 </a:pPr>
                 <a:r>
-                  <a:rPr lang="it-IT" sz="1500" i="1" dirty="0" err="1" smtClean="0"/>
+                  <a:rPr lang="it-IT" sz="1500" i="1" dirty="0" err="1"/>
                   <a:t>StopA</a:t>
                 </a:r>
                 <a:r>
-                  <a:rPr lang="it-IT" sz="1500" i="1" dirty="0" smtClean="0"/>
+                  <a:rPr lang="it-IT" sz="1500" i="1" dirty="0"/>
                   <a:t> </a:t>
                 </a:r>
                 <a:r>
@@ -28953,19 +28771,18 @@
                   <a:t>absent</a:t>
                 </a:r>
                 <a:r>
-                  <a:rPr lang="it-IT" sz="1500" dirty="0" smtClean="0"/>
+                  <a:rPr lang="it-IT" sz="1500" dirty="0"/>
                   <a:t>)</a:t>
                 </a:r>
                 <a:r>
-                  <a:rPr lang="it-IT" sz="1500" i="1" dirty="0" smtClean="0"/>
+                  <a:rPr lang="it-IT" sz="1500" i="1" dirty="0"/>
                   <a:t> </a:t>
                 </a:r>
-                <a:endParaRPr lang="it-IT" sz="1500" i="1" dirty="0"/>
               </a:p>
             </p:txBody>
           </p:sp>
         </mc:Choice>
-        <mc:Fallback>
+        <mc:Fallback xmlns="">
           <p:sp>
             <p:nvSpPr>
               <p:cNvPr id="12" name="CasellaDiTesto 11"/>
@@ -29004,8 +28821,8 @@
           </p:sp>
         </mc:Fallback>
       </mc:AlternateContent>
-      <mc:AlternateContent xmlns:mc="http://schemas.openxmlformats.org/markup-compatibility/2006">
-        <mc:Choice xmlns:a14="http://schemas.microsoft.com/office/drawing/2010/main" Requires="a14">
+      <mc:AlternateContent xmlns:mc="http://schemas.openxmlformats.org/markup-compatibility/2006" xmlns:a14="http://schemas.microsoft.com/office/drawing/2010/main">
+        <mc:Choice Requires="a14">
           <p:sp>
             <p:nvSpPr>
               <p:cNvPr id="13" name="CasellaDiTesto 12"/>
@@ -29070,15 +28887,7 @@
                 </a14:m>
                 <a:r>
                   <a:rPr lang="it-IT" sz="1500" dirty="0"/>
-                  <a:t> </a:t>
-                </a:r>
-                <a:r>
-                  <a:rPr lang="it-IT" sz="1500" dirty="0" smtClean="0"/>
-                  <a:t>(</a:t>
-                </a:r>
-                <a:r>
-                  <a:rPr lang="it-IT" sz="1500" dirty="0"/>
-                  <a:t>Posizione navicella)</a:t>
+                  <a:t> (Posizione navicella)</a:t>
                 </a:r>
               </a:p>
               <a:p>
@@ -29149,12 +28958,8 @@
                   </m:oMath>
                 </a14:m>
                 <a:r>
-                  <a:rPr lang="it-IT" sz="1500" dirty="0" smtClean="0"/>
-                  <a:t> </a:t>
-                </a:r>
-                <a:r>
                   <a:rPr lang="it-IT" sz="1500" dirty="0"/>
-                  <a:t>(velocità costante)</a:t>
+                  <a:t> (velocità costante)</a:t>
                 </a:r>
               </a:p>
               <a:p>
@@ -29167,7 +28972,7 @@
             </p:txBody>
           </p:sp>
         </mc:Choice>
-        <mc:Fallback>
+        <mc:Fallback xmlns="">
           <p:sp>
             <p:nvSpPr>
               <p:cNvPr id="13" name="CasellaDiTesto 12"/>
@@ -29441,14 +29246,6 @@
   <p:clrMapOvr>
     <a:masterClrMapping/>
   </p:clrMapOvr>
-  <mc:AlternateContent xmlns:mc="http://schemas.openxmlformats.org/markup-compatibility/2006">
-    <mc:Choice xmlns:p14="http://schemas.microsoft.com/office/powerpoint/2010/main" Requires="p14">
-      <p:transition spd="slow" p14:dur="2000"/>
-    </mc:Choice>
-    <mc:Fallback>
-      <p:transition spd="slow"/>
-    </mc:Fallback>
-  </mc:AlternateContent>
 </p:sld>
 </file>
 
@@ -29813,8 +29610,8 @@
           </a:p>
         </p:txBody>
       </p:sp>
-      <mc:AlternateContent xmlns:mc="http://schemas.openxmlformats.org/markup-compatibility/2006">
-        <mc:Choice xmlns:a14="http://schemas.microsoft.com/office/drawing/2010/main" Requires="a14">
+      <mc:AlternateContent xmlns:mc="http://schemas.openxmlformats.org/markup-compatibility/2006" xmlns:a14="http://schemas.microsoft.com/office/drawing/2010/main">
+        <mc:Choice Requires="a14">
           <p:sp>
             <p:nvSpPr>
               <p:cNvPr id="18" name="CasellaDiTesto 17"/>
@@ -29969,11 +29766,7 @@
                 </a:pPr>
                 <a:r>
                   <a:rPr lang="it-IT" sz="1500" i="1" dirty="0"/>
-                  <a:t>p</a:t>
-                </a:r>
-                <a:r>
-                  <a:rPr lang="it-IT" sz="1500" i="1" dirty="0" smtClean="0"/>
-                  <a:t>osition </a:t>
+                  <a:t>position </a:t>
                 </a:r>
                 <a14:m>
                   <m:oMath xmlns:m="http://schemas.openxmlformats.org/officeDocument/2006/math">
@@ -30019,7 +29812,7 @@
             </p:txBody>
           </p:sp>
         </mc:Choice>
-        <mc:Fallback>
+        <mc:Fallback xmlns="">
           <p:sp>
             <p:nvSpPr>
               <p:cNvPr id="18" name="CasellaDiTesto 17"/>
@@ -30058,8 +29851,8 @@
           </p:sp>
         </mc:Fallback>
       </mc:AlternateContent>
-      <mc:AlternateContent xmlns:mc="http://schemas.openxmlformats.org/markup-compatibility/2006">
-        <mc:Choice xmlns:a14="http://schemas.microsoft.com/office/drawing/2010/main" Requires="a14">
+      <mc:AlternateContent xmlns:mc="http://schemas.openxmlformats.org/markup-compatibility/2006" xmlns:a14="http://schemas.microsoft.com/office/drawing/2010/main">
+        <mc:Choice Requires="a14">
           <p:sp>
             <p:nvSpPr>
               <p:cNvPr id="19" name="CasellaDiTesto 18"/>
@@ -30093,11 +29886,11 @@
                   <a:buChar char="•"/>
                 </a:pPr>
                 <a:r>
-                  <a:rPr lang="it-IT" sz="1500" i="1" dirty="0" err="1" smtClean="0"/>
+                  <a:rPr lang="it-IT" sz="1500" i="1" dirty="0" err="1"/>
                   <a:t>StopA</a:t>
                 </a:r>
                 <a:r>
-                  <a:rPr lang="it-IT" sz="1500" i="1" dirty="0" smtClean="0"/>
+                  <a:rPr lang="it-IT" sz="1500" i="1" dirty="0"/>
                   <a:t> </a:t>
                 </a:r>
                 <a:r>
@@ -30132,19 +29925,18 @@
                   <a:t>absent</a:t>
                 </a:r>
                 <a:r>
-                  <a:rPr lang="it-IT" sz="1500" dirty="0" smtClean="0"/>
+                  <a:rPr lang="it-IT" sz="1500" dirty="0"/>
                   <a:t>)</a:t>
                 </a:r>
                 <a:r>
-                  <a:rPr lang="it-IT" sz="1500" i="1" dirty="0" smtClean="0"/>
+                  <a:rPr lang="it-IT" sz="1500" i="1" dirty="0"/>
                   <a:t> </a:t>
                 </a:r>
-                <a:endParaRPr lang="it-IT" sz="1500" i="1" dirty="0"/>
               </a:p>
             </p:txBody>
           </p:sp>
         </mc:Choice>
-        <mc:Fallback>
+        <mc:Fallback xmlns="">
           <p:sp>
             <p:nvSpPr>
               <p:cNvPr id="19" name="CasellaDiTesto 18"/>
@@ -30183,8 +29975,8 @@
           </p:sp>
         </mc:Fallback>
       </mc:AlternateContent>
-      <mc:AlternateContent xmlns:mc="http://schemas.openxmlformats.org/markup-compatibility/2006">
-        <mc:Choice xmlns:a14="http://schemas.microsoft.com/office/drawing/2010/main" Requires="a14">
+      <mc:AlternateContent xmlns:mc="http://schemas.openxmlformats.org/markup-compatibility/2006" xmlns:a14="http://schemas.microsoft.com/office/drawing/2010/main">
+        <mc:Choice Requires="a14">
           <p:sp>
             <p:nvSpPr>
               <p:cNvPr id="20" name="CasellaDiTesto 19"/>
@@ -30249,15 +30041,7 @@
                 </a14:m>
                 <a:r>
                   <a:rPr lang="it-IT" sz="1500" dirty="0"/>
-                  <a:t> </a:t>
-                </a:r>
-                <a:r>
-                  <a:rPr lang="it-IT" sz="1500" dirty="0" smtClean="0"/>
-                  <a:t>(</a:t>
-                </a:r>
-                <a:r>
-                  <a:rPr lang="it-IT" sz="1500" dirty="0"/>
-                  <a:t>Posizione navicella)</a:t>
+                  <a:t> (Posizione navicella)</a:t>
                 </a:r>
               </a:p>
               <a:p>
@@ -30328,12 +30112,8 @@
                   </m:oMath>
                 </a14:m>
                 <a:r>
-                  <a:rPr lang="it-IT" sz="1500" dirty="0" smtClean="0"/>
-                  <a:t> </a:t>
-                </a:r>
-                <a:r>
                   <a:rPr lang="it-IT" sz="1500" dirty="0"/>
-                  <a:t>(velocità costante)</a:t>
+                  <a:t> (velocità costante)</a:t>
                 </a:r>
               </a:p>
               <a:p>
@@ -30346,7 +30126,7 @@
             </p:txBody>
           </p:sp>
         </mc:Choice>
-        <mc:Fallback>
+        <mc:Fallback xmlns="">
           <p:sp>
             <p:nvSpPr>
               <p:cNvPr id="20" name="CasellaDiTesto 19"/>
@@ -30395,14 +30175,6 @@
   <p:clrMapOvr>
     <a:masterClrMapping/>
   </p:clrMapOvr>
-  <mc:AlternateContent xmlns:mc="http://schemas.openxmlformats.org/markup-compatibility/2006">
-    <mc:Choice xmlns:p14="http://schemas.microsoft.com/office/powerpoint/2010/main" Requires="p14">
-      <p:transition spd="slow" p14:dur="2000"/>
-    </mc:Choice>
-    <mc:Fallback>
-      <p:transition spd="slow"/>
-    </mc:Fallback>
-  </mc:AlternateContent>
 </p:sld>
 </file>
 
@@ -30767,8 +30539,8 @@
           </a:p>
         </p:txBody>
       </p:sp>
-      <mc:AlternateContent xmlns:mc="http://schemas.openxmlformats.org/markup-compatibility/2006">
-        <mc:Choice xmlns:a14="http://schemas.microsoft.com/office/drawing/2010/main" Requires="a14">
+      <mc:AlternateContent xmlns:mc="http://schemas.openxmlformats.org/markup-compatibility/2006" xmlns:a14="http://schemas.microsoft.com/office/drawing/2010/main">
+        <mc:Choice Requires="a14">
           <p:sp>
             <p:nvSpPr>
               <p:cNvPr id="11" name="CasellaDiTesto 10"/>
@@ -30923,11 +30695,7 @@
                 </a:pPr>
                 <a:r>
                   <a:rPr lang="it-IT" sz="1500" i="1" dirty="0"/>
-                  <a:t>p</a:t>
-                </a:r>
-                <a:r>
-                  <a:rPr lang="it-IT" sz="1500" i="1" dirty="0" smtClean="0"/>
-                  <a:t>osition </a:t>
+                  <a:t>position </a:t>
                 </a:r>
                 <a14:m>
                   <m:oMath xmlns:m="http://schemas.openxmlformats.org/officeDocument/2006/math">
@@ -30973,7 +30741,7 @@
             </p:txBody>
           </p:sp>
         </mc:Choice>
-        <mc:Fallback>
+        <mc:Fallback xmlns="">
           <p:sp>
             <p:nvSpPr>
               <p:cNvPr id="11" name="CasellaDiTesto 10"/>
@@ -31012,8 +30780,8 @@
           </p:sp>
         </mc:Fallback>
       </mc:AlternateContent>
-      <mc:AlternateContent xmlns:mc="http://schemas.openxmlformats.org/markup-compatibility/2006">
-        <mc:Choice xmlns:a14="http://schemas.microsoft.com/office/drawing/2010/main" Requires="a14">
+      <mc:AlternateContent xmlns:mc="http://schemas.openxmlformats.org/markup-compatibility/2006" xmlns:a14="http://schemas.microsoft.com/office/drawing/2010/main">
+        <mc:Choice Requires="a14">
           <p:sp>
             <p:nvSpPr>
               <p:cNvPr id="12" name="CasellaDiTesto 11"/>
@@ -31047,11 +30815,11 @@
                   <a:buChar char="•"/>
                 </a:pPr>
                 <a:r>
-                  <a:rPr lang="it-IT" sz="1500" i="1" dirty="0" err="1" smtClean="0"/>
+                  <a:rPr lang="it-IT" sz="1500" i="1" dirty="0" err="1"/>
                   <a:t>StopA</a:t>
                 </a:r>
                 <a:r>
-                  <a:rPr lang="it-IT" sz="1500" i="1" dirty="0" smtClean="0"/>
+                  <a:rPr lang="it-IT" sz="1500" i="1" dirty="0"/>
                   <a:t> </a:t>
                 </a:r>
                 <a:r>
@@ -31086,19 +30854,18 @@
                   <a:t>absent</a:t>
                 </a:r>
                 <a:r>
-                  <a:rPr lang="it-IT" sz="1500" dirty="0" smtClean="0"/>
+                  <a:rPr lang="it-IT" sz="1500" dirty="0"/>
                   <a:t>)</a:t>
                 </a:r>
                 <a:r>
-                  <a:rPr lang="it-IT" sz="1500" i="1" dirty="0" smtClean="0"/>
+                  <a:rPr lang="it-IT" sz="1500" i="1" dirty="0"/>
                   <a:t> </a:t>
                 </a:r>
-                <a:endParaRPr lang="it-IT" sz="1500" i="1" dirty="0"/>
               </a:p>
             </p:txBody>
           </p:sp>
         </mc:Choice>
-        <mc:Fallback>
+        <mc:Fallback xmlns="">
           <p:sp>
             <p:nvSpPr>
               <p:cNvPr id="12" name="CasellaDiTesto 11"/>
@@ -31137,8 +30904,8 @@
           </p:sp>
         </mc:Fallback>
       </mc:AlternateContent>
-      <mc:AlternateContent xmlns:mc="http://schemas.openxmlformats.org/markup-compatibility/2006">
-        <mc:Choice xmlns:a14="http://schemas.microsoft.com/office/drawing/2010/main" Requires="a14">
+      <mc:AlternateContent xmlns:mc="http://schemas.openxmlformats.org/markup-compatibility/2006" xmlns:a14="http://schemas.microsoft.com/office/drawing/2010/main">
+        <mc:Choice Requires="a14">
           <p:sp>
             <p:nvSpPr>
               <p:cNvPr id="17" name="CasellaDiTesto 16"/>
@@ -31203,15 +30970,7 @@
                 </a14:m>
                 <a:r>
                   <a:rPr lang="it-IT" sz="1500" dirty="0"/>
-                  <a:t> </a:t>
-                </a:r>
-                <a:r>
-                  <a:rPr lang="it-IT" sz="1500" dirty="0" smtClean="0"/>
-                  <a:t>(</a:t>
-                </a:r>
-                <a:r>
-                  <a:rPr lang="it-IT" sz="1500" dirty="0"/>
-                  <a:t>Posizione navicella)</a:t>
+                  <a:t> (Posizione navicella)</a:t>
                 </a:r>
               </a:p>
               <a:p>
@@ -31282,12 +31041,8 @@
                   </m:oMath>
                 </a14:m>
                 <a:r>
-                  <a:rPr lang="it-IT" sz="1500" dirty="0" smtClean="0"/>
-                  <a:t> </a:t>
-                </a:r>
-                <a:r>
                   <a:rPr lang="it-IT" sz="1500" dirty="0"/>
-                  <a:t>(velocità costante)</a:t>
+                  <a:t> (velocità costante)</a:t>
                 </a:r>
               </a:p>
               <a:p>
@@ -31300,7 +31055,7 @@
             </p:txBody>
           </p:sp>
         </mc:Choice>
-        <mc:Fallback>
+        <mc:Fallback xmlns="">
           <p:sp>
             <p:nvSpPr>
               <p:cNvPr id="17" name="CasellaDiTesto 16"/>
@@ -31349,14 +31104,6 @@
   <p:clrMapOvr>
     <a:masterClrMapping/>
   </p:clrMapOvr>
-  <mc:AlternateContent xmlns:mc="http://schemas.openxmlformats.org/markup-compatibility/2006">
-    <mc:Choice xmlns:p14="http://schemas.microsoft.com/office/powerpoint/2010/main" Requires="p14">
-      <p:transition spd="slow" p14:dur="2000"/>
-    </mc:Choice>
-    <mc:Fallback>
-      <p:transition spd="slow"/>
-    </mc:Fallback>
-  </mc:AlternateContent>
 </p:sld>
 </file>
 
@@ -31721,8 +31468,8 @@
           </a:p>
         </p:txBody>
       </p:sp>
-      <mc:AlternateContent xmlns:mc="http://schemas.openxmlformats.org/markup-compatibility/2006">
-        <mc:Choice xmlns:a14="http://schemas.microsoft.com/office/drawing/2010/main" Requires="a14">
+      <mc:AlternateContent xmlns:mc="http://schemas.openxmlformats.org/markup-compatibility/2006" xmlns:a14="http://schemas.microsoft.com/office/drawing/2010/main">
+        <mc:Choice Requires="a14">
           <p:sp>
             <p:nvSpPr>
               <p:cNvPr id="11" name="CasellaDiTesto 10"/>
@@ -31877,11 +31624,7 @@
                 </a:pPr>
                 <a:r>
                   <a:rPr lang="it-IT" sz="1500" i="1" dirty="0"/>
-                  <a:t>p</a:t>
-                </a:r>
-                <a:r>
-                  <a:rPr lang="it-IT" sz="1500" i="1" dirty="0" smtClean="0"/>
-                  <a:t>osition </a:t>
+                  <a:t>position </a:t>
                 </a:r>
                 <a14:m>
                   <m:oMath xmlns:m="http://schemas.openxmlformats.org/officeDocument/2006/math">
@@ -31927,7 +31670,7 @@
             </p:txBody>
           </p:sp>
         </mc:Choice>
-        <mc:Fallback>
+        <mc:Fallback xmlns="">
           <p:sp>
             <p:nvSpPr>
               <p:cNvPr id="11" name="CasellaDiTesto 10"/>
@@ -31966,8 +31709,8 @@
           </p:sp>
         </mc:Fallback>
       </mc:AlternateContent>
-      <mc:AlternateContent xmlns:mc="http://schemas.openxmlformats.org/markup-compatibility/2006">
-        <mc:Choice xmlns:a14="http://schemas.microsoft.com/office/drawing/2010/main" Requires="a14">
+      <mc:AlternateContent xmlns:mc="http://schemas.openxmlformats.org/markup-compatibility/2006" xmlns:a14="http://schemas.microsoft.com/office/drawing/2010/main">
+        <mc:Choice Requires="a14">
           <p:sp>
             <p:nvSpPr>
               <p:cNvPr id="12" name="CasellaDiTesto 11"/>
@@ -32001,11 +31744,11 @@
                   <a:buChar char="•"/>
                 </a:pPr>
                 <a:r>
-                  <a:rPr lang="it-IT" sz="1500" i="1" dirty="0" err="1" smtClean="0"/>
+                  <a:rPr lang="it-IT" sz="1500" i="1" dirty="0" err="1"/>
                   <a:t>StopA</a:t>
                 </a:r>
                 <a:r>
-                  <a:rPr lang="it-IT" sz="1500" i="1" dirty="0" smtClean="0"/>
+                  <a:rPr lang="it-IT" sz="1500" i="1" dirty="0"/>
                   <a:t> </a:t>
                 </a:r>
                 <a:r>
@@ -32040,19 +31783,18 @@
                   <a:t>absent</a:t>
                 </a:r>
                 <a:r>
-                  <a:rPr lang="it-IT" sz="1500" dirty="0" smtClean="0"/>
+                  <a:rPr lang="it-IT" sz="1500" dirty="0"/>
                   <a:t>)</a:t>
                 </a:r>
                 <a:r>
-                  <a:rPr lang="it-IT" sz="1500" i="1" dirty="0" smtClean="0"/>
+                  <a:rPr lang="it-IT" sz="1500" i="1" dirty="0"/>
                   <a:t> </a:t>
                 </a:r>
-                <a:endParaRPr lang="it-IT" sz="1500" i="1" dirty="0"/>
               </a:p>
             </p:txBody>
           </p:sp>
         </mc:Choice>
-        <mc:Fallback>
+        <mc:Fallback xmlns="">
           <p:sp>
             <p:nvSpPr>
               <p:cNvPr id="12" name="CasellaDiTesto 11"/>
@@ -32091,8 +31833,8 @@
           </p:sp>
         </mc:Fallback>
       </mc:AlternateContent>
-      <mc:AlternateContent xmlns:mc="http://schemas.openxmlformats.org/markup-compatibility/2006">
-        <mc:Choice xmlns:a14="http://schemas.microsoft.com/office/drawing/2010/main" Requires="a14">
+      <mc:AlternateContent xmlns:mc="http://schemas.openxmlformats.org/markup-compatibility/2006" xmlns:a14="http://schemas.microsoft.com/office/drawing/2010/main">
+        <mc:Choice Requires="a14">
           <p:sp>
             <p:nvSpPr>
               <p:cNvPr id="17" name="CasellaDiTesto 16"/>
@@ -32157,15 +31899,7 @@
                 </a14:m>
                 <a:r>
                   <a:rPr lang="it-IT" sz="1500" dirty="0"/>
-                  <a:t> </a:t>
-                </a:r>
-                <a:r>
-                  <a:rPr lang="it-IT" sz="1500" dirty="0" smtClean="0"/>
-                  <a:t>(</a:t>
-                </a:r>
-                <a:r>
-                  <a:rPr lang="it-IT" sz="1500" dirty="0"/>
-                  <a:t>Posizione navicella)</a:t>
+                  <a:t> (Posizione navicella)</a:t>
                 </a:r>
               </a:p>
               <a:p>
@@ -32236,12 +31970,8 @@
                   </m:oMath>
                 </a14:m>
                 <a:r>
-                  <a:rPr lang="it-IT" sz="1500" dirty="0" smtClean="0"/>
-                  <a:t> </a:t>
-                </a:r>
-                <a:r>
                   <a:rPr lang="it-IT" sz="1500" dirty="0"/>
-                  <a:t>(velocità costante)</a:t>
+                  <a:t> (velocità costante)</a:t>
                 </a:r>
               </a:p>
               <a:p>
@@ -32254,7 +31984,7 @@
             </p:txBody>
           </p:sp>
         </mc:Choice>
-        <mc:Fallback>
+        <mc:Fallback xmlns="">
           <p:sp>
             <p:nvSpPr>
               <p:cNvPr id="17" name="CasellaDiTesto 16"/>
@@ -32303,14 +32033,6 @@
   <p:clrMapOvr>
     <a:masterClrMapping/>
   </p:clrMapOvr>
-  <mc:AlternateContent xmlns:mc="http://schemas.openxmlformats.org/markup-compatibility/2006">
-    <mc:Choice xmlns:p14="http://schemas.microsoft.com/office/powerpoint/2010/main" Requires="p14">
-      <p:transition spd="slow" p14:dur="2000"/>
-    </mc:Choice>
-    <mc:Fallback>
-      <p:transition spd="slow"/>
-    </mc:Fallback>
-  </mc:AlternateContent>
 </p:sld>
 </file>
 

</xml_diff>

<commit_message>
Aggiunta slide del titolo
</commit_message>
<xml_diff>
--- a/Progetto sistemi.pptx
+++ b/Progetto sistemi.pptx
@@ -275,7 +275,7 @@
           <a:p>
             <a:fld id="{E7209603-6E60-49B9-BBC7-D363A6F8E0E1}" type="datetimeFigureOut">
               <a:rPr lang="it-IT" smtClean="0"/>
-              <a:t>19/02/2018</a:t>
+              <a:t>20/02/2018</a:t>
             </a:fld>
             <a:endParaRPr lang="it-IT"/>
           </a:p>
@@ -440,7 +440,7 @@
           <a:p>
             <a:fld id="{28EC8708-F48D-430F-8DA4-8CA34B9897F8}" type="datetimeFigureOut">
               <a:rPr lang="it-IT" smtClean="0"/>
-              <a:t>19/02/2018</a:t>
+              <a:t>20/02/2018</a:t>
             </a:fld>
             <a:endParaRPr lang="it-IT"/>
           </a:p>
@@ -1712,7 +1712,7 @@
           <a:p>
             <a:fld id="{5243369B-FBAA-403C-8A1E-C9994F99F854}" type="datetimeFigureOut">
               <a:rPr lang="it-IT" smtClean="0"/>
-              <a:t>19/02/2018</a:t>
+              <a:t>20/02/2018</a:t>
             </a:fld>
             <a:endParaRPr lang="it-IT"/>
           </a:p>
@@ -1880,7 +1880,7 @@
           <a:p>
             <a:fld id="{5243369B-FBAA-403C-8A1E-C9994F99F854}" type="datetimeFigureOut">
               <a:rPr lang="it-IT" smtClean="0"/>
-              <a:t>19/02/2018</a:t>
+              <a:t>20/02/2018</a:t>
             </a:fld>
             <a:endParaRPr lang="it-IT"/>
           </a:p>
@@ -2058,7 +2058,7 @@
           <a:p>
             <a:fld id="{5243369B-FBAA-403C-8A1E-C9994F99F854}" type="datetimeFigureOut">
               <a:rPr lang="it-IT" smtClean="0"/>
-              <a:t>19/02/2018</a:t>
+              <a:t>20/02/2018</a:t>
             </a:fld>
             <a:endParaRPr lang="it-IT"/>
           </a:p>
@@ -2226,7 +2226,7 @@
           <a:p>
             <a:fld id="{5243369B-FBAA-403C-8A1E-C9994F99F854}" type="datetimeFigureOut">
               <a:rPr lang="it-IT" smtClean="0"/>
-              <a:t>19/02/2018</a:t>
+              <a:t>20/02/2018</a:t>
             </a:fld>
             <a:endParaRPr lang="it-IT"/>
           </a:p>
@@ -2471,7 +2471,7 @@
           <a:p>
             <a:fld id="{5243369B-FBAA-403C-8A1E-C9994F99F854}" type="datetimeFigureOut">
               <a:rPr lang="it-IT" smtClean="0"/>
-              <a:t>19/02/2018</a:t>
+              <a:t>20/02/2018</a:t>
             </a:fld>
             <a:endParaRPr lang="it-IT"/>
           </a:p>
@@ -2700,7 +2700,7 @@
           <a:p>
             <a:fld id="{5243369B-FBAA-403C-8A1E-C9994F99F854}" type="datetimeFigureOut">
               <a:rPr lang="it-IT" smtClean="0"/>
-              <a:t>19/02/2018</a:t>
+              <a:t>20/02/2018</a:t>
             </a:fld>
             <a:endParaRPr lang="it-IT"/>
           </a:p>
@@ -3064,7 +3064,7 @@
           <a:p>
             <a:fld id="{5243369B-FBAA-403C-8A1E-C9994F99F854}" type="datetimeFigureOut">
               <a:rPr lang="it-IT" smtClean="0"/>
-              <a:t>19/02/2018</a:t>
+              <a:t>20/02/2018</a:t>
             </a:fld>
             <a:endParaRPr lang="it-IT"/>
           </a:p>
@@ -3181,7 +3181,7 @@
           <a:p>
             <a:fld id="{5243369B-FBAA-403C-8A1E-C9994F99F854}" type="datetimeFigureOut">
               <a:rPr lang="it-IT" smtClean="0"/>
-              <a:t>19/02/2018</a:t>
+              <a:t>20/02/2018</a:t>
             </a:fld>
             <a:endParaRPr lang="it-IT"/>
           </a:p>
@@ -3276,7 +3276,7 @@
           <a:p>
             <a:fld id="{5243369B-FBAA-403C-8A1E-C9994F99F854}" type="datetimeFigureOut">
               <a:rPr lang="it-IT" smtClean="0"/>
-              <a:t>19/02/2018</a:t>
+              <a:t>20/02/2018</a:t>
             </a:fld>
             <a:endParaRPr lang="it-IT"/>
           </a:p>
@@ -3551,7 +3551,7 @@
           <a:p>
             <a:fld id="{5243369B-FBAA-403C-8A1E-C9994F99F854}" type="datetimeFigureOut">
               <a:rPr lang="it-IT" smtClean="0"/>
-              <a:t>19/02/2018</a:t>
+              <a:t>20/02/2018</a:t>
             </a:fld>
             <a:endParaRPr lang="it-IT"/>
           </a:p>
@@ -3803,7 +3803,7 @@
           <a:p>
             <a:fld id="{5243369B-FBAA-403C-8A1E-C9994F99F854}" type="datetimeFigureOut">
               <a:rPr lang="it-IT" smtClean="0"/>
-              <a:t>19/02/2018</a:t>
+              <a:t>20/02/2018</a:t>
             </a:fld>
             <a:endParaRPr lang="it-IT"/>
           </a:p>
@@ -4014,7 +4014,7 @@
           <a:p>
             <a:fld id="{5243369B-FBAA-403C-8A1E-C9994F99F854}" type="datetimeFigureOut">
               <a:rPr lang="it-IT" smtClean="0"/>
-              <a:t>19/02/2018</a:t>
+              <a:t>20/02/2018</a:t>
             </a:fld>
             <a:endParaRPr lang="it-IT"/>
           </a:p>
@@ -4421,49 +4421,582 @@
       </p:grpSpPr>
       <p:sp>
         <p:nvSpPr>
-          <p:cNvPr id="2" name="Titolo 1"/>
+          <p:cNvPr id="6" name="Rectangle 2"/>
           <p:cNvSpPr>
-            <a:spLocks noGrp="1"/>
+            <a:spLocks noChangeArrowheads="1"/>
           </p:cNvSpPr>
-          <p:nvPr>
-            <p:ph type="ctrTitle"/>
-          </p:nvPr>
+          <p:nvPr/>
         </p:nvSpPr>
-        <p:spPr/>
+        <p:spPr bwMode="auto">
+          <a:xfrm>
+            <a:off x="0" y="0"/>
+            <a:ext cx="12192000" cy="457200"/>
+          </a:xfrm>
+          <a:prstGeom prst="rect">
+            <a:avLst/>
+          </a:prstGeom>
+          <a:noFill/>
+          <a:ln>
+            <a:noFill/>
+          </a:ln>
+          <a:effectLst/>
+          <a:extLst>
+            <a:ext uri="{909E8E84-426E-40DD-AFC4-6F175D3DCCD1}">
+              <a14:hiddenFill xmlns:a14="http://schemas.microsoft.com/office/drawing/2010/main">
+                <a:solidFill>
+                  <a:schemeClr val="accent1"/>
+                </a:solidFill>
+              </a14:hiddenFill>
+            </a:ext>
+            <a:ext uri="{91240B29-F687-4F45-9708-019B960494DF}">
+              <a14:hiddenLine xmlns:a14="http://schemas.microsoft.com/office/drawing/2010/main" w="9525">
+                <a:solidFill>
+                  <a:schemeClr val="tx1"/>
+                </a:solidFill>
+                <a:miter lim="800000"/>
+                <a:headEnd/>
+                <a:tailEnd/>
+              </a14:hiddenLine>
+            </a:ext>
+            <a:ext uri="{AF507438-7753-43E0-B8FC-AC1667EBCBE1}">
+              <a14:hiddenEffects xmlns:a14="http://schemas.microsoft.com/office/drawing/2010/main">
+                <a:effectLst>
+                  <a:outerShdw dist="35921" dir="2700000" algn="ctr" rotWithShape="0">
+                    <a:schemeClr val="bg2"/>
+                  </a:outerShdw>
+                </a:effectLst>
+              </a14:hiddenEffects>
+            </a:ext>
+          </a:extLst>
+        </p:spPr>
         <p:txBody>
-          <a:bodyPr/>
+          <a:bodyPr vert="horz" wrap="none" lIns="91440" tIns="45720" rIns="91440" bIns="45720" numCol="1" anchor="ctr" anchorCtr="0" compatLnSpc="1">
+            <a:prstTxWarp prst="textNoShape">
+              <a:avLst/>
+            </a:prstTxWarp>
+            <a:spAutoFit/>
+          </a:bodyPr>
           <a:lstStyle/>
           <a:p>
+            <a:endParaRPr lang="en-GB"/>
+          </a:p>
+        </p:txBody>
+      </p:sp>
+      <p:pic>
+        <p:nvPicPr>
+          <p:cNvPr id="1025" name="Picture 1"/>
+          <p:cNvPicPr>
+            <a:picLocks noChangeAspect="1" noChangeArrowheads="1"/>
+          </p:cNvPicPr>
+          <p:nvPr/>
+        </p:nvPicPr>
+        <p:blipFill>
+          <a:blip r:embed="rId2">
+            <a:extLst>
+              <a:ext uri="{28A0092B-C50C-407E-A947-70E740481C1C}">
+                <a14:useLocalDpi xmlns:a14="http://schemas.microsoft.com/office/drawing/2010/main" val="0"/>
+              </a:ext>
+            </a:extLst>
+          </a:blip>
+          <a:srcRect/>
+          <a:stretch>
+            <a:fillRect/>
+          </a:stretch>
+        </p:blipFill>
+        <p:spPr bwMode="auto">
+          <a:xfrm>
+            <a:off x="4805362" y="210787"/>
+            <a:ext cx="2581275" cy="2581275"/>
+          </a:xfrm>
+          <a:prstGeom prst="rect">
+            <a:avLst/>
+          </a:prstGeom>
+          <a:noFill/>
+          <a:extLst>
+            <a:ext uri="{909E8E84-426E-40DD-AFC4-6F175D3DCCD1}">
+              <a14:hiddenFill xmlns:a14="http://schemas.microsoft.com/office/drawing/2010/main">
+                <a:solidFill>
+                  <a:srgbClr val="FFFFFF"/>
+                </a:solidFill>
+              </a14:hiddenFill>
+            </a:ext>
+          </a:extLst>
+        </p:spPr>
+      </p:pic>
+      <p:sp>
+        <p:nvSpPr>
+          <p:cNvPr id="7" name="Rectangle 3"/>
+          <p:cNvSpPr>
+            <a:spLocks noChangeArrowheads="1"/>
+          </p:cNvSpPr>
+          <p:nvPr/>
+        </p:nvSpPr>
+        <p:spPr bwMode="auto">
+          <a:xfrm>
+            <a:off x="3488554" y="3038283"/>
+            <a:ext cx="5214889" cy="2287725"/>
+          </a:xfrm>
+          <a:prstGeom prst="rect">
+            <a:avLst/>
+          </a:prstGeom>
+          <a:noFill/>
+          <a:ln>
+            <a:noFill/>
+          </a:ln>
+          <a:effectLst/>
+          <a:extLst>
+            <a:ext uri="{909E8E84-426E-40DD-AFC4-6F175D3DCCD1}">
+              <a14:hiddenFill xmlns:a14="http://schemas.microsoft.com/office/drawing/2010/main">
+                <a:solidFill>
+                  <a:schemeClr val="accent1"/>
+                </a:solidFill>
+              </a14:hiddenFill>
+            </a:ext>
+            <a:ext uri="{91240B29-F687-4F45-9708-019B960494DF}">
+              <a14:hiddenLine xmlns:a14="http://schemas.microsoft.com/office/drawing/2010/main" w="9525">
+                <a:solidFill>
+                  <a:schemeClr val="tx1"/>
+                </a:solidFill>
+                <a:miter lim="800000"/>
+                <a:headEnd/>
+                <a:tailEnd/>
+              </a14:hiddenLine>
+            </a:ext>
+            <a:ext uri="{AF507438-7753-43E0-B8FC-AC1667EBCBE1}">
+              <a14:hiddenEffects xmlns:a14="http://schemas.microsoft.com/office/drawing/2010/main">
+                <a:effectLst>
+                  <a:outerShdw dist="35921" dir="2700000" algn="ctr" rotWithShape="0">
+                    <a:schemeClr val="bg2"/>
+                  </a:outerShdw>
+                </a:effectLst>
+              </a14:hiddenEffects>
+            </a:ext>
+          </a:extLst>
+        </p:spPr>
+        <p:txBody>
+          <a:bodyPr vert="horz" wrap="none" lIns="91440" tIns="228528" rIns="91440" bIns="25392" numCol="1" anchor="ctr" anchorCtr="0" compatLnSpc="1">
+            <a:prstTxWarp prst="textNoShape">
+              <a:avLst/>
+            </a:prstTxWarp>
+            <a:spAutoFit/>
+          </a:bodyPr>
+          <a:lstStyle/>
+          <a:p>
+            <a:pPr marL="0" marR="0" lvl="0" indent="0" algn="ctr" defTabSz="914400" rtl="0" eaLnBrk="0" fontAlgn="base" latinLnBrk="0" hangingPunct="0">
+              <a:lnSpc>
+                <a:spcPct val="100000"/>
+              </a:lnSpc>
+              <a:spcBef>
+                <a:spcPct val="0"/>
+              </a:spcBef>
+              <a:spcAft>
+                <a:spcPct val="0"/>
+              </a:spcAft>
+              <a:buClrTx/>
+              <a:buSzTx/>
+              <a:buFontTx/>
+              <a:buNone/>
+              <a:tabLst/>
+            </a:pPr>
             <a:r>
-              <a:rPr lang="it-IT" dirty="0" err="1"/>
-              <a:t>Don’t</a:t>
+              <a:rPr kumimoji="0" lang="it-IT" altLang="en-US" sz="2800" b="1" i="0" u="none" strike="noStrike" cap="none" normalizeH="0" baseline="0" dirty="0" smtClean="0">
+                <a:ln>
+                  <a:noFill/>
+                </a:ln>
+                <a:solidFill>
+                  <a:schemeClr val="tx1"/>
+                </a:solidFill>
+                <a:effectLst/>
+                <a:latin typeface="Times New Roman" panose="02020603050405020304" pitchFamily="18" charset="0"/>
+                <a:ea typeface="Calibri" panose="020F0502020204030204" pitchFamily="34" charset="0"/>
+                <a:cs typeface="Times New Roman" panose="02020603050405020304" pitchFamily="18" charset="0"/>
+              </a:rPr>
+              <a:t>Universit</a:t>
             </a:r>
             <a:r>
-              <a:rPr lang="it-IT" dirty="0"/>
-              <a:t> Die</a:t>
+              <a:rPr kumimoji="0" lang="it-IT" altLang="en-US" sz="2800" b="1" i="0" u="none" strike="noStrike" cap="none" normalizeH="0" baseline="0" dirty="0" smtClean="0">
+                <a:ln>
+                  <a:noFill/>
+                </a:ln>
+                <a:solidFill>
+                  <a:schemeClr val="tx1"/>
+                </a:solidFill>
+                <a:effectLst/>
+                <a:latin typeface="Times New Roman" panose="02020603050405020304" pitchFamily="18" charset="0"/>
+                <a:ea typeface="Calibri" panose="020F0502020204030204" pitchFamily="34" charset="0"/>
+                <a:cs typeface="Arial" panose="020B0604020202020204" pitchFamily="34" charset="0"/>
+              </a:rPr>
+              <a:t>à</a:t>
             </a:r>
+            <a:r>
+              <a:rPr kumimoji="0" lang="it-IT" altLang="en-US" sz="2800" b="1" i="0" u="none" strike="noStrike" cap="none" normalizeH="0" baseline="0" dirty="0" smtClean="0">
+                <a:ln>
+                  <a:noFill/>
+                </a:ln>
+                <a:solidFill>
+                  <a:schemeClr val="tx1"/>
+                </a:solidFill>
+                <a:effectLst/>
+                <a:latin typeface="Times New Roman" panose="02020603050405020304" pitchFamily="18" charset="0"/>
+                <a:ea typeface="Calibri" panose="020F0502020204030204" pitchFamily="34" charset="0"/>
+                <a:cs typeface="Times New Roman" panose="02020603050405020304" pitchFamily="18" charset="0"/>
+              </a:rPr>
+              <a:t> degli Studi del Sannio</a:t>
+            </a:r>
+            <a:endParaRPr kumimoji="0" lang="en-GB" altLang="en-US" sz="1100" b="0" i="0" u="none" strike="noStrike" cap="none" normalizeH="0" baseline="0" dirty="0" smtClean="0">
+              <a:ln>
+                <a:noFill/>
+              </a:ln>
+              <a:solidFill>
+                <a:schemeClr val="tx1"/>
+              </a:solidFill>
+              <a:effectLst/>
+            </a:endParaRPr>
+          </a:p>
+          <a:p>
+            <a:pPr marL="0" marR="0" lvl="0" indent="0" algn="ctr" defTabSz="914400" rtl="0" eaLnBrk="0" fontAlgn="base" latinLnBrk="0" hangingPunct="0">
+              <a:lnSpc>
+                <a:spcPct val="100000"/>
+              </a:lnSpc>
+              <a:spcBef>
+                <a:spcPct val="0"/>
+              </a:spcBef>
+              <a:spcAft>
+                <a:spcPct val="0"/>
+              </a:spcAft>
+              <a:buClrTx/>
+              <a:buSzTx/>
+              <a:buFontTx/>
+              <a:buNone/>
+              <a:tabLst/>
+            </a:pPr>
+            <a:r>
+              <a:rPr kumimoji="0" lang="it-IT" altLang="en-US" sz="2800" b="0" i="0" u="none" strike="noStrike" cap="none" normalizeH="0" baseline="0" dirty="0" smtClean="0">
+                <a:ln>
+                  <a:noFill/>
+                </a:ln>
+                <a:solidFill>
+                  <a:schemeClr val="tx1"/>
+                </a:solidFill>
+                <a:effectLst/>
+                <a:latin typeface="Times New Roman" panose="02020603050405020304" pitchFamily="18" charset="0"/>
+                <a:ea typeface="Calibri" panose="020F0502020204030204" pitchFamily="34" charset="0"/>
+                <a:cs typeface="Times New Roman" panose="02020603050405020304" pitchFamily="18" charset="0"/>
+              </a:rPr>
+              <a:t>Dipartimento di Ingegneria</a:t>
+            </a:r>
+            <a:endParaRPr kumimoji="0" lang="en-GB" altLang="en-US" sz="1100" b="0" i="0" u="none" strike="noStrike" cap="none" normalizeH="0" baseline="0" dirty="0" smtClean="0">
+              <a:ln>
+                <a:noFill/>
+              </a:ln>
+              <a:solidFill>
+                <a:schemeClr val="tx1"/>
+              </a:solidFill>
+              <a:effectLst/>
+            </a:endParaRPr>
+          </a:p>
+          <a:p>
+            <a:pPr marL="0" marR="0" lvl="0" indent="0" algn="ctr" defTabSz="914400" rtl="0" eaLnBrk="0" fontAlgn="base" latinLnBrk="0" hangingPunct="0">
+              <a:lnSpc>
+                <a:spcPct val="100000"/>
+              </a:lnSpc>
+              <a:spcBef>
+                <a:spcPct val="0"/>
+              </a:spcBef>
+              <a:spcAft>
+                <a:spcPct val="0"/>
+              </a:spcAft>
+              <a:buClrTx/>
+              <a:buSzTx/>
+              <a:buFontTx/>
+              <a:buNone/>
+              <a:tabLst/>
+            </a:pPr>
+            <a:r>
+              <a:rPr kumimoji="0" lang="it-IT" altLang="en-US" sz="2400" b="0" i="1" u="none" strike="noStrike" cap="none" normalizeH="0" baseline="0" dirty="0" smtClean="0">
+                <a:ln>
+                  <a:noFill/>
+                </a:ln>
+                <a:solidFill>
+                  <a:schemeClr val="tx1"/>
+                </a:solidFill>
+                <a:effectLst/>
+                <a:latin typeface="Times New Roman" panose="02020603050405020304" pitchFamily="18" charset="0"/>
+                <a:ea typeface="Calibri" panose="020F0502020204030204" pitchFamily="34" charset="0"/>
+                <a:cs typeface="Times New Roman" panose="02020603050405020304" pitchFamily="18" charset="0"/>
+              </a:rPr>
+              <a:t>Corso di Sistemi Discreti</a:t>
+            </a:r>
+            <a:endParaRPr kumimoji="0" lang="en-GB" altLang="en-US" sz="1100" b="0" i="0" u="none" strike="noStrike" cap="none" normalizeH="0" baseline="0" dirty="0" smtClean="0">
+              <a:ln>
+                <a:noFill/>
+              </a:ln>
+              <a:solidFill>
+                <a:schemeClr val="tx1"/>
+              </a:solidFill>
+              <a:effectLst/>
+            </a:endParaRPr>
+          </a:p>
+          <a:p>
+            <a:pPr marL="0" marR="0" lvl="0" indent="0" algn="ctr" defTabSz="914400" rtl="0" eaLnBrk="0" fontAlgn="base" latinLnBrk="0" hangingPunct="0">
+              <a:lnSpc>
+                <a:spcPct val="100000"/>
+              </a:lnSpc>
+              <a:spcBef>
+                <a:spcPct val="0"/>
+              </a:spcBef>
+              <a:spcAft>
+                <a:spcPct val="0"/>
+              </a:spcAft>
+              <a:buClrTx/>
+              <a:buSzTx/>
+              <a:buFontTx/>
+              <a:buNone/>
+              <a:tabLst/>
+            </a:pPr>
+            <a:r>
+              <a:rPr kumimoji="0" lang="it-IT" altLang="en-US" sz="2000" b="1" i="0" u="none" strike="noStrike" cap="none" normalizeH="0" baseline="0" dirty="0" smtClean="0">
+                <a:ln>
+                  <a:noFill/>
+                </a:ln>
+                <a:solidFill>
+                  <a:schemeClr val="tx1"/>
+                </a:solidFill>
+                <a:effectLst/>
+                <a:latin typeface="Times New Roman" panose="02020603050405020304" pitchFamily="18" charset="0"/>
+                <a:ea typeface="Calibri Light" panose="020F0302020204030204" pitchFamily="34" charset="0"/>
+                <a:cs typeface="Times New Roman" panose="02020603050405020304" pitchFamily="18" charset="0"/>
+              </a:rPr>
+              <a:t>Elaborato: </a:t>
+            </a:r>
+            <a:r>
+              <a:rPr kumimoji="0" lang="it-IT" altLang="en-US" sz="2000" b="1" i="0" u="none" strike="noStrike" cap="none" normalizeH="0" baseline="0" dirty="0" smtClean="0">
+                <a:ln>
+                  <a:noFill/>
+                </a:ln>
+                <a:solidFill>
+                  <a:schemeClr val="tx1"/>
+                </a:solidFill>
+                <a:effectLst/>
+                <a:latin typeface="Calibri Light" panose="020F0302020204030204" pitchFamily="34" charset="0"/>
+                <a:ea typeface="Calibri Light" panose="020F0302020204030204" pitchFamily="34" charset="0"/>
+                <a:cs typeface="Times New Roman" panose="02020603050405020304" pitchFamily="18" charset="0"/>
+              </a:rPr>
+              <a:t>“</a:t>
+            </a:r>
+            <a:r>
+              <a:rPr lang="it-IT" altLang="en-US" sz="2000" b="1" dirty="0" smtClean="0">
+                <a:latin typeface="Times New Roman" panose="02020603050405020304" pitchFamily="18" charset="0"/>
+                <a:ea typeface="Calibri Light" panose="020F0302020204030204" pitchFamily="34" charset="0"/>
+                <a:cs typeface="Times New Roman" panose="02020603050405020304" pitchFamily="18" charset="0"/>
+              </a:rPr>
+              <a:t>Realizzazione di un gioco 2D"</a:t>
+            </a:r>
+            <a:endParaRPr kumimoji="0" lang="en-GB" altLang="en-US" sz="2000" b="0" i="0" u="none" strike="noStrike" cap="none" normalizeH="0" baseline="0" dirty="0" smtClean="0">
+              <a:ln>
+                <a:noFill/>
+              </a:ln>
+              <a:solidFill>
+                <a:srgbClr val="538135"/>
+              </a:solidFill>
+              <a:effectLst/>
+              <a:latin typeface="Calibri Light" panose="020F0302020204030204" pitchFamily="34" charset="0"/>
+              <a:ea typeface="Calibri Light" panose="020F0302020204030204" pitchFamily="34" charset="0"/>
+              <a:cs typeface="Times New Roman" panose="02020603050405020304" pitchFamily="18" charset="0"/>
+            </a:endParaRPr>
+          </a:p>
+          <a:p>
+            <a:pPr marL="0" marR="0" lvl="0" indent="0" algn="ctr" defTabSz="914400" rtl="0" eaLnBrk="0" fontAlgn="base" latinLnBrk="0" hangingPunct="0">
+              <a:lnSpc>
+                <a:spcPct val="100000"/>
+              </a:lnSpc>
+              <a:spcBef>
+                <a:spcPct val="0"/>
+              </a:spcBef>
+              <a:spcAft>
+                <a:spcPct val="0"/>
+              </a:spcAft>
+              <a:buClrTx/>
+              <a:buSzTx/>
+              <a:buFontTx/>
+              <a:buNone/>
+              <a:tabLst/>
+            </a:pPr>
+            <a:r>
+              <a:rPr kumimoji="0" lang="it-IT" altLang="en-US" sz="1000" b="0" i="0" u="none" strike="noStrike" cap="none" normalizeH="0" baseline="0" dirty="0" smtClean="0">
+                <a:ln>
+                  <a:noFill/>
+                </a:ln>
+                <a:solidFill>
+                  <a:schemeClr val="tx1"/>
+                </a:solidFill>
+                <a:effectLst/>
+                <a:latin typeface="Helvetica" panose="020B0604020202020204" pitchFamily="34" charset="0"/>
+                <a:ea typeface="Calibri" panose="020F0502020204030204" pitchFamily="34" charset="0"/>
+                <a:cs typeface="Arial" panose="020B0604020202020204" pitchFamily="34" charset="0"/>
+              </a:rPr>
+              <a:t/>
+            </a:r>
+            <a:br>
+              <a:rPr kumimoji="0" lang="it-IT" altLang="en-US" sz="1000" b="0" i="0" u="none" strike="noStrike" cap="none" normalizeH="0" baseline="0" dirty="0" smtClean="0">
+                <a:ln>
+                  <a:noFill/>
+                </a:ln>
+                <a:solidFill>
+                  <a:schemeClr val="tx1"/>
+                </a:solidFill>
+                <a:effectLst/>
+                <a:latin typeface="Helvetica" panose="020B0604020202020204" pitchFamily="34" charset="0"/>
+                <a:ea typeface="Calibri" panose="020F0502020204030204" pitchFamily="34" charset="0"/>
+                <a:cs typeface="Arial" panose="020B0604020202020204" pitchFamily="34" charset="0"/>
+              </a:rPr>
+            </a:br>
+            <a:endParaRPr kumimoji="0" lang="it-IT" altLang="en-US" sz="1800" b="0" i="0" u="none" strike="noStrike" cap="none" normalizeH="0" baseline="0" dirty="0" smtClean="0">
+              <a:ln>
+                <a:noFill/>
+              </a:ln>
+              <a:solidFill>
+                <a:schemeClr val="tx1"/>
+              </a:solidFill>
+              <a:effectLst/>
+              <a:latin typeface="Arial" panose="020B0604020202020204" pitchFamily="34" charset="0"/>
+            </a:endParaRPr>
           </a:p>
         </p:txBody>
       </p:sp>
       <p:sp>
         <p:nvSpPr>
-          <p:cNvPr id="3" name="Sottotitolo 2"/>
-          <p:cNvSpPr>
-            <a:spLocks noGrp="1"/>
-          </p:cNvSpPr>
-          <p:nvPr>
-            <p:ph type="subTitle" idx="1"/>
-          </p:nvPr>
+          <p:cNvPr id="8" name="CasellaDiTesto 7"/>
+          <p:cNvSpPr txBox="1"/>
+          <p:nvPr/>
         </p:nvSpPr>
-        <p:spPr/>
+        <p:spPr>
+          <a:xfrm>
+            <a:off x="368135" y="5866410"/>
+            <a:ext cx="3503221" cy="646331"/>
+          </a:xfrm>
+          <a:prstGeom prst="rect">
+            <a:avLst/>
+          </a:prstGeom>
+          <a:noFill/>
+        </p:spPr>
         <p:txBody>
-          <a:bodyPr/>
+          <a:bodyPr wrap="square" rtlCol="0">
+            <a:spAutoFit/>
+          </a:bodyPr>
           <a:lstStyle/>
           <a:p>
+            <a:pPr algn="ctr"/>
             <a:r>
-              <a:rPr lang="it-IT" dirty="0"/>
-              <a:t>Elaborato Sistemi Discreti</a:t>
+              <a:rPr lang="it-IT" altLang="en-US" b="1" smtClean="0">
+                <a:latin typeface="Times New Roman" panose="02020603050405020304" pitchFamily="18" charset="0"/>
+                <a:ea typeface="Calibri" panose="020F0502020204030204" pitchFamily="34" charset="0"/>
+                <a:cs typeface="Times New Roman" panose="02020603050405020304" pitchFamily="18" charset="0"/>
+              </a:rPr>
+              <a:t>Docente</a:t>
             </a:r>
+          </a:p>
+          <a:p>
+            <a:pPr algn="ctr"/>
+            <a:r>
+              <a:rPr lang="it-IT" altLang="en-US" smtClean="0">
+                <a:latin typeface="Times New Roman" panose="02020603050405020304" pitchFamily="18" charset="0"/>
+                <a:ea typeface="Calibri" panose="020F0502020204030204" pitchFamily="34" charset="0"/>
+                <a:cs typeface="Times New Roman" panose="02020603050405020304" pitchFamily="18" charset="0"/>
+              </a:rPr>
+              <a:t>Luigi Iannelli</a:t>
+            </a:r>
+            <a:endParaRPr lang="en-GB" dirty="0"/>
+          </a:p>
+        </p:txBody>
+      </p:sp>
+      <p:sp>
+        <p:nvSpPr>
+          <p:cNvPr id="11" name="CasellaDiTesto 10"/>
+          <p:cNvSpPr txBox="1"/>
+          <p:nvPr/>
+        </p:nvSpPr>
+        <p:spPr>
+          <a:xfrm>
+            <a:off x="8703443" y="5572229"/>
+            <a:ext cx="3503221" cy="923330"/>
+          </a:xfrm>
+          <a:prstGeom prst="rect">
+            <a:avLst/>
+          </a:prstGeom>
+          <a:noFill/>
+        </p:spPr>
+        <p:txBody>
+          <a:bodyPr wrap="square" rtlCol="0">
+            <a:spAutoFit/>
+          </a:bodyPr>
+          <a:lstStyle/>
+          <a:p>
+            <a:pPr algn="ctr"/>
+            <a:r>
+              <a:rPr lang="it-IT" altLang="en-US" b="1" dirty="0" smtClean="0">
+                <a:latin typeface="Times New Roman" panose="02020603050405020304" pitchFamily="18" charset="0"/>
+                <a:ea typeface="Calibri" panose="020F0502020204030204" pitchFamily="34" charset="0"/>
+                <a:cs typeface="Times New Roman" panose="02020603050405020304" pitchFamily="18" charset="0"/>
+              </a:rPr>
+              <a:t>Studenti</a:t>
+            </a:r>
+          </a:p>
+          <a:p>
+            <a:pPr algn="ctr"/>
+            <a:r>
+              <a:rPr lang="it-IT" dirty="0" smtClean="0">
+                <a:latin typeface="Times New Roman" panose="02020603050405020304" pitchFamily="18" charset="0"/>
+                <a:cs typeface="Times New Roman" panose="02020603050405020304" pitchFamily="18" charset="0"/>
+              </a:rPr>
+              <a:t>Francesco Tedesco</a:t>
+            </a:r>
+          </a:p>
+          <a:p>
+            <a:pPr algn="ctr"/>
+            <a:r>
+              <a:rPr lang="it-IT" dirty="0" smtClean="0">
+                <a:latin typeface="Times New Roman" panose="02020603050405020304" pitchFamily="18" charset="0"/>
+                <a:cs typeface="Times New Roman" panose="02020603050405020304" pitchFamily="18" charset="0"/>
+              </a:rPr>
+              <a:t>Lucio De Luca</a:t>
+            </a:r>
+            <a:endParaRPr lang="en-GB" dirty="0"/>
+          </a:p>
+        </p:txBody>
+      </p:sp>
+      <p:sp>
+        <p:nvSpPr>
+          <p:cNvPr id="12" name="CasellaDiTesto 11"/>
+          <p:cNvSpPr txBox="1"/>
+          <p:nvPr/>
+        </p:nvSpPr>
+        <p:spPr>
+          <a:xfrm>
+            <a:off x="4048123" y="6310893"/>
+            <a:ext cx="4095750" cy="369332"/>
+          </a:xfrm>
+          <a:prstGeom prst="rect">
+            <a:avLst/>
+          </a:prstGeom>
+          <a:noFill/>
+        </p:spPr>
+        <p:txBody>
+          <a:bodyPr wrap="square" rtlCol="0">
+            <a:spAutoFit/>
+          </a:bodyPr>
+          <a:lstStyle/>
+          <a:p>
+            <a:pPr algn="ctr"/>
+            <a:r>
+              <a:rPr lang="it-IT" altLang="en-US" dirty="0">
+                <a:latin typeface="Times New Roman" panose="02020603050405020304" pitchFamily="18" charset="0"/>
+                <a:ea typeface="Calibri" panose="020F0502020204030204" pitchFamily="34" charset="0"/>
+                <a:cs typeface="Times New Roman" panose="02020603050405020304" pitchFamily="18" charset="0"/>
+              </a:rPr>
+              <a:t>Anno Accademico 2017/2018</a:t>
+            </a:r>
+            <a:endParaRPr lang="en-GB" dirty="0"/>
           </a:p>
         </p:txBody>
       </p:sp>
@@ -5406,6 +5939,14 @@
   <p:clrMapOvr>
     <a:masterClrMapping/>
   </p:clrMapOvr>
+  <mc:AlternateContent xmlns:mc="http://schemas.openxmlformats.org/markup-compatibility/2006">
+    <mc:Choice xmlns:p14="http://schemas.microsoft.com/office/powerpoint/2010/main" Requires="p14">
+      <p:transition spd="slow" p14:dur="2000"/>
+    </mc:Choice>
+    <mc:Fallback>
+      <p:transition spd="slow"/>
+    </mc:Fallback>
+  </mc:AlternateContent>
 </p:sld>
 </file>
 
@@ -6443,6 +6984,14 @@
   <p:clrMapOvr>
     <a:masterClrMapping/>
   </p:clrMapOvr>
+  <mc:AlternateContent xmlns:mc="http://schemas.openxmlformats.org/markup-compatibility/2006">
+    <mc:Choice xmlns:p14="http://schemas.microsoft.com/office/powerpoint/2010/main" Requires="p14">
+      <p:transition spd="slow" p14:dur="2000"/>
+    </mc:Choice>
+    <mc:Fallback>
+      <p:transition spd="slow"/>
+    </mc:Fallback>
+  </mc:AlternateContent>
 </p:sld>
 </file>
 
@@ -7474,6 +8023,14 @@
   <p:clrMapOvr>
     <a:masterClrMapping/>
   </p:clrMapOvr>
+  <mc:AlternateContent xmlns:mc="http://schemas.openxmlformats.org/markup-compatibility/2006">
+    <mc:Choice xmlns:p14="http://schemas.microsoft.com/office/powerpoint/2010/main" Requires="p14">
+      <p:transition spd="slow" p14:dur="2000"/>
+    </mc:Choice>
+    <mc:Fallback>
+      <p:transition spd="slow"/>
+    </mc:Fallback>
+  </mc:AlternateContent>
 </p:sld>
 </file>
 
@@ -8505,6 +9062,14 @@
   <p:clrMapOvr>
     <a:masterClrMapping/>
   </p:clrMapOvr>
+  <mc:AlternateContent xmlns:mc="http://schemas.openxmlformats.org/markup-compatibility/2006">
+    <mc:Choice xmlns:p14="http://schemas.microsoft.com/office/powerpoint/2010/main" Requires="p14">
+      <p:transition spd="slow" p14:dur="2000"/>
+    </mc:Choice>
+    <mc:Fallback>
+      <p:transition spd="slow"/>
+    </mc:Fallback>
+  </mc:AlternateContent>
 </p:sld>
 </file>
 
@@ -9536,6 +10101,14 @@
   <p:clrMapOvr>
     <a:masterClrMapping/>
   </p:clrMapOvr>
+  <mc:AlternateContent xmlns:mc="http://schemas.openxmlformats.org/markup-compatibility/2006">
+    <mc:Choice xmlns:p14="http://schemas.microsoft.com/office/powerpoint/2010/main" Requires="p14">
+      <p:transition spd="slow" p14:dur="2000"/>
+    </mc:Choice>
+    <mc:Fallback>
+      <p:transition spd="slow"/>
+    </mc:Fallback>
+  </mc:AlternateContent>
 </p:sld>
 </file>
 
@@ -9634,6 +10207,10 @@
             <a:pPr marL="0" indent="0">
               <a:buNone/>
             </a:pPr>
+            <a:r>
+              <a:rPr lang="it-IT" dirty="0"/>
+              <a:t/>
+            </a:r>
             <a:br>
               <a:rPr lang="it-IT" dirty="0"/>
             </a:br>
@@ -9904,6 +10481,10 @@
             <a:pPr marL="0" indent="0">
               <a:buNone/>
             </a:pPr>
+            <a:r>
+              <a:rPr lang="it-IT" dirty="0"/>
+              <a:t/>
+            </a:r>
             <a:br>
               <a:rPr lang="it-IT" dirty="0"/>
             </a:br>
@@ -10523,6 +11104,10 @@
             <a:pPr marL="0" indent="0">
               <a:buNone/>
             </a:pPr>
+            <a:r>
+              <a:rPr lang="it-IT" dirty="0"/>
+              <a:t/>
+            </a:r>
             <a:br>
               <a:rPr lang="it-IT" dirty="0"/>
             </a:br>
@@ -10903,6 +11488,10 @@
             <a:pPr marL="0" indent="0">
               <a:buNone/>
             </a:pPr>
+            <a:r>
+              <a:rPr lang="it-IT" dirty="0"/>
+              <a:t/>
+            </a:r>
             <a:br>
               <a:rPr lang="it-IT" dirty="0"/>
             </a:br>
@@ -29234,6 +29823,14 @@
   <p:clrMapOvr>
     <a:masterClrMapping/>
   </p:clrMapOvr>
+  <mc:AlternateContent xmlns:mc="http://schemas.openxmlformats.org/markup-compatibility/2006">
+    <mc:Choice xmlns:p14="http://schemas.microsoft.com/office/powerpoint/2010/main" Requires="p14">
+      <p:transition spd="slow" p14:dur="2000"/>
+    </mc:Choice>
+    <mc:Fallback>
+      <p:transition spd="slow"/>
+    </mc:Fallback>
+  </mc:AlternateContent>
 </p:sld>
 </file>
 
@@ -30163,6 +30760,14 @@
   <p:clrMapOvr>
     <a:masterClrMapping/>
   </p:clrMapOvr>
+  <mc:AlternateContent xmlns:mc="http://schemas.openxmlformats.org/markup-compatibility/2006">
+    <mc:Choice xmlns:p14="http://schemas.microsoft.com/office/powerpoint/2010/main" Requires="p14">
+      <p:transition spd="slow" p14:dur="2000"/>
+    </mc:Choice>
+    <mc:Fallback>
+      <p:transition spd="slow"/>
+    </mc:Fallback>
+  </mc:AlternateContent>
 </p:sld>
 </file>
 
@@ -31092,6 +31697,14 @@
   <p:clrMapOvr>
     <a:masterClrMapping/>
   </p:clrMapOvr>
+  <mc:AlternateContent xmlns:mc="http://schemas.openxmlformats.org/markup-compatibility/2006">
+    <mc:Choice xmlns:p14="http://schemas.microsoft.com/office/powerpoint/2010/main" Requires="p14">
+      <p:transition spd="slow" p14:dur="2000"/>
+    </mc:Choice>
+    <mc:Fallback>
+      <p:transition spd="slow"/>
+    </mc:Fallback>
+  </mc:AlternateContent>
 </p:sld>
 </file>
 
@@ -32021,6 +32634,14 @@
   <p:clrMapOvr>
     <a:masterClrMapping/>
   </p:clrMapOvr>
+  <mc:AlternateContent xmlns:mc="http://schemas.openxmlformats.org/markup-compatibility/2006">
+    <mc:Choice xmlns:p14="http://schemas.microsoft.com/office/powerpoint/2010/main" Requires="p14">
+      <p:transition spd="slow" p14:dur="2000"/>
+    </mc:Choice>
+    <mc:Fallback>
+      <p:transition spd="slow"/>
+    </mc:Fallback>
+  </mc:AlternateContent>
 </p:sld>
 </file>
 

</xml_diff>